<commit_message>
Session 2 ppt, images added
</commit_message>
<xml_diff>
--- a/sessions/1/AutoPlot_session_1.pptx
+++ b/sessions/1/AutoPlot_session_1.pptx
@@ -9,10 +9,14 @@
     <p:sldId id="257" r:id="rId3"/>
     <p:sldId id="259" r:id="rId4"/>
     <p:sldId id="260" r:id="rId5"/>
-    <p:sldId id="261" r:id="rId6"/>
-    <p:sldId id="262" r:id="rId7"/>
-    <p:sldId id="263" r:id="rId8"/>
-    <p:sldId id="264" r:id="rId9"/>
+    <p:sldId id="265" r:id="rId6"/>
+    <p:sldId id="266" r:id="rId7"/>
+    <p:sldId id="261" r:id="rId8"/>
+    <p:sldId id="262" r:id="rId9"/>
+    <p:sldId id="263" r:id="rId10"/>
+    <p:sldId id="264" r:id="rId11"/>
+    <p:sldId id="268" r:id="rId12"/>
+    <p:sldId id="267" r:id="rId13"/>
   </p:sldIdLst>
   <p:sldSz cx="12192000" cy="6858000"/>
   <p:notesSz cx="6858000" cy="9144000"/>
@@ -113,7 +117,7 @@
   </p:defaultTextStyle>
   <p:extLst>
     <p:ext uri="{EFAFB233-063F-42B5-8137-9DF3F51BA10A}">
-      <p15:sldGuideLst xmlns:p15="http://schemas.microsoft.com/office/powerpoint/2012/main"/>
+      <p15:sldGuideLst xmlns="" xmlns:p15="http://schemas.microsoft.com/office/powerpoint/2012/main"/>
     </p:ext>
   </p:extLst>
 </p:presentation>
@@ -250,7 +254,8 @@
           <a:p>
             <a:fld id="{672E1A00-EE2E-4C0F-AC6B-9431477BA8CA}" type="datetimeFigureOut">
               <a:rPr lang="en-US" smtClean="0"/>
-              <a:t>16-Jun-19</a:t>
+              <a:pPr/>
+              <a:t>6/25/2019</a:t>
             </a:fld>
             <a:endParaRPr lang="en-US"/>
           </a:p>
@@ -292,6 +297,7 @@
           <a:p>
             <a:fld id="{B07D22E2-5FC2-43FE-902A-CF61F805D01C}" type="slidenum">
               <a:rPr lang="en-US" smtClean="0"/>
+              <a:pPr/>
               <a:t>‹#›</a:t>
             </a:fld>
             <a:endParaRPr lang="en-US"/>
@@ -301,7 +307,7 @@
     </p:spTree>
     <p:extLst>
       <p:ext uri="{BB962C8B-B14F-4D97-AF65-F5344CB8AC3E}">
-        <p14:creationId xmlns:p14="http://schemas.microsoft.com/office/powerpoint/2010/main" val="1943160687"/>
+        <p14:creationId xmlns="" xmlns:p14="http://schemas.microsoft.com/office/powerpoint/2010/main" val="1943160687"/>
       </p:ext>
     </p:extLst>
   </p:cSld>
@@ -420,7 +426,8 @@
           <a:p>
             <a:fld id="{672E1A00-EE2E-4C0F-AC6B-9431477BA8CA}" type="datetimeFigureOut">
               <a:rPr lang="en-US" smtClean="0"/>
-              <a:t>16-Jun-19</a:t>
+              <a:pPr/>
+              <a:t>6/25/2019</a:t>
             </a:fld>
             <a:endParaRPr lang="en-US"/>
           </a:p>
@@ -462,6 +469,7 @@
           <a:p>
             <a:fld id="{B07D22E2-5FC2-43FE-902A-CF61F805D01C}" type="slidenum">
               <a:rPr lang="en-US" smtClean="0"/>
+              <a:pPr/>
               <a:t>‹#›</a:t>
             </a:fld>
             <a:endParaRPr lang="en-US"/>
@@ -471,7 +479,7 @@
     </p:spTree>
     <p:extLst>
       <p:ext uri="{BB962C8B-B14F-4D97-AF65-F5344CB8AC3E}">
-        <p14:creationId xmlns:p14="http://schemas.microsoft.com/office/powerpoint/2010/main" val="1277705445"/>
+        <p14:creationId xmlns="" xmlns:p14="http://schemas.microsoft.com/office/powerpoint/2010/main" val="1277705445"/>
       </p:ext>
     </p:extLst>
   </p:cSld>
@@ -600,7 +608,8 @@
           <a:p>
             <a:fld id="{672E1A00-EE2E-4C0F-AC6B-9431477BA8CA}" type="datetimeFigureOut">
               <a:rPr lang="en-US" smtClean="0"/>
-              <a:t>16-Jun-19</a:t>
+              <a:pPr/>
+              <a:t>6/25/2019</a:t>
             </a:fld>
             <a:endParaRPr lang="en-US"/>
           </a:p>
@@ -642,6 +651,7 @@
           <a:p>
             <a:fld id="{B07D22E2-5FC2-43FE-902A-CF61F805D01C}" type="slidenum">
               <a:rPr lang="en-US" smtClean="0"/>
+              <a:pPr/>
               <a:t>‹#›</a:t>
             </a:fld>
             <a:endParaRPr lang="en-US"/>
@@ -651,7 +661,7 @@
     </p:spTree>
     <p:extLst>
       <p:ext uri="{BB962C8B-B14F-4D97-AF65-F5344CB8AC3E}">
-        <p14:creationId xmlns:p14="http://schemas.microsoft.com/office/powerpoint/2010/main" val="790968573"/>
+        <p14:creationId xmlns="" xmlns:p14="http://schemas.microsoft.com/office/powerpoint/2010/main" val="790968573"/>
       </p:ext>
     </p:extLst>
   </p:cSld>
@@ -770,7 +780,8 @@
           <a:p>
             <a:fld id="{672E1A00-EE2E-4C0F-AC6B-9431477BA8CA}" type="datetimeFigureOut">
               <a:rPr lang="en-US" smtClean="0"/>
-              <a:t>16-Jun-19</a:t>
+              <a:pPr/>
+              <a:t>6/25/2019</a:t>
             </a:fld>
             <a:endParaRPr lang="en-US"/>
           </a:p>
@@ -812,6 +823,7 @@
           <a:p>
             <a:fld id="{B07D22E2-5FC2-43FE-902A-CF61F805D01C}" type="slidenum">
               <a:rPr lang="en-US" smtClean="0"/>
+              <a:pPr/>
               <a:t>‹#›</a:t>
             </a:fld>
             <a:endParaRPr lang="en-US"/>
@@ -821,7 +833,7 @@
     </p:spTree>
     <p:extLst>
       <p:ext uri="{BB962C8B-B14F-4D97-AF65-F5344CB8AC3E}">
-        <p14:creationId xmlns:p14="http://schemas.microsoft.com/office/powerpoint/2010/main" val="832645262"/>
+        <p14:creationId xmlns="" xmlns:p14="http://schemas.microsoft.com/office/powerpoint/2010/main" val="832645262"/>
       </p:ext>
     </p:extLst>
   </p:cSld>
@@ -1016,7 +1028,8 @@
           <a:p>
             <a:fld id="{672E1A00-EE2E-4C0F-AC6B-9431477BA8CA}" type="datetimeFigureOut">
               <a:rPr lang="en-US" smtClean="0"/>
-              <a:t>16-Jun-19</a:t>
+              <a:pPr/>
+              <a:t>6/25/2019</a:t>
             </a:fld>
             <a:endParaRPr lang="en-US"/>
           </a:p>
@@ -1058,6 +1071,7 @@
           <a:p>
             <a:fld id="{B07D22E2-5FC2-43FE-902A-CF61F805D01C}" type="slidenum">
               <a:rPr lang="en-US" smtClean="0"/>
+              <a:pPr/>
               <a:t>‹#›</a:t>
             </a:fld>
             <a:endParaRPr lang="en-US"/>
@@ -1067,7 +1081,7 @@
     </p:spTree>
     <p:extLst>
       <p:ext uri="{BB962C8B-B14F-4D97-AF65-F5344CB8AC3E}">
-        <p14:creationId xmlns:p14="http://schemas.microsoft.com/office/powerpoint/2010/main" val="3099942805"/>
+        <p14:creationId xmlns="" xmlns:p14="http://schemas.microsoft.com/office/powerpoint/2010/main" val="3099942805"/>
       </p:ext>
     </p:extLst>
   </p:cSld>
@@ -1248,7 +1262,8 @@
           <a:p>
             <a:fld id="{672E1A00-EE2E-4C0F-AC6B-9431477BA8CA}" type="datetimeFigureOut">
               <a:rPr lang="en-US" smtClean="0"/>
-              <a:t>16-Jun-19</a:t>
+              <a:pPr/>
+              <a:t>6/25/2019</a:t>
             </a:fld>
             <a:endParaRPr lang="en-US"/>
           </a:p>
@@ -1290,6 +1305,7 @@
           <a:p>
             <a:fld id="{B07D22E2-5FC2-43FE-902A-CF61F805D01C}" type="slidenum">
               <a:rPr lang="en-US" smtClean="0"/>
+              <a:pPr/>
               <a:t>‹#›</a:t>
             </a:fld>
             <a:endParaRPr lang="en-US"/>
@@ -1299,7 +1315,7 @@
     </p:spTree>
     <p:extLst>
       <p:ext uri="{BB962C8B-B14F-4D97-AF65-F5344CB8AC3E}">
-        <p14:creationId xmlns:p14="http://schemas.microsoft.com/office/powerpoint/2010/main" val="3105561879"/>
+        <p14:creationId xmlns="" xmlns:p14="http://schemas.microsoft.com/office/powerpoint/2010/main" val="3105561879"/>
       </p:ext>
     </p:extLst>
   </p:cSld>
@@ -1615,7 +1631,8 @@
           <a:p>
             <a:fld id="{672E1A00-EE2E-4C0F-AC6B-9431477BA8CA}" type="datetimeFigureOut">
               <a:rPr lang="en-US" smtClean="0"/>
-              <a:t>16-Jun-19</a:t>
+              <a:pPr/>
+              <a:t>6/25/2019</a:t>
             </a:fld>
             <a:endParaRPr lang="en-US"/>
           </a:p>
@@ -1657,6 +1674,7 @@
           <a:p>
             <a:fld id="{B07D22E2-5FC2-43FE-902A-CF61F805D01C}" type="slidenum">
               <a:rPr lang="en-US" smtClean="0"/>
+              <a:pPr/>
               <a:t>‹#›</a:t>
             </a:fld>
             <a:endParaRPr lang="en-US"/>
@@ -1666,7 +1684,7 @@
     </p:spTree>
     <p:extLst>
       <p:ext uri="{BB962C8B-B14F-4D97-AF65-F5344CB8AC3E}">
-        <p14:creationId xmlns:p14="http://schemas.microsoft.com/office/powerpoint/2010/main" val="4281697121"/>
+        <p14:creationId xmlns="" xmlns:p14="http://schemas.microsoft.com/office/powerpoint/2010/main" val="4281697121"/>
       </p:ext>
     </p:extLst>
   </p:cSld>
@@ -1733,7 +1751,8 @@
           <a:p>
             <a:fld id="{672E1A00-EE2E-4C0F-AC6B-9431477BA8CA}" type="datetimeFigureOut">
               <a:rPr lang="en-US" smtClean="0"/>
-              <a:t>16-Jun-19</a:t>
+              <a:pPr/>
+              <a:t>6/25/2019</a:t>
             </a:fld>
             <a:endParaRPr lang="en-US"/>
           </a:p>
@@ -1775,6 +1794,7 @@
           <a:p>
             <a:fld id="{B07D22E2-5FC2-43FE-902A-CF61F805D01C}" type="slidenum">
               <a:rPr lang="en-US" smtClean="0"/>
+              <a:pPr/>
               <a:t>‹#›</a:t>
             </a:fld>
             <a:endParaRPr lang="en-US"/>
@@ -1784,7 +1804,7 @@
     </p:spTree>
     <p:extLst>
       <p:ext uri="{BB962C8B-B14F-4D97-AF65-F5344CB8AC3E}">
-        <p14:creationId xmlns:p14="http://schemas.microsoft.com/office/powerpoint/2010/main" val="2356969964"/>
+        <p14:creationId xmlns="" xmlns:p14="http://schemas.microsoft.com/office/powerpoint/2010/main" val="2356969964"/>
       </p:ext>
     </p:extLst>
   </p:cSld>
@@ -1828,7 +1848,8 @@
           <a:p>
             <a:fld id="{672E1A00-EE2E-4C0F-AC6B-9431477BA8CA}" type="datetimeFigureOut">
               <a:rPr lang="en-US" smtClean="0"/>
-              <a:t>16-Jun-19</a:t>
+              <a:pPr/>
+              <a:t>6/25/2019</a:t>
             </a:fld>
             <a:endParaRPr lang="en-US"/>
           </a:p>
@@ -1870,6 +1891,7 @@
           <a:p>
             <a:fld id="{B07D22E2-5FC2-43FE-902A-CF61F805D01C}" type="slidenum">
               <a:rPr lang="en-US" smtClean="0"/>
+              <a:pPr/>
               <a:t>‹#›</a:t>
             </a:fld>
             <a:endParaRPr lang="en-US"/>
@@ -1879,7 +1901,7 @@
     </p:spTree>
     <p:extLst>
       <p:ext uri="{BB962C8B-B14F-4D97-AF65-F5344CB8AC3E}">
-        <p14:creationId xmlns:p14="http://schemas.microsoft.com/office/powerpoint/2010/main" val="519621263"/>
+        <p14:creationId xmlns="" xmlns:p14="http://schemas.microsoft.com/office/powerpoint/2010/main" val="519621263"/>
       </p:ext>
     </p:extLst>
   </p:cSld>
@@ -2105,7 +2127,8 @@
           <a:p>
             <a:fld id="{672E1A00-EE2E-4C0F-AC6B-9431477BA8CA}" type="datetimeFigureOut">
               <a:rPr lang="en-US" smtClean="0"/>
-              <a:t>16-Jun-19</a:t>
+              <a:pPr/>
+              <a:t>6/25/2019</a:t>
             </a:fld>
             <a:endParaRPr lang="en-US"/>
           </a:p>
@@ -2147,6 +2170,7 @@
           <a:p>
             <a:fld id="{B07D22E2-5FC2-43FE-902A-CF61F805D01C}" type="slidenum">
               <a:rPr lang="en-US" smtClean="0"/>
+              <a:pPr/>
               <a:t>‹#›</a:t>
             </a:fld>
             <a:endParaRPr lang="en-US"/>
@@ -2156,7 +2180,7 @@
     </p:spTree>
     <p:extLst>
       <p:ext uri="{BB962C8B-B14F-4D97-AF65-F5344CB8AC3E}">
-        <p14:creationId xmlns:p14="http://schemas.microsoft.com/office/powerpoint/2010/main" val="639836036"/>
+        <p14:creationId xmlns="" xmlns:p14="http://schemas.microsoft.com/office/powerpoint/2010/main" val="639836036"/>
       </p:ext>
     </p:extLst>
   </p:cSld>
@@ -2358,7 +2382,8 @@
           <a:p>
             <a:fld id="{672E1A00-EE2E-4C0F-AC6B-9431477BA8CA}" type="datetimeFigureOut">
               <a:rPr lang="en-US" smtClean="0"/>
-              <a:t>16-Jun-19</a:t>
+              <a:pPr/>
+              <a:t>6/25/2019</a:t>
             </a:fld>
             <a:endParaRPr lang="en-US"/>
           </a:p>
@@ -2400,6 +2425,7 @@
           <a:p>
             <a:fld id="{B07D22E2-5FC2-43FE-902A-CF61F805D01C}" type="slidenum">
               <a:rPr lang="en-US" smtClean="0"/>
+              <a:pPr/>
               <a:t>‹#›</a:t>
             </a:fld>
             <a:endParaRPr lang="en-US"/>
@@ -2409,7 +2435,7 @@
     </p:spTree>
     <p:extLst>
       <p:ext uri="{BB962C8B-B14F-4D97-AF65-F5344CB8AC3E}">
-        <p14:creationId xmlns:p14="http://schemas.microsoft.com/office/powerpoint/2010/main" val="1031210403"/>
+        <p14:creationId xmlns="" xmlns:p14="http://schemas.microsoft.com/office/powerpoint/2010/main" val="1031210403"/>
       </p:ext>
     </p:extLst>
   </p:cSld>
@@ -2425,7 +2451,7 @@
     <p:bg>
       <p:bgPr>
         <a:blipFill dpi="0" rotWithShape="1">
-          <a:blip r:embed="rId13">
+          <a:blip r:embed="rId13" cstate="print">
             <a:alphaModFix amt="28000"/>
             <a:lum/>
           </a:blip>
@@ -2581,7 +2607,8 @@
           <a:p>
             <a:fld id="{672E1A00-EE2E-4C0F-AC6B-9431477BA8CA}" type="datetimeFigureOut">
               <a:rPr lang="en-US" smtClean="0"/>
-              <a:t>16-Jun-19</a:t>
+              <a:pPr/>
+              <a:t>6/25/2019</a:t>
             </a:fld>
             <a:endParaRPr lang="en-US"/>
           </a:p>
@@ -2659,6 +2686,7 @@
           <a:p>
             <a:fld id="{B07D22E2-5FC2-43FE-902A-CF61F805D01C}" type="slidenum">
               <a:rPr lang="en-US" smtClean="0"/>
+              <a:pPr/>
               <a:t>‹#›</a:t>
             </a:fld>
             <a:endParaRPr lang="en-US"/>
@@ -2668,7 +2696,7 @@
     </p:spTree>
     <p:extLst>
       <p:ext uri="{BB962C8B-B14F-4D97-AF65-F5344CB8AC3E}">
-        <p14:creationId xmlns:p14="http://schemas.microsoft.com/office/powerpoint/2010/main" val="1809828173"/>
+        <p14:creationId xmlns="" xmlns:p14="http://schemas.microsoft.com/office/powerpoint/2010/main" val="1809828173"/>
       </p:ext>
     </p:extLst>
   </p:cSld>
@@ -3088,10 +3116,10 @@
           <p:nvPr/>
         </p:nvPicPr>
         <p:blipFill>
-          <a:blip r:embed="rId2">
+          <a:blip r:embed="rId2" cstate="print">
             <a:extLst>
               <a:ext uri="{28A0092B-C50C-407E-A947-70E740481C1C}">
-                <a14:useLocalDpi xmlns:a14="http://schemas.microsoft.com/office/drawing/2010/main" val="0"/>
+                <a14:useLocalDpi xmlns="" xmlns:a14="http://schemas.microsoft.com/office/drawing/2010/main" val="0"/>
               </a:ext>
             </a:extLst>
           </a:blip>
@@ -3112,7 +3140,814 @@
     </p:spTree>
     <p:extLst>
       <p:ext uri="{BB962C8B-B14F-4D97-AF65-F5344CB8AC3E}">
-        <p14:creationId xmlns:p14="http://schemas.microsoft.com/office/powerpoint/2010/main" val="369495984"/>
+        <p14:creationId xmlns="" xmlns:p14="http://schemas.microsoft.com/office/powerpoint/2010/main" val="369495984"/>
+      </p:ext>
+    </p:extLst>
+  </p:cSld>
+  <p:clrMapOvr>
+    <a:masterClrMapping/>
+  </p:clrMapOvr>
+  <p:timing>
+    <p:tnLst>
+      <p:par>
+        <p:cTn id="1" dur="indefinite" restart="never" nodeType="tmRoot"/>
+      </p:par>
+    </p:tnLst>
+  </p:timing>
+</p:sld>
+</file>
+
+<file path=ppt/slides/slide10.xml><?xml version="1.0" encoding="utf-8"?>
+<p:sld xmlns:a="http://schemas.openxmlformats.org/drawingml/2006/main" xmlns:r="http://schemas.openxmlformats.org/officeDocument/2006/relationships" xmlns:p="http://schemas.openxmlformats.org/presentationml/2006/main">
+  <p:cSld>
+    <p:bg>
+      <p:bgPr>
+        <a:blipFill dpi="0" rotWithShape="1">
+          <a:blip r:embed="rId2" cstate="print">
+            <a:alphaModFix amt="25000"/>
+            <a:lum/>
+          </a:blip>
+          <a:srcRect/>
+          <a:stretch>
+            <a:fillRect l="-3000" r="-3000"/>
+          </a:stretch>
+        </a:blipFill>
+        <a:effectLst/>
+      </p:bgPr>
+    </p:bg>
+    <p:spTree>
+      <p:nvGrpSpPr>
+        <p:cNvPr id="1" name=""/>
+        <p:cNvGrpSpPr/>
+        <p:nvPr/>
+      </p:nvGrpSpPr>
+      <p:grpSpPr>
+        <a:xfrm>
+          <a:off x="0" y="0"/>
+          <a:ext cx="0" cy="0"/>
+          <a:chOff x="0" y="0"/>
+          <a:chExt cx="0" cy="0"/>
+        </a:xfrm>
+      </p:grpSpPr>
+      <p:sp>
+        <p:nvSpPr>
+          <p:cNvPr id="2" name="Title 1"/>
+          <p:cNvSpPr>
+            <a:spLocks noGrp="1"/>
+          </p:cNvSpPr>
+          <p:nvPr>
+            <p:ph type="title"/>
+          </p:nvPr>
+        </p:nvSpPr>
+        <p:spPr/>
+        <p:txBody>
+          <a:bodyPr/>
+          <a:lstStyle/>
+          <a:p>
+            <a:r>
+              <a:rPr lang="en-US" b="1" dirty="0" smtClean="0">
+                <a:solidFill>
+                  <a:schemeClr val="tx2">
+                    <a:lumMod val="75000"/>
+                  </a:schemeClr>
+                </a:solidFill>
+              </a:rPr>
+              <a:t>Scripting/Coding</a:t>
+            </a:r>
+            <a:endParaRPr lang="en-US" dirty="0">
+              <a:solidFill>
+                <a:schemeClr val="tx2">
+                  <a:lumMod val="75000"/>
+                </a:schemeClr>
+              </a:solidFill>
+            </a:endParaRPr>
+          </a:p>
+        </p:txBody>
+      </p:sp>
+      <p:pic>
+        <p:nvPicPr>
+          <p:cNvPr id="1026" name="Picture 2" descr="I:\github_repos\AutoPlot\sessions\1\res\excel_sample_pic.png"/>
+          <p:cNvPicPr>
+            <a:picLocks noChangeAspect="1" noChangeArrowheads="1"/>
+          </p:cNvPicPr>
+          <p:nvPr/>
+        </p:nvPicPr>
+        <p:blipFill>
+          <a:blip r:embed="rId3" cstate="print"/>
+          <a:srcRect/>
+          <a:stretch>
+            <a:fillRect/>
+          </a:stretch>
+        </p:blipFill>
+        <p:spPr bwMode="auto">
+          <a:xfrm>
+            <a:off x="640308" y="1730476"/>
+            <a:ext cx="4142659" cy="2330246"/>
+          </a:xfrm>
+          <a:prstGeom prst="rect">
+            <a:avLst/>
+          </a:prstGeom>
+          <a:solidFill>
+            <a:srgbClr val="FFFFFF">
+              <a:shade val="85000"/>
+            </a:srgbClr>
+          </a:solidFill>
+          <a:ln w="88900" cap="sq">
+            <a:solidFill>
+              <a:srgbClr val="FFFFFF"/>
+            </a:solidFill>
+            <a:miter lim="800000"/>
+          </a:ln>
+          <a:effectLst>
+            <a:outerShdw blurRad="55000" dist="18000" dir="5400000" algn="tl" rotWithShape="0">
+              <a:srgbClr val="000000">
+                <a:alpha val="40000"/>
+              </a:srgbClr>
+            </a:outerShdw>
+          </a:effectLst>
+          <a:scene3d>
+            <a:camera prst="orthographicFront"/>
+            <a:lightRig rig="twoPt" dir="t">
+              <a:rot lat="0" lon="0" rev="7200000"/>
+            </a:lightRig>
+          </a:scene3d>
+          <a:sp3d>
+            <a:bevelT w="25400" h="19050"/>
+            <a:contourClr>
+              <a:srgbClr val="FFFFFF"/>
+            </a:contourClr>
+          </a:sp3d>
+        </p:spPr>
+      </p:pic>
+      <p:pic>
+        <p:nvPicPr>
+          <p:cNvPr id="1027" name="Picture 3" descr="I:\github_repos\AutoPlot\sessions\1\res\dataframe_img.png"/>
+          <p:cNvPicPr>
+            <a:picLocks noChangeAspect="1" noChangeArrowheads="1"/>
+          </p:cNvPicPr>
+          <p:nvPr/>
+        </p:nvPicPr>
+        <p:blipFill>
+          <a:blip r:embed="rId4" cstate="print"/>
+          <a:srcRect/>
+          <a:stretch>
+            <a:fillRect/>
+          </a:stretch>
+        </p:blipFill>
+        <p:spPr bwMode="auto">
+          <a:xfrm>
+            <a:off x="4021394" y="4457135"/>
+            <a:ext cx="3973057" cy="2051091"/>
+          </a:xfrm>
+          <a:prstGeom prst="rect">
+            <a:avLst/>
+          </a:prstGeom>
+          <a:ln>
+            <a:noFill/>
+          </a:ln>
+          <a:effectLst>
+            <a:outerShdw blurRad="190500" algn="tl" rotWithShape="0">
+              <a:srgbClr val="000000">
+                <a:alpha val="70000"/>
+              </a:srgbClr>
+            </a:outerShdw>
+          </a:effectLst>
+        </p:spPr>
+      </p:pic>
+      <p:sp>
+        <p:nvSpPr>
+          <p:cNvPr id="7" name="TextBox 6"/>
+          <p:cNvSpPr txBox="1"/>
+          <p:nvPr/>
+        </p:nvSpPr>
+        <p:spPr>
+          <a:xfrm>
+            <a:off x="2025444" y="4876800"/>
+            <a:ext cx="1518172" cy="923330"/>
+          </a:xfrm>
+          <a:prstGeom prst="rect">
+            <a:avLst/>
+          </a:prstGeom>
+          <a:noFill/>
+        </p:spPr>
+        <p:txBody>
+          <a:bodyPr wrap="none" rtlCol="0">
+            <a:spAutoFit/>
+          </a:bodyPr>
+          <a:lstStyle/>
+          <a:p>
+            <a:pPr algn="r"/>
+            <a:r>
+              <a:rPr lang="en-GB" dirty="0" smtClean="0"/>
+              <a:t>Cleaning</a:t>
+            </a:r>
+            <a:r>
+              <a:rPr lang="en-GB" dirty="0" smtClean="0"/>
+              <a:t>,</a:t>
+            </a:r>
+          </a:p>
+          <a:p>
+            <a:pPr algn="r"/>
+            <a:r>
+              <a:rPr lang="en-GB" dirty="0" smtClean="0"/>
+              <a:t>Filtering,</a:t>
+            </a:r>
+            <a:r>
+              <a:rPr lang="en-GB" dirty="0" smtClean="0"/>
+              <a:t> </a:t>
+            </a:r>
+            <a:endParaRPr lang="en-GB" dirty="0" smtClean="0"/>
+          </a:p>
+          <a:p>
+            <a:pPr algn="r"/>
+            <a:r>
+              <a:rPr lang="en-GB" dirty="0" smtClean="0"/>
+              <a:t>Re-structuring</a:t>
+            </a:r>
+            <a:endParaRPr lang="en-US" dirty="0"/>
+          </a:p>
+        </p:txBody>
+      </p:sp>
+      <p:pic>
+        <p:nvPicPr>
+          <p:cNvPr id="1028" name="Picture 4" descr="I:\github_repos\AutoPlot\sessions\1\res\plot_sample.png"/>
+          <p:cNvPicPr>
+            <a:picLocks noChangeAspect="1" noChangeArrowheads="1"/>
+          </p:cNvPicPr>
+          <p:nvPr/>
+        </p:nvPicPr>
+        <p:blipFill>
+          <a:blip r:embed="rId5" cstate="print"/>
+          <a:srcRect/>
+          <a:stretch>
+            <a:fillRect/>
+          </a:stretch>
+        </p:blipFill>
+        <p:spPr bwMode="auto">
+          <a:xfrm>
+            <a:off x="7404342" y="1691148"/>
+            <a:ext cx="4212577" cy="2369574"/>
+          </a:xfrm>
+          <a:prstGeom prst="rect">
+            <a:avLst/>
+          </a:prstGeom>
+          <a:solidFill>
+            <a:srgbClr val="FFFFFF">
+              <a:shade val="85000"/>
+            </a:srgbClr>
+          </a:solidFill>
+          <a:ln w="88900" cap="sq">
+            <a:solidFill>
+              <a:srgbClr val="FFFFFF"/>
+            </a:solidFill>
+            <a:miter lim="800000"/>
+          </a:ln>
+          <a:effectLst>
+            <a:outerShdw blurRad="55000" dist="18000" dir="5400000" algn="tl" rotWithShape="0">
+              <a:srgbClr val="000000">
+                <a:alpha val="40000"/>
+              </a:srgbClr>
+            </a:outerShdw>
+          </a:effectLst>
+          <a:scene3d>
+            <a:camera prst="orthographicFront"/>
+            <a:lightRig rig="twoPt" dir="t">
+              <a:rot lat="0" lon="0" rev="7200000"/>
+            </a:lightRig>
+          </a:scene3d>
+          <a:sp3d>
+            <a:bevelT w="25400" h="19050"/>
+            <a:contourClr>
+              <a:srgbClr val="FFFFFF"/>
+            </a:contourClr>
+          </a:sp3d>
+        </p:spPr>
+      </p:pic>
+      <p:sp>
+        <p:nvSpPr>
+          <p:cNvPr id="9" name="Bent-Up Arrow 8"/>
+          <p:cNvSpPr/>
+          <p:nvPr/>
+        </p:nvSpPr>
+        <p:spPr>
+          <a:xfrm>
+            <a:off x="8701561" y="4660489"/>
+            <a:ext cx="1406010" cy="1032387"/>
+          </a:xfrm>
+          <a:prstGeom prst="bentUpArrow">
+            <a:avLst/>
+          </a:prstGeom>
+        </p:spPr>
+        <p:style>
+          <a:lnRef idx="2">
+            <a:schemeClr val="accent1">
+              <a:shade val="50000"/>
+            </a:schemeClr>
+          </a:lnRef>
+          <a:fillRef idx="1">
+            <a:schemeClr val="accent1"/>
+          </a:fillRef>
+          <a:effectRef idx="0">
+            <a:schemeClr val="accent1"/>
+          </a:effectRef>
+          <a:fontRef idx="minor">
+            <a:schemeClr val="lt1"/>
+          </a:fontRef>
+        </p:style>
+        <p:txBody>
+          <a:bodyPr rtlCol="0" anchor="ctr"/>
+          <a:lstStyle/>
+          <a:p>
+            <a:pPr algn="ctr"/>
+            <a:endParaRPr lang="en-US"/>
+          </a:p>
+        </p:txBody>
+      </p:sp>
+      <p:sp>
+        <p:nvSpPr>
+          <p:cNvPr id="10" name="Curved Right Arrow 9"/>
+          <p:cNvSpPr/>
+          <p:nvPr/>
+        </p:nvSpPr>
+        <p:spPr>
+          <a:xfrm>
+            <a:off x="1789471" y="4326194"/>
+            <a:ext cx="963561" cy="1966451"/>
+          </a:xfrm>
+          <a:prstGeom prst="curvedRightArrow">
+            <a:avLst/>
+          </a:prstGeom>
+        </p:spPr>
+        <p:style>
+          <a:lnRef idx="2">
+            <a:schemeClr val="accent1">
+              <a:shade val="50000"/>
+            </a:schemeClr>
+          </a:lnRef>
+          <a:fillRef idx="1">
+            <a:schemeClr val="accent1"/>
+          </a:fillRef>
+          <a:effectRef idx="0">
+            <a:schemeClr val="accent1"/>
+          </a:effectRef>
+          <a:fontRef idx="minor">
+            <a:schemeClr val="lt1"/>
+          </a:fontRef>
+        </p:style>
+        <p:txBody>
+          <a:bodyPr rtlCol="0" anchor="ctr"/>
+          <a:lstStyle/>
+          <a:p>
+            <a:pPr algn="ctr"/>
+            <a:endParaRPr lang="en-US">
+              <a:solidFill>
+                <a:schemeClr val="tx1"/>
+              </a:solidFill>
+            </a:endParaRPr>
+          </a:p>
+        </p:txBody>
+      </p:sp>
+      <p:sp>
+        <p:nvSpPr>
+          <p:cNvPr id="11" name="TextBox 10"/>
+          <p:cNvSpPr txBox="1"/>
+          <p:nvPr/>
+        </p:nvSpPr>
+        <p:spPr>
+          <a:xfrm>
+            <a:off x="10146902" y="4984955"/>
+            <a:ext cx="1009507" cy="923330"/>
+          </a:xfrm>
+          <a:prstGeom prst="rect">
+            <a:avLst/>
+          </a:prstGeom>
+          <a:noFill/>
+          <a:ln>
+            <a:solidFill>
+              <a:schemeClr val="accent1">
+                <a:shade val="50000"/>
+              </a:schemeClr>
+            </a:solidFill>
+          </a:ln>
+        </p:spPr>
+        <p:txBody>
+          <a:bodyPr wrap="none" rtlCol="0">
+            <a:spAutoFit/>
+          </a:bodyPr>
+          <a:lstStyle/>
+          <a:p>
+            <a:pPr>
+              <a:buFont typeface="Arial" pitchFamily="34" charset="0"/>
+              <a:buChar char="•"/>
+            </a:pPr>
+            <a:r>
+              <a:rPr lang="en-GB" dirty="0" smtClean="0"/>
+              <a:t> Button </a:t>
+            </a:r>
+          </a:p>
+          <a:p>
+            <a:pPr>
+              <a:buFont typeface="Arial" pitchFamily="34" charset="0"/>
+              <a:buChar char="•"/>
+            </a:pPr>
+            <a:r>
+              <a:rPr lang="en-GB" dirty="0" smtClean="0"/>
+              <a:t> Shell </a:t>
+            </a:r>
+          </a:p>
+          <a:p>
+            <a:pPr>
+              <a:buFont typeface="Arial" pitchFamily="34" charset="0"/>
+              <a:buChar char="•"/>
+            </a:pPr>
+            <a:r>
+              <a:rPr lang="en-GB" dirty="0" smtClean="0"/>
+              <a:t> Auto</a:t>
+            </a:r>
+            <a:endParaRPr lang="en-US" dirty="0"/>
+          </a:p>
+        </p:txBody>
+      </p:sp>
+      <p:sp>
+        <p:nvSpPr>
+          <p:cNvPr id="12" name="TextBox 11"/>
+          <p:cNvSpPr txBox="1"/>
+          <p:nvPr/>
+        </p:nvSpPr>
+        <p:spPr>
+          <a:xfrm>
+            <a:off x="10028914" y="4611329"/>
+            <a:ext cx="1569917" cy="369332"/>
+          </a:xfrm>
+          <a:prstGeom prst="rect">
+            <a:avLst/>
+          </a:prstGeom>
+          <a:noFill/>
+        </p:spPr>
+        <p:txBody>
+          <a:bodyPr wrap="none" rtlCol="0">
+            <a:spAutoFit/>
+          </a:bodyPr>
+          <a:lstStyle/>
+          <a:p>
+            <a:r>
+              <a:rPr lang="en-GB" dirty="0" smtClean="0"/>
+              <a:t>Generate Plots</a:t>
+            </a:r>
+            <a:endParaRPr lang="en-US" dirty="0"/>
+          </a:p>
+        </p:txBody>
+      </p:sp>
+    </p:spTree>
+    <p:extLst>
+      <p:ext uri="{BB962C8B-B14F-4D97-AF65-F5344CB8AC3E}">
+        <p14:creationId xmlns="" xmlns:p14="http://schemas.microsoft.com/office/powerpoint/2010/main" val="777954675"/>
+      </p:ext>
+    </p:extLst>
+  </p:cSld>
+  <p:clrMapOvr>
+    <a:masterClrMapping/>
+  </p:clrMapOvr>
+  <p:timing>
+    <p:tnLst>
+      <p:par>
+        <p:cTn id="1" dur="indefinite" restart="never" nodeType="tmRoot"/>
+      </p:par>
+    </p:tnLst>
+  </p:timing>
+</p:sld>
+</file>
+
+<file path=ppt/slides/slide11.xml><?xml version="1.0" encoding="utf-8"?>
+<p:sld xmlns:a="http://schemas.openxmlformats.org/drawingml/2006/main" xmlns:r="http://schemas.openxmlformats.org/officeDocument/2006/relationships" xmlns:p="http://schemas.openxmlformats.org/presentationml/2006/main">
+  <p:cSld>
+    <p:spTree>
+      <p:nvGrpSpPr>
+        <p:cNvPr id="1" name=""/>
+        <p:cNvGrpSpPr/>
+        <p:nvPr/>
+      </p:nvGrpSpPr>
+      <p:grpSpPr>
+        <a:xfrm>
+          <a:off x="0" y="0"/>
+          <a:ext cx="0" cy="0"/>
+          <a:chOff x="0" y="0"/>
+          <a:chExt cx="0" cy="0"/>
+        </a:xfrm>
+      </p:grpSpPr>
+      <p:sp>
+        <p:nvSpPr>
+          <p:cNvPr id="2" name="Title 1"/>
+          <p:cNvSpPr>
+            <a:spLocks noGrp="1"/>
+          </p:cNvSpPr>
+          <p:nvPr>
+            <p:ph type="title"/>
+          </p:nvPr>
+        </p:nvSpPr>
+        <p:spPr/>
+        <p:txBody>
+          <a:bodyPr/>
+          <a:lstStyle/>
+          <a:p>
+            <a:r>
+              <a:rPr lang="en-GB" b="1" dirty="0" smtClean="0">
+                <a:solidFill>
+                  <a:schemeClr val="tx2">
+                    <a:lumMod val="75000"/>
+                  </a:schemeClr>
+                </a:solidFill>
+              </a:rPr>
+              <a:t>Coding Essentials</a:t>
+            </a:r>
+            <a:endParaRPr lang="en-US" dirty="0">
+              <a:solidFill>
+                <a:schemeClr val="tx2">
+                  <a:lumMod val="75000"/>
+                </a:schemeClr>
+              </a:solidFill>
+            </a:endParaRPr>
+          </a:p>
+        </p:txBody>
+      </p:sp>
+      <p:sp>
+        <p:nvSpPr>
+          <p:cNvPr id="13" name="Content Placeholder 2"/>
+          <p:cNvSpPr>
+            <a:spLocks noGrp="1"/>
+          </p:cNvSpPr>
+          <p:nvPr>
+            <p:ph idx="1"/>
+          </p:nvPr>
+        </p:nvSpPr>
+        <p:spPr>
+          <a:xfrm>
+            <a:off x="838200" y="1825625"/>
+            <a:ext cx="10515600" cy="4351338"/>
+          </a:xfrm>
+        </p:spPr>
+        <p:txBody>
+          <a:bodyPr/>
+          <a:lstStyle/>
+          <a:p>
+            <a:r>
+              <a:rPr lang="en-GB" dirty="0" smtClean="0">
+                <a:latin typeface="Segoe UI" panose="020B0502040204020203" pitchFamily="34" charset="0"/>
+                <a:cs typeface="Segoe UI" panose="020B0502040204020203" pitchFamily="34" charset="0"/>
+              </a:rPr>
+              <a:t>Editor, Compiler</a:t>
+            </a:r>
+          </a:p>
+          <a:p>
+            <a:endParaRPr lang="en-US" dirty="0" smtClean="0">
+              <a:latin typeface="Segoe UI" panose="020B0502040204020203" pitchFamily="34" charset="0"/>
+              <a:cs typeface="Segoe UI" panose="020B0502040204020203" pitchFamily="34" charset="0"/>
+            </a:endParaRPr>
+          </a:p>
+        </p:txBody>
+      </p:sp>
+    </p:spTree>
+    <p:extLst>
+      <p:ext uri="{BB962C8B-B14F-4D97-AF65-F5344CB8AC3E}">
+        <p14:creationId xmlns="" xmlns:p14="http://schemas.microsoft.com/office/powerpoint/2010/main" val="777954675"/>
+      </p:ext>
+    </p:extLst>
+  </p:cSld>
+  <p:clrMapOvr>
+    <a:masterClrMapping/>
+  </p:clrMapOvr>
+  <p:timing>
+    <p:tnLst>
+      <p:par>
+        <p:cTn id="1" dur="indefinite" restart="never" nodeType="tmRoot"/>
+      </p:par>
+    </p:tnLst>
+  </p:timing>
+</p:sld>
+</file>
+
+<file path=ppt/slides/slide12.xml><?xml version="1.0" encoding="utf-8"?>
+<p:sld xmlns:a="http://schemas.openxmlformats.org/drawingml/2006/main" xmlns:r="http://schemas.openxmlformats.org/officeDocument/2006/relationships" xmlns:p="http://schemas.openxmlformats.org/presentationml/2006/main">
+  <p:cSld>
+    <p:spTree>
+      <p:nvGrpSpPr>
+        <p:cNvPr id="1" name=""/>
+        <p:cNvGrpSpPr/>
+        <p:nvPr/>
+      </p:nvGrpSpPr>
+      <p:grpSpPr>
+        <a:xfrm>
+          <a:off x="0" y="0"/>
+          <a:ext cx="0" cy="0"/>
+          <a:chOff x="0" y="0"/>
+          <a:chExt cx="0" cy="0"/>
+        </a:xfrm>
+      </p:grpSpPr>
+      <p:sp>
+        <p:nvSpPr>
+          <p:cNvPr id="2" name="Title 1"/>
+          <p:cNvSpPr>
+            <a:spLocks noGrp="1"/>
+          </p:cNvSpPr>
+          <p:nvPr>
+            <p:ph type="title"/>
+          </p:nvPr>
+        </p:nvSpPr>
+        <p:spPr/>
+        <p:txBody>
+          <a:bodyPr/>
+          <a:lstStyle/>
+          <a:p>
+            <a:r>
+              <a:rPr lang="en-US" b="1" dirty="0" smtClean="0">
+                <a:solidFill>
+                  <a:schemeClr val="tx2">
+                    <a:lumMod val="75000"/>
+                  </a:schemeClr>
+                </a:solidFill>
+              </a:rPr>
+              <a:t>Utilities</a:t>
+            </a:r>
+            <a:endParaRPr lang="en-US" dirty="0">
+              <a:solidFill>
+                <a:schemeClr val="tx2">
+                  <a:lumMod val="75000"/>
+                </a:schemeClr>
+              </a:solidFill>
+            </a:endParaRPr>
+          </a:p>
+        </p:txBody>
+      </p:sp>
+      <p:sp>
+        <p:nvSpPr>
+          <p:cNvPr id="14" name="Content Placeholder 2"/>
+          <p:cNvSpPr>
+            <a:spLocks noGrp="1"/>
+          </p:cNvSpPr>
+          <p:nvPr>
+            <p:ph idx="1"/>
+          </p:nvPr>
+        </p:nvSpPr>
+        <p:spPr>
+          <a:xfrm>
+            <a:off x="838200" y="1825625"/>
+            <a:ext cx="5489028" cy="4351338"/>
+          </a:xfrm>
+        </p:spPr>
+        <p:txBody>
+          <a:bodyPr/>
+          <a:lstStyle/>
+          <a:p>
+            <a:r>
+              <a:rPr lang="en-GB" b="1" dirty="0" smtClean="0">
+                <a:latin typeface="Segoe UI" panose="020B0502040204020203" pitchFamily="34" charset="0"/>
+                <a:cs typeface="Segoe UI" panose="020B0502040204020203" pitchFamily="34" charset="0"/>
+              </a:rPr>
+              <a:t>Stage-2</a:t>
+            </a:r>
+            <a:r>
+              <a:rPr lang="en-GB" b="1" dirty="0" smtClean="0">
+                <a:latin typeface="Segoe UI" panose="020B0502040204020203" pitchFamily="34" charset="0"/>
+                <a:cs typeface="Segoe UI" panose="020B0502040204020203" pitchFamily="34" charset="0"/>
+              </a:rPr>
+              <a:t>:</a:t>
+            </a:r>
+            <a:r>
+              <a:rPr lang="en-GB" dirty="0" smtClean="0">
+                <a:latin typeface="Segoe UI" panose="020B0502040204020203" pitchFamily="34" charset="0"/>
+                <a:cs typeface="Segoe UI" panose="020B0502040204020203" pitchFamily="34" charset="0"/>
+              </a:rPr>
+              <a:t> Applying Nelson </a:t>
+            </a:r>
+            <a:r>
+              <a:rPr lang="en-GB" dirty="0" smtClean="0">
+                <a:latin typeface="Segoe UI" panose="020B0502040204020203" pitchFamily="34" charset="0"/>
+                <a:cs typeface="Segoe UI" panose="020B0502040204020203" pitchFamily="34" charset="0"/>
+              </a:rPr>
+              <a:t>rules </a:t>
+            </a:r>
+            <a:r>
+              <a:rPr lang="en-GB" dirty="0" smtClean="0">
+                <a:solidFill>
+                  <a:srgbClr val="C00000"/>
+                </a:solidFill>
+                <a:latin typeface="Segoe UI" panose="020B0502040204020203" pitchFamily="34" charset="0"/>
+                <a:cs typeface="Segoe UI" panose="020B0502040204020203" pitchFamily="34" charset="0"/>
+              </a:rPr>
+              <a:t>(Under development)</a:t>
+            </a:r>
+          </a:p>
+          <a:p>
+            <a:r>
+              <a:rPr lang="en-GB" dirty="0" smtClean="0">
+                <a:latin typeface="Segoe UI" panose="020B0502040204020203" pitchFamily="34" charset="0"/>
+                <a:cs typeface="Segoe UI" panose="020B0502040204020203" pitchFamily="34" charset="0"/>
+              </a:rPr>
+              <a:t>Like in JMP, one can write custom script to generate plots out of data (in any format).</a:t>
+            </a:r>
+          </a:p>
+          <a:p>
+            <a:r>
+              <a:rPr lang="en-GB" dirty="0" smtClean="0">
+                <a:latin typeface="Segoe UI" panose="020B0502040204020203" pitchFamily="34" charset="0"/>
+                <a:cs typeface="Segoe UI" panose="020B0502040204020203" pitchFamily="34" charset="0"/>
+              </a:rPr>
+              <a:t>Various types of plots can be created – Line, Scatter, Box, </a:t>
+            </a:r>
+            <a:r>
+              <a:rPr lang="en-GB" dirty="0" err="1" smtClean="0">
+                <a:latin typeface="Segoe UI" panose="020B0502040204020203" pitchFamily="34" charset="0"/>
+                <a:cs typeface="Segoe UI" panose="020B0502040204020203" pitchFamily="34" charset="0"/>
+              </a:rPr>
+              <a:t>Qiver</a:t>
+            </a:r>
+            <a:r>
+              <a:rPr lang="en-GB" dirty="0" smtClean="0">
+                <a:latin typeface="Segoe UI" panose="020B0502040204020203" pitchFamily="34" charset="0"/>
+                <a:cs typeface="Segoe UI" panose="020B0502040204020203" pitchFamily="34" charset="0"/>
+              </a:rPr>
+              <a:t>, Contour (2-D, 3-D), </a:t>
+            </a:r>
+            <a:r>
+              <a:rPr lang="en-GB" dirty="0" err="1" smtClean="0">
+                <a:latin typeface="Segoe UI" panose="020B0502040204020203" pitchFamily="34" charset="0"/>
+                <a:cs typeface="Segoe UI" panose="020B0502040204020203" pitchFamily="34" charset="0"/>
+              </a:rPr>
+              <a:t>Heatmap</a:t>
+            </a:r>
+            <a:r>
+              <a:rPr lang="en-GB" dirty="0" smtClean="0">
+                <a:latin typeface="Segoe UI" panose="020B0502040204020203" pitchFamily="34" charset="0"/>
+                <a:cs typeface="Segoe UI" panose="020B0502040204020203" pitchFamily="34" charset="0"/>
+              </a:rPr>
+              <a:t>, </a:t>
+            </a:r>
+            <a:endParaRPr lang="en-US" dirty="0" smtClean="0">
+              <a:latin typeface="Segoe UI" panose="020B0502040204020203" pitchFamily="34" charset="0"/>
+              <a:cs typeface="Segoe UI" panose="020B0502040204020203" pitchFamily="34" charset="0"/>
+            </a:endParaRPr>
+          </a:p>
+        </p:txBody>
+      </p:sp>
+      <p:pic>
+        <p:nvPicPr>
+          <p:cNvPr id="2050" name="Picture 2" descr="I:\github_repos\AutoPlot\sessions\1\res\Nelson-rules_1.jpg"/>
+          <p:cNvPicPr>
+            <a:picLocks noChangeAspect="1" noChangeArrowheads="1"/>
+          </p:cNvPicPr>
+          <p:nvPr/>
+        </p:nvPicPr>
+        <p:blipFill>
+          <a:blip r:embed="rId2" cstate="print"/>
+          <a:srcRect/>
+          <a:stretch>
+            <a:fillRect/>
+          </a:stretch>
+        </p:blipFill>
+        <p:spPr bwMode="auto">
+          <a:xfrm>
+            <a:off x="6822489" y="1573161"/>
+            <a:ext cx="4566739" cy="4724400"/>
+          </a:xfrm>
+          <a:prstGeom prst="rect">
+            <a:avLst/>
+          </a:prstGeom>
+          <a:solidFill>
+            <a:srgbClr val="FFFFFF">
+              <a:shade val="85000"/>
+            </a:srgbClr>
+          </a:solidFill>
+          <a:ln w="88900" cap="sq">
+            <a:solidFill>
+              <a:srgbClr val="FFFFFF"/>
+            </a:solidFill>
+            <a:miter lim="800000"/>
+          </a:ln>
+          <a:effectLst>
+            <a:outerShdw blurRad="55000" dist="18000" dir="5400000" algn="tl" rotWithShape="0">
+              <a:srgbClr val="000000">
+                <a:alpha val="40000"/>
+              </a:srgbClr>
+            </a:outerShdw>
+          </a:effectLst>
+          <a:scene3d>
+            <a:camera prst="orthographicFront"/>
+            <a:lightRig rig="twoPt" dir="t">
+              <a:rot lat="0" lon="0" rev="7200000"/>
+            </a:lightRig>
+          </a:scene3d>
+          <a:sp3d>
+            <a:bevelT w="25400" h="19050"/>
+            <a:contourClr>
+              <a:srgbClr val="FFFFFF"/>
+            </a:contourClr>
+          </a:sp3d>
+        </p:spPr>
+      </p:pic>
+    </p:spTree>
+    <p:extLst>
+      <p:ext uri="{BB962C8B-B14F-4D97-AF65-F5344CB8AC3E}">
+        <p14:creationId xmlns="" xmlns:p14="http://schemas.microsoft.com/office/powerpoint/2010/main" val="777954675"/>
       </p:ext>
     </p:extLst>
   </p:cSld>
@@ -3132,6 +3967,21 @@
 <file path=ppt/slides/slide2.xml><?xml version="1.0" encoding="utf-8"?>
 <p:sld xmlns:a="http://schemas.openxmlformats.org/drawingml/2006/main" xmlns:r="http://schemas.openxmlformats.org/officeDocument/2006/relationships" xmlns:p="http://schemas.openxmlformats.org/presentationml/2006/main">
   <p:cSld>
+    <p:bg>
+      <p:bgPr>
+        <a:blipFill dpi="0" rotWithShape="1">
+          <a:blip r:embed="rId2" cstate="print">
+            <a:alphaModFix amt="20000"/>
+            <a:lum/>
+          </a:blip>
+          <a:srcRect/>
+          <a:stretch>
+            <a:fillRect t="-13000" b="-13000"/>
+          </a:stretch>
+        </a:blipFill>
+        <a:effectLst/>
+      </p:bgPr>
+    </p:bg>
     <p:spTree>
       <p:nvGrpSpPr>
         <p:cNvPr id="1" name=""/>
@@ -3249,11 +4099,7 @@
                 <a:latin typeface="Segoe UI" panose="020B0502040204020203" pitchFamily="34" charset="0"/>
                 <a:cs typeface="Segoe UI" panose="020B0502040204020203" pitchFamily="34" charset="0"/>
               </a:rPr>
-              <a:t>., W</a:t>
-            </a:r>
-            <a:r>
-              <a:rPr lang="en-US" dirty="0"/>
-              <a:t>E</a:t>
+              <a:t>., WE</a:t>
             </a:r>
             <a:endParaRPr lang="en-US" dirty="0" smtClean="0"/>
           </a:p>
@@ -3261,6 +4107,12 @@
             <a:r>
               <a:rPr lang="en-US" dirty="0" smtClean="0"/>
               <a:t>Scripting/Coding</a:t>
+            </a:r>
+          </a:p>
+          <a:p>
+            <a:r>
+              <a:rPr lang="en-GB" smtClean="0"/>
+              <a:t>Conclusion</a:t>
             </a:r>
             <a:endParaRPr lang="en-US" dirty="0"/>
           </a:p>
@@ -3269,7 +4121,7 @@
     </p:spTree>
     <p:extLst>
       <p:ext uri="{BB962C8B-B14F-4D97-AF65-F5344CB8AC3E}">
-        <p14:creationId xmlns:p14="http://schemas.microsoft.com/office/powerpoint/2010/main" val="703350114"/>
+        <p14:creationId xmlns="" xmlns:p14="http://schemas.microsoft.com/office/powerpoint/2010/main" val="703350114"/>
       </p:ext>
     </p:extLst>
   </p:cSld>
@@ -3353,6 +4205,14 @@
           <a:bodyPr/>
           <a:lstStyle/>
           <a:p>
+            <a:r>
+              <a:rPr lang="en-GB" b="1" dirty="0" smtClean="0"/>
+              <a:t>AutoPlot</a:t>
+            </a:r>
+            <a:r>
+              <a:rPr lang="en-GB" dirty="0" smtClean="0"/>
+              <a:t> is an Indigenous Software created for generating plots automatically from the data (especially QC) maintained in all the sections of VFD.</a:t>
+            </a:r>
             <a:endParaRPr lang="en-US" dirty="0" smtClean="0">
               <a:latin typeface="Segoe UI" panose="020B0502040204020203" pitchFamily="34" charset="0"/>
               <a:cs typeface="Segoe UI" panose="020B0502040204020203" pitchFamily="34" charset="0"/>
@@ -3363,7 +4223,7 @@
     </p:spTree>
     <p:extLst>
       <p:ext uri="{BB962C8B-B14F-4D97-AF65-F5344CB8AC3E}">
-        <p14:creationId xmlns:p14="http://schemas.microsoft.com/office/powerpoint/2010/main" val="2153926227"/>
+        <p14:creationId xmlns="" xmlns:p14="http://schemas.microsoft.com/office/powerpoint/2010/main" val="2153926227"/>
       </p:ext>
     </p:extLst>
   </p:cSld>
@@ -3447,6 +4307,36 @@
           <a:bodyPr/>
           <a:lstStyle/>
           <a:p>
+            <a:r>
+              <a:rPr lang="en-GB" dirty="0" smtClean="0"/>
+              <a:t>In order to generate Plots for QC data (maintained in Excel), currently we drag each parameter (like Date, Control limits, Spec limits, Etch Rate/Thickness/CP, etc.) manually to create/update the charts. And this consumes a good amount of valuable time in Engineer's data analysis job.</a:t>
+            </a:r>
+          </a:p>
+          <a:p>
+            <a:r>
+              <a:rPr lang="en-GB" dirty="0" smtClean="0"/>
+              <a:t>In some sections, they are dependent on plots created in DMIS, which is not that satisfactory as it doesn't contain </a:t>
+            </a:r>
+            <a:r>
+              <a:rPr lang="en-GB" b="1" dirty="0" smtClean="0"/>
+              <a:t>'Remarks'</a:t>
+            </a:r>
+            <a:r>
+              <a:rPr lang="en-GB" dirty="0" smtClean="0"/>
+              <a:t> column feature and more.</a:t>
+            </a:r>
+          </a:p>
+          <a:p>
+            <a:pPr>
+              <a:buNone/>
+            </a:pPr>
+            <a:r>
+              <a:rPr lang="en-GB" dirty="0" smtClean="0"/>
+              <a:t/>
+            </a:r>
+            <a:br>
+              <a:rPr lang="en-GB" dirty="0" smtClean="0"/>
+            </a:br>
             <a:endParaRPr lang="en-US" dirty="0" smtClean="0">
               <a:latin typeface="Segoe UI" panose="020B0502040204020203" pitchFamily="34" charset="0"/>
               <a:cs typeface="Segoe UI" panose="020B0502040204020203" pitchFamily="34" charset="0"/>
@@ -3457,7 +4347,7 @@
     </p:spTree>
     <p:extLst>
       <p:ext uri="{BB962C8B-B14F-4D97-AF65-F5344CB8AC3E}">
-        <p14:creationId xmlns:p14="http://schemas.microsoft.com/office/powerpoint/2010/main" val="1835708266"/>
+        <p14:creationId xmlns="" xmlns:p14="http://schemas.microsoft.com/office/powerpoint/2010/main" val="1835708266"/>
       </p:ext>
     </p:extLst>
   </p:cSld>
@@ -3514,19 +4404,9 @@
                   </a:schemeClr>
                 </a:solidFill>
               </a:rPr>
-              <a:t>Demo: </a:t>
-            </a:r>
-            <a:r>
-              <a:rPr lang="en-US" dirty="0" smtClean="0">
-                <a:solidFill>
-                  <a:schemeClr val="tx2">
-                    <a:lumMod val="75000"/>
-                  </a:schemeClr>
-                </a:solidFill>
-              </a:rPr>
-              <a:t>Dry Etch</a:t>
-            </a:r>
-            <a:endParaRPr lang="en-US" dirty="0">
+              <a:t>Features</a:t>
+            </a:r>
+            <a:endParaRPr lang="en-US" b="1" dirty="0">
               <a:solidFill>
                 <a:schemeClr val="tx2">
                   <a:lumMod val="75000"/>
@@ -3546,12 +4426,264 @@
             <p:ph idx="1"/>
           </p:nvPr>
         </p:nvSpPr>
-        <p:spPr/>
-        <p:txBody>
-          <a:bodyPr/>
-          <a:lstStyle/>
-          <a:p>
-            <a:endParaRPr lang="en-US" dirty="0" smtClean="0">
+        <p:spPr>
+          <a:xfrm>
+            <a:off x="630622" y="1397876"/>
+            <a:ext cx="10815144" cy="4918841"/>
+          </a:xfrm>
+        </p:spPr>
+        <p:txBody>
+          <a:bodyPr>
+            <a:noAutofit/>
+          </a:bodyPr>
+          <a:lstStyle/>
+          <a:p>
+            <a:pPr>
+              <a:lnSpc>
+                <a:spcPct val="100000"/>
+              </a:lnSpc>
+            </a:pPr>
+            <a:r>
+              <a:rPr lang="en-GB" sz="2000" dirty="0" smtClean="0"/>
+              <a:t>It has 3 operation modes =&gt;  </a:t>
+            </a:r>
+            <a:r>
+              <a:rPr lang="en-GB" sz="2000" dirty="0" smtClean="0">
+                <a:solidFill>
+                  <a:srgbClr val="C00000"/>
+                </a:solidFill>
+              </a:rPr>
+              <a:t>Button</a:t>
+            </a:r>
+            <a:r>
+              <a:rPr lang="en-GB" sz="2000" dirty="0" smtClean="0"/>
+              <a:t>, </a:t>
+            </a:r>
+            <a:r>
+              <a:rPr lang="en-GB" sz="2000" dirty="0" smtClean="0">
+                <a:solidFill>
+                  <a:srgbClr val="C00000"/>
+                </a:solidFill>
+              </a:rPr>
+              <a:t>Shell</a:t>
+            </a:r>
+            <a:r>
+              <a:rPr lang="en-GB" sz="2000" dirty="0" smtClean="0"/>
+              <a:t> &amp; </a:t>
+            </a:r>
+            <a:r>
+              <a:rPr lang="en-GB" sz="2000" dirty="0" smtClean="0">
+                <a:solidFill>
+                  <a:srgbClr val="C00000"/>
+                </a:solidFill>
+              </a:rPr>
+              <a:t>Auto</a:t>
+            </a:r>
+            <a:r>
+              <a:rPr lang="en-GB" sz="2000" dirty="0" smtClean="0"/>
+              <a:t>.</a:t>
+            </a:r>
+          </a:p>
+          <a:p>
+            <a:pPr>
+              <a:lnSpc>
+                <a:spcPct val="100000"/>
+              </a:lnSpc>
+            </a:pPr>
+            <a:r>
+              <a:rPr lang="en-GB" sz="2000" dirty="0" smtClean="0"/>
+              <a:t>It shows the </a:t>
+            </a:r>
+            <a:r>
+              <a:rPr lang="en-GB" sz="2000" b="1" dirty="0" smtClean="0"/>
+              <a:t>'Remarks'</a:t>
+            </a:r>
+            <a:r>
+              <a:rPr lang="en-GB" sz="2000" dirty="0" smtClean="0"/>
+              <a:t> column while hovering on the data points in the Plot.</a:t>
+            </a:r>
+          </a:p>
+          <a:p>
+            <a:pPr>
+              <a:lnSpc>
+                <a:spcPct val="100000"/>
+              </a:lnSpc>
+            </a:pPr>
+            <a:r>
+              <a:rPr lang="en-GB" sz="2000" dirty="0" smtClean="0"/>
+              <a:t>It is very </a:t>
+            </a:r>
+            <a:r>
+              <a:rPr lang="en-GB" sz="2000" i="1" dirty="0" smtClean="0"/>
+              <a:t>Interactive</a:t>
+            </a:r>
+            <a:r>
+              <a:rPr lang="en-GB" sz="2000" dirty="0" smtClean="0"/>
+              <a:t> (zoom-in/out) and is quite </a:t>
+            </a:r>
+            <a:r>
+              <a:rPr lang="en-GB" sz="2000" i="1" dirty="0" smtClean="0"/>
+              <a:t>Modern</a:t>
+            </a:r>
+            <a:r>
+              <a:rPr lang="en-GB" sz="2000" dirty="0" smtClean="0"/>
+              <a:t>.</a:t>
+            </a:r>
+          </a:p>
+          <a:p>
+            <a:pPr>
+              <a:lnSpc>
+                <a:spcPct val="100000"/>
+              </a:lnSpc>
+            </a:pPr>
+            <a:r>
+              <a:rPr lang="en-GB" sz="2000" dirty="0" smtClean="0"/>
+              <a:t>A button is built-in within, for saving the plot's snapshot and can be attached in PPTs, Mail, etc.</a:t>
+            </a:r>
+          </a:p>
+          <a:p>
+            <a:pPr>
+              <a:lnSpc>
+                <a:spcPct val="100000"/>
+              </a:lnSpc>
+            </a:pPr>
+            <a:r>
+              <a:rPr lang="en-GB" sz="2000" dirty="0" smtClean="0"/>
+              <a:t>FYI, the entire codebase is written in Python, Bash (for automation) programming languages.</a:t>
+            </a:r>
+          </a:p>
+          <a:p>
+            <a:pPr>
+              <a:lnSpc>
+                <a:spcPct val="100000"/>
+              </a:lnSpc>
+            </a:pPr>
+            <a:r>
+              <a:rPr lang="en-GB" sz="2000" dirty="0" smtClean="0"/>
+              <a:t>There is no need of learning a programming language. All the modules/functions will be provided in form of packages and hence can be applied (with little parameter tweaks) for any form of data (in CSV, Excel).</a:t>
+            </a:r>
+          </a:p>
+          <a:p>
+            <a:pPr>
+              <a:lnSpc>
+                <a:spcPct val="100000"/>
+              </a:lnSpc>
+            </a:pPr>
+            <a:r>
+              <a:rPr lang="en-GB" sz="2000" b="1" dirty="0" err="1" smtClean="0">
+                <a:solidFill>
+                  <a:srgbClr val="7030A0"/>
+                </a:solidFill>
+              </a:rPr>
+              <a:t>ViEW</a:t>
+            </a:r>
+            <a:r>
+              <a:rPr lang="en-GB" sz="2000" dirty="0" smtClean="0"/>
+              <a:t> </a:t>
+            </a:r>
+            <a:r>
+              <a:rPr lang="en-GB" sz="2000" dirty="0" smtClean="0"/>
+              <a:t>(another </a:t>
+            </a:r>
+            <a:r>
+              <a:rPr lang="en-GB" sz="2000" dirty="0" smtClean="0"/>
+              <a:t>Indigenous Software) is also integrable with </a:t>
+            </a:r>
+            <a:r>
+              <a:rPr lang="en-GB" sz="2000" b="1" dirty="0" smtClean="0">
+                <a:solidFill>
+                  <a:schemeClr val="accent6">
+                    <a:lumMod val="75000"/>
+                  </a:schemeClr>
+                </a:solidFill>
+              </a:rPr>
+              <a:t>AutoPlot</a:t>
+            </a:r>
+            <a:r>
+              <a:rPr lang="en-GB" sz="2000" dirty="0" smtClean="0"/>
+              <a:t> for adding </a:t>
+            </a:r>
+            <a:r>
+              <a:rPr lang="en-GB" sz="2000" b="1" dirty="0" smtClean="0"/>
+              <a:t>"Version Control" </a:t>
+            </a:r>
+            <a:r>
+              <a:rPr lang="en-GB" sz="2000" dirty="0" smtClean="0"/>
+              <a:t>feature to the Codebase, Excel, Word, Image (or any other format) files. </a:t>
+            </a:r>
+            <a:br>
+              <a:rPr lang="en-GB" sz="2000" dirty="0" smtClean="0"/>
+            </a:br>
+            <a:r>
+              <a:rPr lang="en-GB" sz="2000" dirty="0" smtClean="0"/>
+              <a:t>Here, </a:t>
+            </a:r>
+            <a:r>
+              <a:rPr lang="en-GB" sz="2000" b="1" dirty="0" smtClean="0">
+                <a:solidFill>
+                  <a:srgbClr val="7030A0"/>
+                </a:solidFill>
+              </a:rPr>
+              <a:t> </a:t>
+            </a:r>
+            <a:r>
+              <a:rPr lang="en-GB" sz="2000" b="1" dirty="0" err="1" smtClean="0">
+                <a:solidFill>
+                  <a:srgbClr val="7030A0"/>
+                </a:solidFill>
+              </a:rPr>
+              <a:t>ViEW</a:t>
+            </a:r>
+            <a:r>
+              <a:rPr lang="en-GB" sz="2000" dirty="0" smtClean="0"/>
+              <a:t> acts as the foundation layer for </a:t>
+            </a:r>
+            <a:r>
+              <a:rPr lang="en-GB" sz="2000" b="1" dirty="0" smtClean="0">
+                <a:solidFill>
+                  <a:schemeClr val="accent6">
+                    <a:lumMod val="75000"/>
+                  </a:schemeClr>
+                </a:solidFill>
+              </a:rPr>
+              <a:t>AutoPlot</a:t>
+            </a:r>
+            <a:r>
+              <a:rPr lang="en-GB" sz="2000" dirty="0" smtClean="0"/>
+              <a:t>.</a:t>
+            </a:r>
+          </a:p>
+          <a:p>
+            <a:pPr>
+              <a:lnSpc>
+                <a:spcPct val="100000"/>
+              </a:lnSpc>
+            </a:pPr>
+            <a:r>
+              <a:rPr lang="en-GB" sz="2000" dirty="0" smtClean="0"/>
+              <a:t>It can also be used in applications where JMP software is normally preferred, here in SCL. In this, there are separate modules/functions which can replace the scripts written in </a:t>
+            </a:r>
+            <a:r>
+              <a:rPr lang="en-GB" sz="2000" b="1" dirty="0" smtClean="0"/>
+              <a:t>JMP Scripting Language (JSL</a:t>
+            </a:r>
+            <a:r>
+              <a:rPr lang="en-GB" sz="2000" b="1" dirty="0" smtClean="0"/>
+              <a:t>)</a:t>
+            </a:r>
+            <a:r>
+              <a:rPr lang="en-GB" sz="2000" dirty="0" smtClean="0"/>
+              <a:t>.</a:t>
+            </a:r>
+            <a:endParaRPr lang="en-GB" sz="2000" dirty="0" smtClean="0"/>
+          </a:p>
+          <a:p>
+            <a:pPr>
+              <a:lnSpc>
+                <a:spcPct val="100000"/>
+              </a:lnSpc>
+            </a:pPr>
+            <a:endParaRPr lang="en-US" sz="1600" dirty="0" smtClean="0">
               <a:latin typeface="Segoe UI" panose="020B0502040204020203" pitchFamily="34" charset="0"/>
               <a:cs typeface="Segoe UI" panose="020B0502040204020203" pitchFamily="34" charset="0"/>
             </a:endParaRPr>
@@ -3561,7 +4693,7 @@
     </p:spTree>
     <p:extLst>
       <p:ext uri="{BB962C8B-B14F-4D97-AF65-F5344CB8AC3E}">
-        <p14:creationId xmlns:p14="http://schemas.microsoft.com/office/powerpoint/2010/main" val="3924351243"/>
+        <p14:creationId xmlns="" xmlns:p14="http://schemas.microsoft.com/office/powerpoint/2010/main" val="1835708266"/>
       </p:ext>
     </p:extLst>
   </p:cSld>
@@ -3618,19 +4750,9 @@
                   </a:schemeClr>
                 </a:solidFill>
               </a:rPr>
-              <a:t>Demo: </a:t>
-            </a:r>
-            <a:r>
-              <a:rPr lang="en-US" dirty="0" smtClean="0">
-                <a:solidFill>
-                  <a:schemeClr val="tx2">
-                    <a:lumMod val="75000"/>
-                  </a:schemeClr>
-                </a:solidFill>
-              </a:rPr>
-              <a:t>Diffusion</a:t>
-            </a:r>
-            <a:endParaRPr lang="en-US" dirty="0">
+              <a:t>Testing</a:t>
+            </a:r>
+            <a:endParaRPr lang="en-US" b="1" dirty="0">
               <a:solidFill>
                 <a:schemeClr val="tx2">
                   <a:lumMod val="75000"/>
@@ -3652,8 +4774,64 @@
         </p:nvSpPr>
         <p:spPr/>
         <p:txBody>
-          <a:bodyPr/>
-          <a:lstStyle/>
+          <a:bodyPr>
+            <a:normAutofit/>
+          </a:bodyPr>
+          <a:lstStyle/>
+          <a:p>
+            <a:r>
+              <a:rPr lang="en-GB" dirty="0" smtClean="0"/>
+              <a:t>Fully implemented in </a:t>
+            </a:r>
+            <a:r>
+              <a:rPr lang="en-GB" b="1" dirty="0" smtClean="0"/>
+              <a:t>DRY ETCH </a:t>
+            </a:r>
+            <a:r>
+              <a:rPr lang="en-GB" dirty="0" smtClean="0"/>
+              <a:t>and successfully tested for </a:t>
+            </a:r>
+            <a:r>
+              <a:rPr lang="en-GB" dirty="0" smtClean="0"/>
+              <a:t>5 </a:t>
+            </a:r>
+            <a:r>
+              <a:rPr lang="en-GB" dirty="0" smtClean="0"/>
+              <a:t>weeks now.</a:t>
+            </a:r>
+          </a:p>
+          <a:p>
+            <a:r>
+              <a:rPr lang="en-GB" dirty="0" smtClean="0"/>
+              <a:t>A sample QC data of PRS01 Equipment, </a:t>
+            </a:r>
+            <a:r>
+              <a:rPr lang="en-GB" b="1" dirty="0" smtClean="0"/>
+              <a:t>WET ETCH </a:t>
+            </a:r>
+            <a:r>
+              <a:rPr lang="en-GB" dirty="0" smtClean="0"/>
+              <a:t>has also been successfully tested as well.</a:t>
+            </a:r>
+          </a:p>
+          <a:p>
+            <a:r>
+              <a:rPr lang="en-GB" dirty="0" smtClean="0"/>
+              <a:t>A sample QC data of FRST1 Equipment, </a:t>
+            </a:r>
+            <a:r>
+              <a:rPr lang="en-GB" b="1" dirty="0" smtClean="0"/>
+              <a:t>DIFFUSION</a:t>
+            </a:r>
+            <a:r>
+              <a:rPr lang="en-GB" dirty="0" smtClean="0"/>
+              <a:t> has also been successfully tested as well.</a:t>
+            </a:r>
+            <a:br>
+              <a:rPr lang="en-GB" dirty="0" smtClean="0"/>
+            </a:br>
+            <a:endParaRPr lang="en-GB" dirty="0" smtClean="0"/>
+          </a:p>
           <a:p>
             <a:endParaRPr lang="en-US" dirty="0" smtClean="0">
               <a:latin typeface="Segoe UI" panose="020B0502040204020203" pitchFamily="34" charset="0"/>
@@ -3665,7 +4843,7 @@
     </p:spTree>
     <p:extLst>
       <p:ext uri="{BB962C8B-B14F-4D97-AF65-F5344CB8AC3E}">
-        <p14:creationId xmlns:p14="http://schemas.microsoft.com/office/powerpoint/2010/main" val="3390085284"/>
+        <p14:creationId xmlns="" xmlns:p14="http://schemas.microsoft.com/office/powerpoint/2010/main" val="1835708266"/>
       </p:ext>
     </p:extLst>
   </p:cSld>
@@ -3732,7 +4910,7 @@
                   </a:schemeClr>
                 </a:solidFill>
               </a:rPr>
-              <a:t>Wet Etch</a:t>
+              <a:t>Dry Etch</a:t>
             </a:r>
             <a:endParaRPr lang="en-US" dirty="0">
               <a:solidFill>
@@ -3769,7 +4947,7 @@
     </p:spTree>
     <p:extLst>
       <p:ext uri="{BB962C8B-B14F-4D97-AF65-F5344CB8AC3E}">
-        <p14:creationId xmlns:p14="http://schemas.microsoft.com/office/powerpoint/2010/main" val="584440453"/>
+        <p14:creationId xmlns="" xmlns:p14="http://schemas.microsoft.com/office/powerpoint/2010/main" val="3924351243"/>
       </p:ext>
     </p:extLst>
   </p:cSld>
@@ -3789,21 +4967,6 @@
 <file path=ppt/slides/slide8.xml><?xml version="1.0" encoding="utf-8"?>
 <p:sld xmlns:a="http://schemas.openxmlformats.org/drawingml/2006/main" xmlns:r="http://schemas.openxmlformats.org/officeDocument/2006/relationships" xmlns:p="http://schemas.openxmlformats.org/presentationml/2006/main">
   <p:cSld>
-    <p:bg>
-      <p:bgPr>
-        <a:blipFill dpi="0" rotWithShape="1">
-          <a:blip r:embed="rId2">
-            <a:alphaModFix amt="25000"/>
-            <a:lum/>
-          </a:blip>
-          <a:srcRect/>
-          <a:stretch>
-            <a:fillRect l="-3000" r="-3000"/>
-          </a:stretch>
-        </a:blipFill>
-        <a:effectLst/>
-      </p:bgPr>
-    </p:bg>
     <p:spTree>
       <p:nvGrpSpPr>
         <p:cNvPr id="1" name=""/>
@@ -3841,7 +5004,17 @@
                   </a:schemeClr>
                 </a:solidFill>
               </a:rPr>
-              <a:t>Scripting/Coding</a:t>
+              <a:t>Demo: </a:t>
+            </a:r>
+            <a:r>
+              <a:rPr lang="en-US" dirty="0" smtClean="0">
+                <a:solidFill>
+                  <a:schemeClr val="tx2">
+                    <a:lumMod val="75000"/>
+                  </a:schemeClr>
+                </a:solidFill>
+              </a:rPr>
+              <a:t>Diffusion</a:t>
             </a:r>
             <a:endParaRPr lang="en-US" dirty="0">
               <a:solidFill>
@@ -3878,7 +5051,111 @@
     </p:spTree>
     <p:extLst>
       <p:ext uri="{BB962C8B-B14F-4D97-AF65-F5344CB8AC3E}">
-        <p14:creationId xmlns:p14="http://schemas.microsoft.com/office/powerpoint/2010/main" val="777954675"/>
+        <p14:creationId xmlns="" xmlns:p14="http://schemas.microsoft.com/office/powerpoint/2010/main" val="3390085284"/>
+      </p:ext>
+    </p:extLst>
+  </p:cSld>
+  <p:clrMapOvr>
+    <a:masterClrMapping/>
+  </p:clrMapOvr>
+  <p:timing>
+    <p:tnLst>
+      <p:par>
+        <p:cTn id="1" dur="indefinite" restart="never" nodeType="tmRoot"/>
+      </p:par>
+    </p:tnLst>
+  </p:timing>
+</p:sld>
+</file>
+
+<file path=ppt/slides/slide9.xml><?xml version="1.0" encoding="utf-8"?>
+<p:sld xmlns:a="http://schemas.openxmlformats.org/drawingml/2006/main" xmlns:r="http://schemas.openxmlformats.org/officeDocument/2006/relationships" xmlns:p="http://schemas.openxmlformats.org/presentationml/2006/main">
+  <p:cSld>
+    <p:spTree>
+      <p:nvGrpSpPr>
+        <p:cNvPr id="1" name=""/>
+        <p:cNvGrpSpPr/>
+        <p:nvPr/>
+      </p:nvGrpSpPr>
+      <p:grpSpPr>
+        <a:xfrm>
+          <a:off x="0" y="0"/>
+          <a:ext cx="0" cy="0"/>
+          <a:chOff x="0" y="0"/>
+          <a:chExt cx="0" cy="0"/>
+        </a:xfrm>
+      </p:grpSpPr>
+      <p:sp>
+        <p:nvSpPr>
+          <p:cNvPr id="2" name="Title 1"/>
+          <p:cNvSpPr>
+            <a:spLocks noGrp="1"/>
+          </p:cNvSpPr>
+          <p:nvPr>
+            <p:ph type="title"/>
+          </p:nvPr>
+        </p:nvSpPr>
+        <p:spPr/>
+        <p:txBody>
+          <a:bodyPr/>
+          <a:lstStyle/>
+          <a:p>
+            <a:r>
+              <a:rPr lang="en-US" b="1" dirty="0" smtClean="0">
+                <a:solidFill>
+                  <a:schemeClr val="tx2">
+                    <a:lumMod val="75000"/>
+                  </a:schemeClr>
+                </a:solidFill>
+              </a:rPr>
+              <a:t>Demo: </a:t>
+            </a:r>
+            <a:r>
+              <a:rPr lang="en-US" dirty="0" smtClean="0">
+                <a:solidFill>
+                  <a:schemeClr val="tx2">
+                    <a:lumMod val="75000"/>
+                  </a:schemeClr>
+                </a:solidFill>
+              </a:rPr>
+              <a:t>Wet Etch</a:t>
+            </a:r>
+            <a:endParaRPr lang="en-US" dirty="0">
+              <a:solidFill>
+                <a:schemeClr val="tx2">
+                  <a:lumMod val="75000"/>
+                </a:schemeClr>
+              </a:solidFill>
+            </a:endParaRPr>
+          </a:p>
+        </p:txBody>
+      </p:sp>
+      <p:sp>
+        <p:nvSpPr>
+          <p:cNvPr id="3" name="Content Placeholder 2"/>
+          <p:cNvSpPr>
+            <a:spLocks noGrp="1"/>
+          </p:cNvSpPr>
+          <p:nvPr>
+            <p:ph idx="1"/>
+          </p:nvPr>
+        </p:nvSpPr>
+        <p:spPr/>
+        <p:txBody>
+          <a:bodyPr/>
+          <a:lstStyle/>
+          <a:p>
+            <a:endParaRPr lang="en-US" dirty="0" smtClean="0">
+              <a:latin typeface="Segoe UI" panose="020B0502040204020203" pitchFamily="34" charset="0"/>
+              <a:cs typeface="Segoe UI" panose="020B0502040204020203" pitchFamily="34" charset="0"/>
+            </a:endParaRPr>
+          </a:p>
+        </p:txBody>
+      </p:sp>
+    </p:spTree>
+    <p:extLst>
+      <p:ext uri="{BB962C8B-B14F-4D97-AF65-F5344CB8AC3E}">
+        <p14:creationId xmlns="" xmlns:p14="http://schemas.microsoft.com/office/powerpoint/2010/main" val="584440453"/>
       </p:ext>
     </p:extLst>
   </p:cSld>
@@ -3938,7 +5215,7 @@
     </a:clrScheme>
     <a:fontScheme name="Office">
       <a:majorFont>
-        <a:latin typeface="Calibri Light" panose="020F0302020204030204"/>
+        <a:latin typeface="Calibri Light"/>
         <a:ea typeface=""/>
         <a:cs typeface=""/>
         <a:font script="Jpan" typeface="ＭＳ Ｐゴシック"/>
@@ -3973,7 +5250,7 @@
         <a:font script="Geor" typeface="Sylfaen"/>
       </a:majorFont>
       <a:minorFont>
-        <a:latin typeface="Calibri" panose="020F0502020204030204"/>
+        <a:latin typeface="Calibri"/>
         <a:ea typeface=""/>
         <a:cs typeface=""/>
         <a:font script="Jpan" typeface="ＭＳ Ｐゴシック"/>
@@ -4150,7 +5427,7 @@
   <a:extraClrSchemeLst/>
   <a:extLst>
     <a:ext uri="{05A4C25C-085E-4340-85A3-A5531E510DB2}">
-      <thm15:themeFamily xmlns:thm15="http://schemas.microsoft.com/office/thememl/2012/main" name="Office Theme" id="{62F939B6-93AF-4DB8-9C6B-D6C7DFDC589F}" vid="{4A3C46E8-61CC-4603-A589-7422A47A8E4A}"/>
+      <thm15:themeFamily xmlns="" xmlns:thm15="http://schemas.microsoft.com/office/thememl/2012/main" name="Office Theme" id="{62F939B6-93AF-4DB8-9C6B-D6C7DFDC589F}" vid="{4A3C46E8-61CC-4603-A589-7422A47A8E4A}"/>
     </a:ext>
   </a:extLst>
 </a:theme>

</xml_diff>

<commit_message>
snippet images added for PPT
</commit_message>
<xml_diff>
--- a/sessions/1/AutoPlot_session_1.pptx
+++ b/sessions/1/AutoPlot_session_1.pptx
@@ -16,7 +16,12 @@
     <p:sldId id="263" r:id="rId10"/>
     <p:sldId id="264" r:id="rId11"/>
     <p:sldId id="268" r:id="rId12"/>
-    <p:sldId id="267" r:id="rId13"/>
+    <p:sldId id="270" r:id="rId13"/>
+    <p:sldId id="273" r:id="rId14"/>
+    <p:sldId id="271" r:id="rId15"/>
+    <p:sldId id="274" r:id="rId16"/>
+    <p:sldId id="275" r:id="rId17"/>
+    <p:sldId id="267" r:id="rId18"/>
   </p:sldIdLst>
   <p:sldSz cx="12192000" cy="6858000"/>
   <p:notesSz cx="6858000" cy="9144000"/>
@@ -117,7 +122,18 @@
   </p:defaultTextStyle>
   <p:extLst>
     <p:ext uri="{EFAFB233-063F-42B5-8137-9DF3F51BA10A}">
-      <p15:sldGuideLst xmlns="" xmlns:p15="http://schemas.microsoft.com/office/powerpoint/2012/main"/>
+      <p15:sldGuideLst xmlns:p15="http://schemas.microsoft.com/office/powerpoint/2012/main">
+        <p15:guide id="1" orient="horz" pos="2160">
+          <p15:clr>
+            <a:srgbClr val="A4A3A4"/>
+          </p15:clr>
+        </p15:guide>
+        <p15:guide id="2" pos="3840">
+          <p15:clr>
+            <a:srgbClr val="A4A3A4"/>
+          </p15:clr>
+        </p15:guide>
+      </p15:sldGuideLst>
     </p:ext>
   </p:extLst>
 </p:presentation>
@@ -255,7 +271,7 @@
             <a:fld id="{672E1A00-EE2E-4C0F-AC6B-9431477BA8CA}" type="datetimeFigureOut">
               <a:rPr lang="en-US" smtClean="0"/>
               <a:pPr/>
-              <a:t>6/25/2019</a:t>
+              <a:t>16-Jul-19</a:t>
             </a:fld>
             <a:endParaRPr lang="en-US"/>
           </a:p>
@@ -307,7 +323,7 @@
     </p:spTree>
     <p:extLst>
       <p:ext uri="{BB962C8B-B14F-4D97-AF65-F5344CB8AC3E}">
-        <p14:creationId xmlns="" xmlns:p14="http://schemas.microsoft.com/office/powerpoint/2010/main" val="1943160687"/>
+        <p14:creationId xmlns:p14="http://schemas.microsoft.com/office/powerpoint/2010/main" val="1943160687"/>
       </p:ext>
     </p:extLst>
   </p:cSld>
@@ -427,7 +443,7 @@
             <a:fld id="{672E1A00-EE2E-4C0F-AC6B-9431477BA8CA}" type="datetimeFigureOut">
               <a:rPr lang="en-US" smtClean="0"/>
               <a:pPr/>
-              <a:t>6/25/2019</a:t>
+              <a:t>16-Jul-19</a:t>
             </a:fld>
             <a:endParaRPr lang="en-US"/>
           </a:p>
@@ -479,7 +495,7 @@
     </p:spTree>
     <p:extLst>
       <p:ext uri="{BB962C8B-B14F-4D97-AF65-F5344CB8AC3E}">
-        <p14:creationId xmlns="" xmlns:p14="http://schemas.microsoft.com/office/powerpoint/2010/main" val="1277705445"/>
+        <p14:creationId xmlns:p14="http://schemas.microsoft.com/office/powerpoint/2010/main" val="1277705445"/>
       </p:ext>
     </p:extLst>
   </p:cSld>
@@ -609,7 +625,7 @@
             <a:fld id="{672E1A00-EE2E-4C0F-AC6B-9431477BA8CA}" type="datetimeFigureOut">
               <a:rPr lang="en-US" smtClean="0"/>
               <a:pPr/>
-              <a:t>6/25/2019</a:t>
+              <a:t>16-Jul-19</a:t>
             </a:fld>
             <a:endParaRPr lang="en-US"/>
           </a:p>
@@ -661,7 +677,7 @@
     </p:spTree>
     <p:extLst>
       <p:ext uri="{BB962C8B-B14F-4D97-AF65-F5344CB8AC3E}">
-        <p14:creationId xmlns="" xmlns:p14="http://schemas.microsoft.com/office/powerpoint/2010/main" val="790968573"/>
+        <p14:creationId xmlns:p14="http://schemas.microsoft.com/office/powerpoint/2010/main" val="790968573"/>
       </p:ext>
     </p:extLst>
   </p:cSld>
@@ -781,7 +797,7 @@
             <a:fld id="{672E1A00-EE2E-4C0F-AC6B-9431477BA8CA}" type="datetimeFigureOut">
               <a:rPr lang="en-US" smtClean="0"/>
               <a:pPr/>
-              <a:t>6/25/2019</a:t>
+              <a:t>16-Jul-19</a:t>
             </a:fld>
             <a:endParaRPr lang="en-US"/>
           </a:p>
@@ -833,7 +849,7 @@
     </p:spTree>
     <p:extLst>
       <p:ext uri="{BB962C8B-B14F-4D97-AF65-F5344CB8AC3E}">
-        <p14:creationId xmlns="" xmlns:p14="http://schemas.microsoft.com/office/powerpoint/2010/main" val="832645262"/>
+        <p14:creationId xmlns:p14="http://schemas.microsoft.com/office/powerpoint/2010/main" val="832645262"/>
       </p:ext>
     </p:extLst>
   </p:cSld>
@@ -1029,7 +1045,7 @@
             <a:fld id="{672E1A00-EE2E-4C0F-AC6B-9431477BA8CA}" type="datetimeFigureOut">
               <a:rPr lang="en-US" smtClean="0"/>
               <a:pPr/>
-              <a:t>6/25/2019</a:t>
+              <a:t>16-Jul-19</a:t>
             </a:fld>
             <a:endParaRPr lang="en-US"/>
           </a:p>
@@ -1081,7 +1097,7 @@
     </p:spTree>
     <p:extLst>
       <p:ext uri="{BB962C8B-B14F-4D97-AF65-F5344CB8AC3E}">
-        <p14:creationId xmlns="" xmlns:p14="http://schemas.microsoft.com/office/powerpoint/2010/main" val="3099942805"/>
+        <p14:creationId xmlns:p14="http://schemas.microsoft.com/office/powerpoint/2010/main" val="3099942805"/>
       </p:ext>
     </p:extLst>
   </p:cSld>
@@ -1263,7 +1279,7 @@
             <a:fld id="{672E1A00-EE2E-4C0F-AC6B-9431477BA8CA}" type="datetimeFigureOut">
               <a:rPr lang="en-US" smtClean="0"/>
               <a:pPr/>
-              <a:t>6/25/2019</a:t>
+              <a:t>16-Jul-19</a:t>
             </a:fld>
             <a:endParaRPr lang="en-US"/>
           </a:p>
@@ -1315,7 +1331,7 @@
     </p:spTree>
     <p:extLst>
       <p:ext uri="{BB962C8B-B14F-4D97-AF65-F5344CB8AC3E}">
-        <p14:creationId xmlns="" xmlns:p14="http://schemas.microsoft.com/office/powerpoint/2010/main" val="3105561879"/>
+        <p14:creationId xmlns:p14="http://schemas.microsoft.com/office/powerpoint/2010/main" val="3105561879"/>
       </p:ext>
     </p:extLst>
   </p:cSld>
@@ -1632,7 +1648,7 @@
             <a:fld id="{672E1A00-EE2E-4C0F-AC6B-9431477BA8CA}" type="datetimeFigureOut">
               <a:rPr lang="en-US" smtClean="0"/>
               <a:pPr/>
-              <a:t>6/25/2019</a:t>
+              <a:t>16-Jul-19</a:t>
             </a:fld>
             <a:endParaRPr lang="en-US"/>
           </a:p>
@@ -1684,7 +1700,7 @@
     </p:spTree>
     <p:extLst>
       <p:ext uri="{BB962C8B-B14F-4D97-AF65-F5344CB8AC3E}">
-        <p14:creationId xmlns="" xmlns:p14="http://schemas.microsoft.com/office/powerpoint/2010/main" val="4281697121"/>
+        <p14:creationId xmlns:p14="http://schemas.microsoft.com/office/powerpoint/2010/main" val="4281697121"/>
       </p:ext>
     </p:extLst>
   </p:cSld>
@@ -1752,7 +1768,7 @@
             <a:fld id="{672E1A00-EE2E-4C0F-AC6B-9431477BA8CA}" type="datetimeFigureOut">
               <a:rPr lang="en-US" smtClean="0"/>
               <a:pPr/>
-              <a:t>6/25/2019</a:t>
+              <a:t>16-Jul-19</a:t>
             </a:fld>
             <a:endParaRPr lang="en-US"/>
           </a:p>
@@ -1804,7 +1820,7 @@
     </p:spTree>
     <p:extLst>
       <p:ext uri="{BB962C8B-B14F-4D97-AF65-F5344CB8AC3E}">
-        <p14:creationId xmlns="" xmlns:p14="http://schemas.microsoft.com/office/powerpoint/2010/main" val="2356969964"/>
+        <p14:creationId xmlns:p14="http://schemas.microsoft.com/office/powerpoint/2010/main" val="2356969964"/>
       </p:ext>
     </p:extLst>
   </p:cSld>
@@ -1849,7 +1865,7 @@
             <a:fld id="{672E1A00-EE2E-4C0F-AC6B-9431477BA8CA}" type="datetimeFigureOut">
               <a:rPr lang="en-US" smtClean="0"/>
               <a:pPr/>
-              <a:t>6/25/2019</a:t>
+              <a:t>16-Jul-19</a:t>
             </a:fld>
             <a:endParaRPr lang="en-US"/>
           </a:p>
@@ -1901,7 +1917,7 @@
     </p:spTree>
     <p:extLst>
       <p:ext uri="{BB962C8B-B14F-4D97-AF65-F5344CB8AC3E}">
-        <p14:creationId xmlns="" xmlns:p14="http://schemas.microsoft.com/office/powerpoint/2010/main" val="519621263"/>
+        <p14:creationId xmlns:p14="http://schemas.microsoft.com/office/powerpoint/2010/main" val="519621263"/>
       </p:ext>
     </p:extLst>
   </p:cSld>
@@ -2128,7 +2144,7 @@
             <a:fld id="{672E1A00-EE2E-4C0F-AC6B-9431477BA8CA}" type="datetimeFigureOut">
               <a:rPr lang="en-US" smtClean="0"/>
               <a:pPr/>
-              <a:t>6/25/2019</a:t>
+              <a:t>16-Jul-19</a:t>
             </a:fld>
             <a:endParaRPr lang="en-US"/>
           </a:p>
@@ -2180,7 +2196,7 @@
     </p:spTree>
     <p:extLst>
       <p:ext uri="{BB962C8B-B14F-4D97-AF65-F5344CB8AC3E}">
-        <p14:creationId xmlns="" xmlns:p14="http://schemas.microsoft.com/office/powerpoint/2010/main" val="639836036"/>
+        <p14:creationId xmlns:p14="http://schemas.microsoft.com/office/powerpoint/2010/main" val="639836036"/>
       </p:ext>
     </p:extLst>
   </p:cSld>
@@ -2383,7 +2399,7 @@
             <a:fld id="{672E1A00-EE2E-4C0F-AC6B-9431477BA8CA}" type="datetimeFigureOut">
               <a:rPr lang="en-US" smtClean="0"/>
               <a:pPr/>
-              <a:t>6/25/2019</a:t>
+              <a:t>16-Jul-19</a:t>
             </a:fld>
             <a:endParaRPr lang="en-US"/>
           </a:p>
@@ -2435,7 +2451,7 @@
     </p:spTree>
     <p:extLst>
       <p:ext uri="{BB962C8B-B14F-4D97-AF65-F5344CB8AC3E}">
-        <p14:creationId xmlns="" xmlns:p14="http://schemas.microsoft.com/office/powerpoint/2010/main" val="1031210403"/>
+        <p14:creationId xmlns:p14="http://schemas.microsoft.com/office/powerpoint/2010/main" val="1031210403"/>
       </p:ext>
     </p:extLst>
   </p:cSld>
@@ -2608,7 +2624,7 @@
             <a:fld id="{672E1A00-EE2E-4C0F-AC6B-9431477BA8CA}" type="datetimeFigureOut">
               <a:rPr lang="en-US" smtClean="0"/>
               <a:pPr/>
-              <a:t>6/25/2019</a:t>
+              <a:t>16-Jul-19</a:t>
             </a:fld>
             <a:endParaRPr lang="en-US"/>
           </a:p>
@@ -2696,7 +2712,7 @@
     </p:spTree>
     <p:extLst>
       <p:ext uri="{BB962C8B-B14F-4D97-AF65-F5344CB8AC3E}">
-        <p14:creationId xmlns="" xmlns:p14="http://schemas.microsoft.com/office/powerpoint/2010/main" val="1809828173"/>
+        <p14:creationId xmlns:p14="http://schemas.microsoft.com/office/powerpoint/2010/main" val="1809828173"/>
       </p:ext>
     </p:extLst>
   </p:cSld>
@@ -3095,7 +3111,27 @@
                   </a:schemeClr>
                 </a:solidFill>
               </a:rPr>
-              <a:t>Generate Plots Automatically</a:t>
+              <a:t>Generate </a:t>
+            </a:r>
+            <a:r>
+              <a:rPr lang="en-US" sz="2800" dirty="0">
+                <a:solidFill>
+                  <a:schemeClr val="bg1">
+                    <a:lumMod val="50000"/>
+                  </a:schemeClr>
+                </a:solidFill>
+              </a:rPr>
+              <a:t>Automatic </a:t>
+            </a:r>
+            <a:r>
+              <a:rPr lang="en-US" sz="2800" dirty="0" smtClean="0">
+                <a:solidFill>
+                  <a:schemeClr val="bg1">
+                    <a:lumMod val="50000"/>
+                  </a:schemeClr>
+                </a:solidFill>
+              </a:rPr>
+              <a:t>Plots</a:t>
             </a:r>
             <a:endParaRPr lang="en-US" sz="2800" dirty="0">
               <a:solidFill>
@@ -3119,7 +3155,7 @@
           <a:blip r:embed="rId2" cstate="print">
             <a:extLst>
               <a:ext uri="{28A0092B-C50C-407E-A947-70E740481C1C}">
-                <a14:useLocalDpi xmlns="" xmlns:a14="http://schemas.microsoft.com/office/drawing/2010/main" val="0"/>
+                <a14:useLocalDpi xmlns:a14="http://schemas.microsoft.com/office/drawing/2010/main" val="0"/>
               </a:ext>
             </a:extLst>
           </a:blip>
@@ -3140,7 +3176,7 @@
     </p:spTree>
     <p:extLst>
       <p:ext uri="{BB962C8B-B14F-4D97-AF65-F5344CB8AC3E}">
-        <p14:creationId xmlns="" xmlns:p14="http://schemas.microsoft.com/office/powerpoint/2010/main" val="369495984"/>
+        <p14:creationId xmlns:p14="http://schemas.microsoft.com/office/powerpoint/2010/main" val="369495984"/>
       </p:ext>
     </p:extLst>
   </p:cSld>
@@ -3339,24 +3375,15 @@
             <a:pPr algn="r"/>
             <a:r>
               <a:rPr lang="en-GB" dirty="0" smtClean="0"/>
-              <a:t>Cleaning</a:t>
-            </a:r>
+              <a:t>Cleaning,</a:t>
+            </a:r>
+          </a:p>
+          <a:p>
+            <a:pPr algn="r"/>
             <a:r>
               <a:rPr lang="en-GB" dirty="0" smtClean="0"/>
-              <a:t>,</a:t>
-            </a:r>
-          </a:p>
-          <a:p>
-            <a:pPr algn="r"/>
-            <a:r>
-              <a:rPr lang="en-GB" dirty="0" smtClean="0"/>
-              <a:t>Filtering,</a:t>
-            </a:r>
-            <a:r>
-              <a:rPr lang="en-GB" dirty="0" smtClean="0"/>
-              <a:t> </a:t>
-            </a:r>
-            <a:endParaRPr lang="en-GB" dirty="0" smtClean="0"/>
+              <a:t>Filtering, </a:t>
+            </a:r>
           </a:p>
           <a:p>
             <a:pPr algn="r"/>
@@ -3601,7 +3628,7 @@
     </p:spTree>
     <p:extLst>
       <p:ext uri="{BB962C8B-B14F-4D97-AF65-F5344CB8AC3E}">
-        <p14:creationId xmlns="" xmlns:p14="http://schemas.microsoft.com/office/powerpoint/2010/main" val="777954675"/>
+        <p14:creationId xmlns:p14="http://schemas.microsoft.com/office/powerpoint/2010/main" val="777954675"/>
       </p:ext>
     </p:extLst>
   </p:cSld>
@@ -3709,7 +3736,7 @@
     </p:spTree>
     <p:extLst>
       <p:ext uri="{BB962C8B-B14F-4D97-AF65-F5344CB8AC3E}">
-        <p14:creationId xmlns="" xmlns:p14="http://schemas.microsoft.com/office/powerpoint/2010/main" val="777954675"/>
+        <p14:creationId xmlns:p14="http://schemas.microsoft.com/office/powerpoint/2010/main" val="777954675"/>
       </p:ext>
     </p:extLst>
   </p:cSld>
@@ -3759,6 +3786,576 @@
           <a:lstStyle/>
           <a:p>
             <a:r>
+              <a:rPr lang="en-GB" b="1" dirty="0" smtClean="0">
+                <a:solidFill>
+                  <a:schemeClr val="tx2">
+                    <a:lumMod val="75000"/>
+                  </a:schemeClr>
+                </a:solidFill>
+              </a:rPr>
+              <a:t>Modules: </a:t>
+            </a:r>
+            <a:r>
+              <a:rPr lang="en-GB" dirty="0" smtClean="0">
+                <a:solidFill>
+                  <a:schemeClr val="tx2">
+                    <a:lumMod val="75000"/>
+                  </a:schemeClr>
+                </a:solidFill>
+              </a:rPr>
+              <a:t>Global variables</a:t>
+            </a:r>
+            <a:endParaRPr lang="en-US" dirty="0">
+              <a:solidFill>
+                <a:schemeClr val="tx2">
+                  <a:lumMod val="75000"/>
+                </a:schemeClr>
+              </a:solidFill>
+            </a:endParaRPr>
+          </a:p>
+        </p:txBody>
+      </p:sp>
+      <p:pic>
+        <p:nvPicPr>
+          <p:cNvPr id="4" name="Picture 3"/>
+          <p:cNvPicPr>
+            <a:picLocks noChangeAspect="1"/>
+          </p:cNvPicPr>
+          <p:nvPr/>
+        </p:nvPicPr>
+        <p:blipFill>
+          <a:blip r:embed="rId2" cstate="print">
+            <a:extLst>
+              <a:ext uri="{28A0092B-C50C-407E-A947-70E740481C1C}">
+                <a14:useLocalDpi xmlns:a14="http://schemas.microsoft.com/office/drawing/2010/main" val="0"/>
+              </a:ext>
+            </a:extLst>
+          </a:blip>
+          <a:stretch>
+            <a:fillRect/>
+          </a:stretch>
+        </p:blipFill>
+        <p:spPr>
+          <a:xfrm>
+            <a:off x="2820865" y="1339356"/>
+            <a:ext cx="6550269" cy="5432752"/>
+          </a:xfrm>
+          <a:prstGeom prst="rect">
+            <a:avLst/>
+          </a:prstGeom>
+        </p:spPr>
+      </p:pic>
+    </p:spTree>
+    <p:extLst>
+      <p:ext uri="{BB962C8B-B14F-4D97-AF65-F5344CB8AC3E}">
+        <p14:creationId xmlns:p14="http://schemas.microsoft.com/office/powerpoint/2010/main" val="310917687"/>
+      </p:ext>
+    </p:extLst>
+  </p:cSld>
+  <p:clrMapOvr>
+    <a:masterClrMapping/>
+  </p:clrMapOvr>
+  <p:timing>
+    <p:tnLst>
+      <p:par>
+        <p:cTn id="1" dur="indefinite" restart="never" nodeType="tmRoot"/>
+      </p:par>
+    </p:tnLst>
+  </p:timing>
+</p:sld>
+</file>
+
+<file path=ppt/slides/slide13.xml><?xml version="1.0" encoding="utf-8"?>
+<p:sld xmlns:a="http://schemas.openxmlformats.org/drawingml/2006/main" xmlns:r="http://schemas.openxmlformats.org/officeDocument/2006/relationships" xmlns:p="http://schemas.openxmlformats.org/presentationml/2006/main">
+  <p:cSld>
+    <p:spTree>
+      <p:nvGrpSpPr>
+        <p:cNvPr id="1" name=""/>
+        <p:cNvGrpSpPr/>
+        <p:nvPr/>
+      </p:nvGrpSpPr>
+      <p:grpSpPr>
+        <a:xfrm>
+          <a:off x="0" y="0"/>
+          <a:ext cx="0" cy="0"/>
+          <a:chOff x="0" y="0"/>
+          <a:chExt cx="0" cy="0"/>
+        </a:xfrm>
+      </p:grpSpPr>
+      <p:sp>
+        <p:nvSpPr>
+          <p:cNvPr id="2" name="Title 1"/>
+          <p:cNvSpPr>
+            <a:spLocks noGrp="1"/>
+          </p:cNvSpPr>
+          <p:nvPr>
+            <p:ph type="title"/>
+          </p:nvPr>
+        </p:nvSpPr>
+        <p:spPr/>
+        <p:txBody>
+          <a:bodyPr/>
+          <a:lstStyle/>
+          <a:p>
+            <a:r>
+              <a:rPr lang="en-GB" b="1" dirty="0" smtClean="0">
+                <a:solidFill>
+                  <a:schemeClr val="tx2">
+                    <a:lumMod val="75000"/>
+                  </a:schemeClr>
+                </a:solidFill>
+              </a:rPr>
+              <a:t>Modules: </a:t>
+            </a:r>
+            <a:r>
+              <a:rPr lang="en-GB" dirty="0" smtClean="0">
+                <a:solidFill>
+                  <a:schemeClr val="tx2">
+                    <a:lumMod val="75000"/>
+                  </a:schemeClr>
+                </a:solidFill>
+              </a:rPr>
+              <a:t>Date Formatter</a:t>
+            </a:r>
+            <a:endParaRPr lang="en-US" dirty="0">
+              <a:solidFill>
+                <a:schemeClr val="tx2">
+                  <a:lumMod val="75000"/>
+                </a:schemeClr>
+              </a:solidFill>
+            </a:endParaRPr>
+          </a:p>
+        </p:txBody>
+      </p:sp>
+      <p:pic>
+        <p:nvPicPr>
+          <p:cNvPr id="3" name="Picture 2"/>
+          <p:cNvPicPr>
+            <a:picLocks noChangeAspect="1"/>
+          </p:cNvPicPr>
+          <p:nvPr/>
+        </p:nvPicPr>
+        <p:blipFill>
+          <a:blip r:embed="rId2">
+            <a:extLst>
+              <a:ext uri="{28A0092B-C50C-407E-A947-70E740481C1C}">
+                <a14:useLocalDpi xmlns:a14="http://schemas.microsoft.com/office/drawing/2010/main" val="0"/>
+              </a:ext>
+            </a:extLst>
+          </a:blip>
+          <a:stretch>
+            <a:fillRect/>
+          </a:stretch>
+        </p:blipFill>
+        <p:spPr>
+          <a:xfrm>
+            <a:off x="967922" y="1822573"/>
+            <a:ext cx="10256156" cy="4356863"/>
+          </a:xfrm>
+          <a:prstGeom prst="rect">
+            <a:avLst/>
+          </a:prstGeom>
+        </p:spPr>
+      </p:pic>
+    </p:spTree>
+    <p:extLst>
+      <p:ext uri="{BB962C8B-B14F-4D97-AF65-F5344CB8AC3E}">
+        <p14:creationId xmlns:p14="http://schemas.microsoft.com/office/powerpoint/2010/main" val="3454357384"/>
+      </p:ext>
+    </p:extLst>
+  </p:cSld>
+  <p:clrMapOvr>
+    <a:masterClrMapping/>
+  </p:clrMapOvr>
+  <p:timing>
+    <p:tnLst>
+      <p:par>
+        <p:cTn id="1" dur="indefinite" restart="never" nodeType="tmRoot"/>
+      </p:par>
+    </p:tnLst>
+  </p:timing>
+</p:sld>
+</file>
+
+<file path=ppt/slides/slide14.xml><?xml version="1.0" encoding="utf-8"?>
+<p:sld xmlns:a="http://schemas.openxmlformats.org/drawingml/2006/main" xmlns:r="http://schemas.openxmlformats.org/officeDocument/2006/relationships" xmlns:p="http://schemas.openxmlformats.org/presentationml/2006/main">
+  <p:cSld>
+    <p:spTree>
+      <p:nvGrpSpPr>
+        <p:cNvPr id="1" name=""/>
+        <p:cNvGrpSpPr/>
+        <p:nvPr/>
+      </p:nvGrpSpPr>
+      <p:grpSpPr>
+        <a:xfrm>
+          <a:off x="0" y="0"/>
+          <a:ext cx="0" cy="0"/>
+          <a:chOff x="0" y="0"/>
+          <a:chExt cx="0" cy="0"/>
+        </a:xfrm>
+      </p:grpSpPr>
+      <p:sp>
+        <p:nvSpPr>
+          <p:cNvPr id="2" name="Title 1"/>
+          <p:cNvSpPr>
+            <a:spLocks noGrp="1"/>
+          </p:cNvSpPr>
+          <p:nvPr>
+            <p:ph type="title"/>
+          </p:nvPr>
+        </p:nvSpPr>
+        <p:spPr/>
+        <p:txBody>
+          <a:bodyPr/>
+          <a:lstStyle/>
+          <a:p>
+            <a:r>
+              <a:rPr lang="en-GB" b="1" dirty="0" smtClean="0">
+                <a:solidFill>
+                  <a:schemeClr val="tx2">
+                    <a:lumMod val="75000"/>
+                  </a:schemeClr>
+                </a:solidFill>
+              </a:rPr>
+              <a:t>Modules: </a:t>
+            </a:r>
+            <a:r>
+              <a:rPr lang="en-GB" dirty="0" smtClean="0">
+                <a:solidFill>
+                  <a:schemeClr val="tx2">
+                    <a:lumMod val="75000"/>
+                  </a:schemeClr>
+                </a:solidFill>
+              </a:rPr>
+              <a:t>CP Plot</a:t>
+            </a:r>
+            <a:endParaRPr lang="en-US" dirty="0">
+              <a:solidFill>
+                <a:schemeClr val="tx2">
+                  <a:lumMod val="75000"/>
+                </a:schemeClr>
+              </a:solidFill>
+            </a:endParaRPr>
+          </a:p>
+        </p:txBody>
+      </p:sp>
+      <p:pic>
+        <p:nvPicPr>
+          <p:cNvPr id="3" name="Picture 2"/>
+          <p:cNvPicPr>
+            <a:picLocks noChangeAspect="1"/>
+          </p:cNvPicPr>
+          <p:nvPr/>
+        </p:nvPicPr>
+        <p:blipFill>
+          <a:blip r:embed="rId2" cstate="print">
+            <a:extLst>
+              <a:ext uri="{28A0092B-C50C-407E-A947-70E740481C1C}">
+                <a14:useLocalDpi xmlns:a14="http://schemas.microsoft.com/office/drawing/2010/main" val="0"/>
+              </a:ext>
+            </a:extLst>
+          </a:blip>
+          <a:stretch>
+            <a:fillRect/>
+          </a:stretch>
+        </p:blipFill>
+        <p:spPr>
+          <a:xfrm>
+            <a:off x="5662677" y="114300"/>
+            <a:ext cx="3866890" cy="6664569"/>
+          </a:xfrm>
+          <a:prstGeom prst="rect">
+            <a:avLst/>
+          </a:prstGeom>
+        </p:spPr>
+      </p:pic>
+    </p:spTree>
+    <p:extLst>
+      <p:ext uri="{BB962C8B-B14F-4D97-AF65-F5344CB8AC3E}">
+        <p14:creationId xmlns:p14="http://schemas.microsoft.com/office/powerpoint/2010/main" val="3081183430"/>
+      </p:ext>
+    </p:extLst>
+  </p:cSld>
+  <p:clrMapOvr>
+    <a:masterClrMapping/>
+  </p:clrMapOvr>
+  <p:timing>
+    <p:tnLst>
+      <p:par>
+        <p:cTn id="1" dur="indefinite" restart="never" nodeType="tmRoot"/>
+      </p:par>
+    </p:tnLst>
+  </p:timing>
+</p:sld>
+</file>
+
+<file path=ppt/slides/slide15.xml><?xml version="1.0" encoding="utf-8"?>
+<p:sld xmlns:a="http://schemas.openxmlformats.org/drawingml/2006/main" xmlns:r="http://schemas.openxmlformats.org/officeDocument/2006/relationships" xmlns:p="http://schemas.openxmlformats.org/presentationml/2006/main">
+  <p:cSld>
+    <p:spTree>
+      <p:nvGrpSpPr>
+        <p:cNvPr id="1" name=""/>
+        <p:cNvGrpSpPr/>
+        <p:nvPr/>
+      </p:nvGrpSpPr>
+      <p:grpSpPr>
+        <a:xfrm>
+          <a:off x="0" y="0"/>
+          <a:ext cx="0" cy="0"/>
+          <a:chOff x="0" y="0"/>
+          <a:chExt cx="0" cy="0"/>
+        </a:xfrm>
+      </p:grpSpPr>
+      <p:sp>
+        <p:nvSpPr>
+          <p:cNvPr id="2" name="Title 1"/>
+          <p:cNvSpPr>
+            <a:spLocks noGrp="1"/>
+          </p:cNvSpPr>
+          <p:nvPr>
+            <p:ph type="title"/>
+          </p:nvPr>
+        </p:nvSpPr>
+        <p:spPr/>
+        <p:txBody>
+          <a:bodyPr/>
+          <a:lstStyle/>
+          <a:p>
+            <a:r>
+              <a:rPr lang="en-GB" b="1" dirty="0" smtClean="0">
+                <a:solidFill>
+                  <a:schemeClr val="tx2">
+                    <a:lumMod val="75000"/>
+                  </a:schemeClr>
+                </a:solidFill>
+              </a:rPr>
+              <a:t>Modules: </a:t>
+            </a:r>
+            <a:r>
+              <a:rPr lang="en-GB" dirty="0" smtClean="0">
+                <a:solidFill>
+                  <a:schemeClr val="tx2">
+                    <a:lumMod val="75000"/>
+                  </a:schemeClr>
+                </a:solidFill>
+              </a:rPr>
+              <a:t>ER Plot</a:t>
+            </a:r>
+            <a:endParaRPr lang="en-US" dirty="0">
+              <a:solidFill>
+                <a:schemeClr val="tx2">
+                  <a:lumMod val="75000"/>
+                </a:schemeClr>
+              </a:solidFill>
+            </a:endParaRPr>
+          </a:p>
+        </p:txBody>
+      </p:sp>
+      <p:pic>
+        <p:nvPicPr>
+          <p:cNvPr id="5" name="Picture 4"/>
+          <p:cNvPicPr>
+            <a:picLocks noChangeAspect="1"/>
+          </p:cNvPicPr>
+          <p:nvPr/>
+        </p:nvPicPr>
+        <p:blipFill>
+          <a:blip r:embed="rId2" cstate="print">
+            <a:extLst>
+              <a:ext uri="{28A0092B-C50C-407E-A947-70E740481C1C}">
+                <a14:useLocalDpi xmlns:a14="http://schemas.microsoft.com/office/drawing/2010/main" val="0"/>
+              </a:ext>
+            </a:extLst>
+          </a:blip>
+          <a:stretch>
+            <a:fillRect/>
+          </a:stretch>
+        </p:blipFill>
+        <p:spPr>
+          <a:xfrm>
+            <a:off x="7076817" y="-79131"/>
+            <a:ext cx="3088250" cy="7025054"/>
+          </a:xfrm>
+          <a:prstGeom prst="rect">
+            <a:avLst/>
+          </a:prstGeom>
+        </p:spPr>
+      </p:pic>
+    </p:spTree>
+    <p:extLst>
+      <p:ext uri="{BB962C8B-B14F-4D97-AF65-F5344CB8AC3E}">
+        <p14:creationId xmlns:p14="http://schemas.microsoft.com/office/powerpoint/2010/main" val="2496049018"/>
+      </p:ext>
+    </p:extLst>
+  </p:cSld>
+  <p:clrMapOvr>
+    <a:masterClrMapping/>
+  </p:clrMapOvr>
+  <p:timing>
+    <p:tnLst>
+      <p:par>
+        <p:cTn id="1" dur="indefinite" restart="never" nodeType="tmRoot"/>
+      </p:par>
+    </p:tnLst>
+  </p:timing>
+</p:sld>
+</file>
+
+<file path=ppt/slides/slide16.xml><?xml version="1.0" encoding="utf-8"?>
+<p:sld xmlns:a="http://schemas.openxmlformats.org/drawingml/2006/main" xmlns:r="http://schemas.openxmlformats.org/officeDocument/2006/relationships" xmlns:p="http://schemas.openxmlformats.org/presentationml/2006/main">
+  <p:cSld>
+    <p:spTree>
+      <p:nvGrpSpPr>
+        <p:cNvPr id="1" name=""/>
+        <p:cNvGrpSpPr/>
+        <p:nvPr/>
+      </p:nvGrpSpPr>
+      <p:grpSpPr>
+        <a:xfrm>
+          <a:off x="0" y="0"/>
+          <a:ext cx="0" cy="0"/>
+          <a:chOff x="0" y="0"/>
+          <a:chExt cx="0" cy="0"/>
+        </a:xfrm>
+      </p:grpSpPr>
+      <p:sp>
+        <p:nvSpPr>
+          <p:cNvPr id="2" name="Title 1"/>
+          <p:cNvSpPr>
+            <a:spLocks noGrp="1"/>
+          </p:cNvSpPr>
+          <p:nvPr>
+            <p:ph type="title"/>
+          </p:nvPr>
+        </p:nvSpPr>
+        <p:spPr/>
+        <p:txBody>
+          <a:bodyPr/>
+          <a:lstStyle/>
+          <a:p>
+            <a:r>
+              <a:rPr lang="en-GB" b="1" dirty="0" smtClean="0">
+                <a:solidFill>
+                  <a:schemeClr val="tx2">
+                    <a:lumMod val="75000"/>
+                  </a:schemeClr>
+                </a:solidFill>
+              </a:rPr>
+              <a:t>Modules: </a:t>
+            </a:r>
+            <a:r>
+              <a:rPr lang="en-GB" dirty="0" err="1" smtClean="0">
+                <a:solidFill>
+                  <a:schemeClr val="tx2">
+                    <a:lumMod val="75000"/>
+                  </a:schemeClr>
+                </a:solidFill>
+              </a:rPr>
+              <a:t>Unif</a:t>
+            </a:r>
+            <a:r>
+              <a:rPr lang="en-GB" dirty="0" smtClean="0">
+                <a:solidFill>
+                  <a:schemeClr val="tx2">
+                    <a:lumMod val="75000"/>
+                  </a:schemeClr>
+                </a:solidFill>
+              </a:rPr>
+              <a:t> Plot</a:t>
+            </a:r>
+            <a:endParaRPr lang="en-US" dirty="0">
+              <a:solidFill>
+                <a:schemeClr val="tx2">
+                  <a:lumMod val="75000"/>
+                </a:schemeClr>
+              </a:solidFill>
+            </a:endParaRPr>
+          </a:p>
+        </p:txBody>
+      </p:sp>
+      <p:pic>
+        <p:nvPicPr>
+          <p:cNvPr id="5" name="Picture 4"/>
+          <p:cNvPicPr>
+            <a:picLocks noChangeAspect="1"/>
+          </p:cNvPicPr>
+          <p:nvPr/>
+        </p:nvPicPr>
+        <p:blipFill>
+          <a:blip r:embed="rId2" cstate="print">
+            <a:extLst>
+              <a:ext uri="{28A0092B-C50C-407E-A947-70E740481C1C}">
+                <a14:useLocalDpi xmlns:a14="http://schemas.microsoft.com/office/drawing/2010/main" val="0"/>
+              </a:ext>
+            </a:extLst>
+          </a:blip>
+          <a:stretch>
+            <a:fillRect/>
+          </a:stretch>
+        </p:blipFill>
+        <p:spPr>
+          <a:xfrm>
+            <a:off x="5901335" y="-26377"/>
+            <a:ext cx="4306534" cy="6994029"/>
+          </a:xfrm>
+          <a:prstGeom prst="rect">
+            <a:avLst/>
+          </a:prstGeom>
+        </p:spPr>
+      </p:pic>
+    </p:spTree>
+    <p:extLst>
+      <p:ext uri="{BB962C8B-B14F-4D97-AF65-F5344CB8AC3E}">
+        <p14:creationId xmlns:p14="http://schemas.microsoft.com/office/powerpoint/2010/main" val="1124522552"/>
+      </p:ext>
+    </p:extLst>
+  </p:cSld>
+  <p:clrMapOvr>
+    <a:masterClrMapping/>
+  </p:clrMapOvr>
+  <p:timing>
+    <p:tnLst>
+      <p:par>
+        <p:cTn id="1" dur="indefinite" restart="never" nodeType="tmRoot"/>
+      </p:par>
+    </p:tnLst>
+  </p:timing>
+</p:sld>
+</file>
+
+<file path=ppt/slides/slide17.xml><?xml version="1.0" encoding="utf-8"?>
+<p:sld xmlns:a="http://schemas.openxmlformats.org/drawingml/2006/main" xmlns:r="http://schemas.openxmlformats.org/officeDocument/2006/relationships" xmlns:p="http://schemas.openxmlformats.org/presentationml/2006/main">
+  <p:cSld>
+    <p:spTree>
+      <p:nvGrpSpPr>
+        <p:cNvPr id="1" name=""/>
+        <p:cNvGrpSpPr/>
+        <p:nvPr/>
+      </p:nvGrpSpPr>
+      <p:grpSpPr>
+        <a:xfrm>
+          <a:off x="0" y="0"/>
+          <a:ext cx="0" cy="0"/>
+          <a:chOff x="0" y="0"/>
+          <a:chExt cx="0" cy="0"/>
+        </a:xfrm>
+      </p:grpSpPr>
+      <p:sp>
+        <p:nvSpPr>
+          <p:cNvPr id="2" name="Title 1"/>
+          <p:cNvSpPr>
+            <a:spLocks noGrp="1"/>
+          </p:cNvSpPr>
+          <p:nvPr>
+            <p:ph type="title"/>
+          </p:nvPr>
+        </p:nvSpPr>
+        <p:spPr/>
+        <p:txBody>
+          <a:bodyPr/>
+          <a:lstStyle/>
+          <a:p>
+            <a:r>
               <a:rPr lang="en-US" b="1" dirty="0" smtClean="0">
                 <a:solidFill>
                   <a:schemeClr val="tx2">
@@ -3803,28 +4400,14 @@
                 <a:latin typeface="Segoe UI" panose="020B0502040204020203" pitchFamily="34" charset="0"/>
                 <a:cs typeface="Segoe UI" panose="020B0502040204020203" pitchFamily="34" charset="0"/>
               </a:rPr>
-              <a:t>Stage-2</a:t>
-            </a:r>
-            <a:r>
-              <a:rPr lang="en-GB" b="1" dirty="0" smtClean="0">
-                <a:latin typeface="Segoe UI" panose="020B0502040204020203" pitchFamily="34" charset="0"/>
-                <a:cs typeface="Segoe UI" panose="020B0502040204020203" pitchFamily="34" charset="0"/>
-              </a:rPr>
-              <a:t>:</a:t>
+              <a:t>Stage-2:</a:t>
             </a:r>
             <a:r>
               <a:rPr lang="en-GB" dirty="0" smtClean="0">
                 <a:latin typeface="Segoe UI" panose="020B0502040204020203" pitchFamily="34" charset="0"/>
                 <a:cs typeface="Segoe UI" panose="020B0502040204020203" pitchFamily="34" charset="0"/>
               </a:rPr>
-              <a:t> Applying Nelson </a:t>
-            </a:r>
-            <a:r>
-              <a:rPr lang="en-GB" dirty="0" smtClean="0">
-                <a:latin typeface="Segoe UI" panose="020B0502040204020203" pitchFamily="34" charset="0"/>
-                <a:cs typeface="Segoe UI" panose="020B0502040204020203" pitchFamily="34" charset="0"/>
-              </a:rPr>
-              <a:t>rules </a:t>
+              <a:t> Applying Nelson rules </a:t>
             </a:r>
             <a:r>
               <a:rPr lang="en-GB" dirty="0" smtClean="0">
@@ -3947,7 +4530,7 @@
     </p:spTree>
     <p:extLst>
       <p:ext uri="{BB962C8B-B14F-4D97-AF65-F5344CB8AC3E}">
-        <p14:creationId xmlns="" xmlns:p14="http://schemas.microsoft.com/office/powerpoint/2010/main" val="777954675"/>
+        <p14:creationId xmlns:p14="http://schemas.microsoft.com/office/powerpoint/2010/main" val="777954675"/>
       </p:ext>
     </p:extLst>
   </p:cSld>
@@ -4047,7 +4630,7 @@
           <a:lstStyle/>
           <a:p>
             <a:r>
-              <a:rPr lang="en-US" dirty="0" smtClean="0">
+              <a:rPr lang="en-US" u="sng" dirty="0" smtClean="0">
                 <a:latin typeface="Segoe UI" panose="020B0502040204020203" pitchFamily="34" charset="0"/>
                 <a:cs typeface="Segoe UI" panose="020B0502040204020203" pitchFamily="34" charset="0"/>
               </a:rPr>
@@ -4056,7 +4639,7 @@
           </a:p>
           <a:p>
             <a:r>
-              <a:rPr lang="en-US" dirty="0" smtClean="0">
+              <a:rPr lang="en-US" u="sng" dirty="0" smtClean="0">
                 <a:latin typeface="Segoe UI" panose="020B0502040204020203" pitchFamily="34" charset="0"/>
                 <a:cs typeface="Segoe UI" panose="020B0502040204020203" pitchFamily="34" charset="0"/>
               </a:rPr>
@@ -4065,7 +4648,7 @@
           </a:p>
           <a:p>
             <a:r>
-              <a:rPr lang="en-US" dirty="0" smtClean="0">
+              <a:rPr lang="en-US" u="sng" dirty="0" smtClean="0">
                 <a:latin typeface="Segoe UI" panose="020B0502040204020203" pitchFamily="34" charset="0"/>
                 <a:cs typeface="Segoe UI" panose="020B0502040204020203" pitchFamily="34" charset="0"/>
               </a:rPr>
@@ -4105,23 +4688,40 @@
           </a:p>
           <a:p>
             <a:r>
+              <a:rPr lang="en-US" u="sng" dirty="0" smtClean="0"/>
+              <a:t>Scripting/Coding</a:t>
+            </a:r>
+          </a:p>
+          <a:p>
+            <a:r>
+              <a:rPr lang="en-US" u="sng" dirty="0" smtClean="0"/>
+              <a:t>Coding Essentials</a:t>
+            </a:r>
+          </a:p>
+          <a:p>
+            <a:r>
+              <a:rPr lang="en-US" u="sng" dirty="0" smtClean="0"/>
+              <a:t>Modules:</a:t>
+            </a:r>
+            <a:r>
               <a:rPr lang="en-US" dirty="0" smtClean="0"/>
-              <a:t>Scripting/Coding</a:t>
-            </a:r>
-          </a:p>
-          <a:p>
-            <a:r>
-              <a:rPr lang="en-GB" smtClean="0"/>
-              <a:t>Conclusion</a:t>
-            </a:r>
-            <a:endParaRPr lang="en-US" dirty="0"/>
+              <a:t> CP, ER, Uniformity</a:t>
+            </a:r>
+            <a:endParaRPr lang="en-US" u="sng" dirty="0" smtClean="0"/>
+          </a:p>
+          <a:p>
+            <a:r>
+              <a:rPr lang="en-GB" u="sng" dirty="0" smtClean="0"/>
+              <a:t>Utilities</a:t>
+            </a:r>
+            <a:endParaRPr lang="en-US" u="sng" dirty="0"/>
           </a:p>
         </p:txBody>
       </p:sp>
     </p:spTree>
     <p:extLst>
       <p:ext uri="{BB962C8B-B14F-4D97-AF65-F5344CB8AC3E}">
-        <p14:creationId xmlns="" xmlns:p14="http://schemas.microsoft.com/office/powerpoint/2010/main" val="703350114"/>
+        <p14:creationId xmlns:p14="http://schemas.microsoft.com/office/powerpoint/2010/main" val="703350114"/>
       </p:ext>
     </p:extLst>
   </p:cSld>
@@ -4206,12 +4806,63 @@
           <a:lstStyle/>
           <a:p>
             <a:r>
-              <a:rPr lang="en-GB" b="1" dirty="0" smtClean="0"/>
+              <a:rPr lang="en-GB" b="1" dirty="0">
+                <a:solidFill>
+                  <a:srgbClr val="0CAC32"/>
+                </a:solidFill>
+              </a:rPr>
               <a:t>AutoPlot</a:t>
             </a:r>
             <a:r>
               <a:rPr lang="en-GB" dirty="0" smtClean="0"/>
-              <a:t> is an Indigenous Software created for generating plots automatically from the data (especially QC) maintained in all the sections of VFD.</a:t>
+              <a:t> is an Indigenous Software created for generating plots automatically from the data (especially QC) maintained in all the sections of VFD</a:t>
+            </a:r>
+            <a:r>
+              <a:rPr lang="en-GB" dirty="0" smtClean="0"/>
+              <a:t>.</a:t>
+            </a:r>
+            <a:br>
+              <a:rPr lang="en-GB" dirty="0" smtClean="0"/>
+            </a:br>
+            <a:endParaRPr lang="en-GB" dirty="0" smtClean="0"/>
+          </a:p>
+          <a:p>
+            <a:r>
+              <a:rPr lang="en-GB" dirty="0" smtClean="0">
+                <a:latin typeface="Segoe UI" panose="020B0502040204020203" pitchFamily="34" charset="0"/>
+                <a:cs typeface="Segoe UI" panose="020B0502040204020203" pitchFamily="34" charset="0"/>
+              </a:rPr>
+              <a:t>applicable for any type of data – </a:t>
+            </a:r>
+          </a:p>
+          <a:p>
+            <a:pPr lvl="1"/>
+            <a:r>
+              <a:rPr lang="en-GB" dirty="0" smtClean="0">
+                <a:latin typeface="Segoe UI" panose="020B0502040204020203" pitchFamily="34" charset="0"/>
+                <a:cs typeface="Segoe UI" panose="020B0502040204020203" pitchFamily="34" charset="0"/>
+              </a:rPr>
+              <a:t>CSV, </a:t>
+            </a:r>
+          </a:p>
+          <a:p>
+            <a:pPr lvl="1"/>
+            <a:r>
+              <a:rPr lang="en-GB" dirty="0" smtClean="0">
+                <a:latin typeface="Segoe UI" panose="020B0502040204020203" pitchFamily="34" charset="0"/>
+                <a:cs typeface="Segoe UI" panose="020B0502040204020203" pitchFamily="34" charset="0"/>
+              </a:rPr>
+              <a:t>TSV, </a:t>
+            </a:r>
+          </a:p>
+          <a:p>
+            <a:pPr lvl="1"/>
+            <a:r>
+              <a:rPr lang="en-GB" dirty="0" smtClean="0">
+                <a:latin typeface="Segoe UI" panose="020B0502040204020203" pitchFamily="34" charset="0"/>
+                <a:cs typeface="Segoe UI" panose="020B0502040204020203" pitchFamily="34" charset="0"/>
+              </a:rPr>
+              <a:t>Excel (with single/multiple sheets)</a:t>
             </a:r>
             <a:endParaRPr lang="en-US" dirty="0" smtClean="0">
               <a:latin typeface="Segoe UI" panose="020B0502040204020203" pitchFamily="34" charset="0"/>
@@ -4223,7 +4874,7 @@
     </p:spTree>
     <p:extLst>
       <p:ext uri="{BB962C8B-B14F-4D97-AF65-F5344CB8AC3E}">
-        <p14:creationId xmlns="" xmlns:p14="http://schemas.microsoft.com/office/powerpoint/2010/main" val="2153926227"/>
+        <p14:creationId xmlns:p14="http://schemas.microsoft.com/office/powerpoint/2010/main" val="2153926227"/>
       </p:ext>
     </p:extLst>
   </p:cSld>
@@ -4347,7 +4998,7 @@
     </p:spTree>
     <p:extLst>
       <p:ext uri="{BB962C8B-B14F-4D97-AF65-F5344CB8AC3E}">
-        <p14:creationId xmlns="" xmlns:p14="http://schemas.microsoft.com/office/powerpoint/2010/main" val="1835708266"/>
+        <p14:creationId xmlns:p14="http://schemas.microsoft.com/office/powerpoint/2010/main" val="1835708266"/>
       </p:ext>
     </p:extLst>
   </p:cSld>
@@ -4579,22 +5230,12 @@
             </a:r>
             <a:r>
               <a:rPr lang="en-GB" sz="2000" dirty="0" smtClean="0"/>
-              <a:t> </a:t>
-            </a:r>
-            <a:r>
-              <a:rPr lang="en-GB" sz="2000" dirty="0" smtClean="0"/>
-              <a:t>(another </a:t>
-            </a:r>
-            <a:r>
-              <a:rPr lang="en-GB" sz="2000" dirty="0" smtClean="0"/>
-              <a:t>Indigenous Software) is also integrable with </a:t>
-            </a:r>
-            <a:r>
-              <a:rPr lang="en-GB" sz="2000" b="1" dirty="0" smtClean="0">
+              <a:t> (another Indigenous Software) is also integrable with </a:t>
+            </a:r>
+            <a:r>
+              <a:rPr lang="en-GB" sz="2400" b="1" dirty="0" smtClean="0">
                 <a:solidFill>
-                  <a:schemeClr val="accent6">
-                    <a:lumMod val="75000"/>
-                  </a:schemeClr>
+                  <a:srgbClr val="0CAC32"/>
                 </a:solidFill>
               </a:rPr>
               <a:t>AutoPlot</a:t>
@@ -4639,11 +5280,9 @@
               <a:t> acts as the foundation layer for </a:t>
             </a:r>
             <a:r>
-              <a:rPr lang="en-GB" sz="2000" b="1" dirty="0" smtClean="0">
+              <a:rPr lang="en-GB" sz="2400" b="1" dirty="0" smtClean="0">
                 <a:solidFill>
-                  <a:schemeClr val="accent6">
-                    <a:lumMod val="75000"/>
-                  </a:schemeClr>
+                  <a:srgbClr val="0CAC32"/>
                 </a:solidFill>
               </a:rPr>
               <a:t>AutoPlot</a:t>
@@ -4665,17 +5304,12 @@
             </a:r>
             <a:r>
               <a:rPr lang="en-GB" sz="2000" b="1" dirty="0" smtClean="0"/>
-              <a:t>JMP Scripting Language (JSL</a:t>
-            </a:r>
-            <a:r>
-              <a:rPr lang="en-GB" sz="2000" b="1" dirty="0" smtClean="0"/>
-              <a:t>)</a:t>
+              <a:t>JMP Scripting Language (JSL)</a:t>
             </a:r>
             <a:r>
               <a:rPr lang="en-GB" sz="2000" dirty="0" smtClean="0"/>
               <a:t>.</a:t>
             </a:r>
-            <a:endParaRPr lang="en-GB" sz="2000" dirty="0" smtClean="0"/>
           </a:p>
           <a:p>
             <a:pPr>
@@ -4693,7 +5327,7 @@
     </p:spTree>
     <p:extLst>
       <p:ext uri="{BB962C8B-B14F-4D97-AF65-F5344CB8AC3E}">
-        <p14:creationId xmlns="" xmlns:p14="http://schemas.microsoft.com/office/powerpoint/2010/main" val="1835708266"/>
+        <p14:creationId xmlns:p14="http://schemas.microsoft.com/office/powerpoint/2010/main" val="1835708266"/>
       </p:ext>
     </p:extLst>
   </p:cSld>
@@ -4793,11 +5427,11 @@
             </a:r>
             <a:r>
               <a:rPr lang="en-GB" dirty="0" smtClean="0"/>
-              <a:t>5 </a:t>
+              <a:t>more than 2 months now</a:t>
             </a:r>
             <a:r>
               <a:rPr lang="en-GB" dirty="0" smtClean="0"/>
-              <a:t>weeks now.</a:t>
+              <a:t>.</a:t>
             </a:r>
           </a:p>
           <a:p>
@@ -4843,7 +5477,7 @@
     </p:spTree>
     <p:extLst>
       <p:ext uri="{BB962C8B-B14F-4D97-AF65-F5344CB8AC3E}">
-        <p14:creationId xmlns="" xmlns:p14="http://schemas.microsoft.com/office/powerpoint/2010/main" val="1835708266"/>
+        <p14:creationId xmlns:p14="http://schemas.microsoft.com/office/powerpoint/2010/main" val="1835708266"/>
       </p:ext>
     </p:extLst>
   </p:cSld>
@@ -4947,7 +5581,7 @@
     </p:spTree>
     <p:extLst>
       <p:ext uri="{BB962C8B-B14F-4D97-AF65-F5344CB8AC3E}">
-        <p14:creationId xmlns="" xmlns:p14="http://schemas.microsoft.com/office/powerpoint/2010/main" val="3924351243"/>
+        <p14:creationId xmlns:p14="http://schemas.microsoft.com/office/powerpoint/2010/main" val="3924351243"/>
       </p:ext>
     </p:extLst>
   </p:cSld>
@@ -5051,7 +5685,7 @@
     </p:spTree>
     <p:extLst>
       <p:ext uri="{BB962C8B-B14F-4D97-AF65-F5344CB8AC3E}">
-        <p14:creationId xmlns="" xmlns:p14="http://schemas.microsoft.com/office/powerpoint/2010/main" val="3390085284"/>
+        <p14:creationId xmlns:p14="http://schemas.microsoft.com/office/powerpoint/2010/main" val="3390085284"/>
       </p:ext>
     </p:extLst>
   </p:cSld>
@@ -5155,7 +5789,7 @@
     </p:spTree>
     <p:extLst>
       <p:ext uri="{BB962C8B-B14F-4D97-AF65-F5344CB8AC3E}">
-        <p14:creationId xmlns="" xmlns:p14="http://schemas.microsoft.com/office/powerpoint/2010/main" val="584440453"/>
+        <p14:creationId xmlns:p14="http://schemas.microsoft.com/office/powerpoint/2010/main" val="584440453"/>
       </p:ext>
     </p:extLst>
   </p:cSld>
@@ -5427,7 +6061,7 @@
   <a:extraClrSchemeLst/>
   <a:extLst>
     <a:ext uri="{05A4C25C-085E-4340-85A3-A5531E510DB2}">
-      <thm15:themeFamily xmlns="" xmlns:thm15="http://schemas.microsoft.com/office/thememl/2012/main" name="Office Theme" id="{62F939B6-93AF-4DB8-9C6B-D6C7DFDC589F}" vid="{4A3C46E8-61CC-4603-A589-7422A47A8E4A}"/>
+      <thm15:themeFamily xmlns:thm15="http://schemas.microsoft.com/office/thememl/2012/main" name="Office Theme" id="{62F939B6-93AF-4DB8-9C6B-D6C7DFDC589F}" vid="{4A3C46E8-61CC-4603-A589-7422A47A8E4A}"/>
     </a:ext>
   </a:extLst>
 </a:theme>

</xml_diff>

<commit_message>
CNT01 Ch A added with RUN button linked to run.bat
</commit_message>
<xml_diff>
--- a/sessions/1/AutoPlot_session_1.pptx
+++ b/sessions/1/AutoPlot_session_1.pptx
@@ -122,7 +122,7 @@
   </p:defaultTextStyle>
   <p:extLst>
     <p:ext uri="{EFAFB233-063F-42B5-8137-9DF3F51BA10A}">
-      <p15:sldGuideLst xmlns:p15="http://schemas.microsoft.com/office/powerpoint/2012/main" xmlns="">
+      <p15:sldGuideLst xmlns:p15="http://schemas.microsoft.com/office/powerpoint/2012/main">
         <p15:guide id="1" orient="horz" pos="2160">
           <p15:clr>
             <a:srgbClr val="A4A3A4"/>
@@ -181,10 +181,9 @@
           </a:lstStyle>
           <a:p>
             <a:r>
-              <a:rPr lang="en-US" smtClean="0"/>
+              <a:rPr lang="en-US"/>
               <a:t>Click to edit Master title style</a:t>
             </a:r>
-            <a:endParaRPr lang="en-US"/>
           </a:p>
         </p:txBody>
       </p:sp>
@@ -246,10 +245,9 @@
           </a:lstStyle>
           <a:p>
             <a:r>
-              <a:rPr lang="en-US" smtClean="0"/>
+              <a:rPr lang="en-US"/>
               <a:t>Click to edit Master subtitle style</a:t>
             </a:r>
-            <a:endParaRPr lang="en-US"/>
           </a:p>
         </p:txBody>
       </p:sp>
@@ -271,7 +269,7 @@
             <a:fld id="{672E1A00-EE2E-4C0F-AC6B-9431477BA8CA}" type="datetimeFigureOut">
               <a:rPr lang="en-US" smtClean="0"/>
               <a:pPr/>
-              <a:t>11/17/2019</a:t>
+              <a:t>23-Nov-19</a:t>
             </a:fld>
             <a:endParaRPr lang="en-US"/>
           </a:p>
@@ -323,7 +321,7 @@
     </p:spTree>
     <p:extLst>
       <p:ext uri="{BB962C8B-B14F-4D97-AF65-F5344CB8AC3E}">
-        <p14:creationId xmlns:p14="http://schemas.microsoft.com/office/powerpoint/2010/main" xmlns="" val="1943160687"/>
+        <p14:creationId xmlns:p14="http://schemas.microsoft.com/office/powerpoint/2010/main" val="1943160687"/>
       </p:ext>
     </p:extLst>
   </p:cSld>
@@ -366,10 +364,9 @@
           <a:lstStyle/>
           <a:p>
             <a:r>
-              <a:rPr lang="en-US" smtClean="0"/>
+              <a:rPr lang="en-US"/>
               <a:t>Click to edit Master title style</a:t>
             </a:r>
-            <a:endParaRPr lang="en-US"/>
           </a:p>
         </p:txBody>
       </p:sp>
@@ -390,38 +387,37 @@
           <a:p>
             <a:pPr lvl="0"/>
             <a:r>
-              <a:rPr lang="en-US" smtClean="0"/>
+              <a:rPr lang="en-US"/>
               <a:t>Click to edit Master text styles</a:t>
             </a:r>
           </a:p>
           <a:p>
             <a:pPr lvl="1"/>
             <a:r>
-              <a:rPr lang="en-US" smtClean="0"/>
+              <a:rPr lang="en-US"/>
               <a:t>Second level</a:t>
             </a:r>
           </a:p>
           <a:p>
             <a:pPr lvl="2"/>
             <a:r>
-              <a:rPr lang="en-US" smtClean="0"/>
+              <a:rPr lang="en-US"/>
               <a:t>Third level</a:t>
             </a:r>
           </a:p>
           <a:p>
             <a:pPr lvl="3"/>
             <a:r>
-              <a:rPr lang="en-US" smtClean="0"/>
+              <a:rPr lang="en-US"/>
               <a:t>Fourth level</a:t>
             </a:r>
           </a:p>
           <a:p>
             <a:pPr lvl="4"/>
             <a:r>
-              <a:rPr lang="en-US" smtClean="0"/>
+              <a:rPr lang="en-US"/>
               <a:t>Fifth level</a:t>
             </a:r>
-            <a:endParaRPr lang="en-US"/>
           </a:p>
         </p:txBody>
       </p:sp>
@@ -443,7 +439,7 @@
             <a:fld id="{672E1A00-EE2E-4C0F-AC6B-9431477BA8CA}" type="datetimeFigureOut">
               <a:rPr lang="en-US" smtClean="0"/>
               <a:pPr/>
-              <a:t>11/17/2019</a:t>
+              <a:t>23-Nov-19</a:t>
             </a:fld>
             <a:endParaRPr lang="en-US"/>
           </a:p>
@@ -495,7 +491,7 @@
     </p:spTree>
     <p:extLst>
       <p:ext uri="{BB962C8B-B14F-4D97-AF65-F5344CB8AC3E}">
-        <p14:creationId xmlns:p14="http://schemas.microsoft.com/office/powerpoint/2010/main" xmlns="" val="1277705445"/>
+        <p14:creationId xmlns:p14="http://schemas.microsoft.com/office/powerpoint/2010/main" val="1277705445"/>
       </p:ext>
     </p:extLst>
   </p:cSld>
@@ -543,10 +539,9 @@
           <a:lstStyle/>
           <a:p>
             <a:r>
-              <a:rPr lang="en-US" smtClean="0"/>
+              <a:rPr lang="en-US"/>
               <a:t>Click to edit Master title style</a:t>
             </a:r>
-            <a:endParaRPr lang="en-US"/>
           </a:p>
         </p:txBody>
       </p:sp>
@@ -572,38 +567,37 @@
           <a:p>
             <a:pPr lvl="0"/>
             <a:r>
-              <a:rPr lang="en-US" smtClean="0"/>
+              <a:rPr lang="en-US"/>
               <a:t>Click to edit Master text styles</a:t>
             </a:r>
           </a:p>
           <a:p>
             <a:pPr lvl="1"/>
             <a:r>
-              <a:rPr lang="en-US" smtClean="0"/>
+              <a:rPr lang="en-US"/>
               <a:t>Second level</a:t>
             </a:r>
           </a:p>
           <a:p>
             <a:pPr lvl="2"/>
             <a:r>
-              <a:rPr lang="en-US" smtClean="0"/>
+              <a:rPr lang="en-US"/>
               <a:t>Third level</a:t>
             </a:r>
           </a:p>
           <a:p>
             <a:pPr lvl="3"/>
             <a:r>
-              <a:rPr lang="en-US" smtClean="0"/>
+              <a:rPr lang="en-US"/>
               <a:t>Fourth level</a:t>
             </a:r>
           </a:p>
           <a:p>
             <a:pPr lvl="4"/>
             <a:r>
-              <a:rPr lang="en-US" smtClean="0"/>
+              <a:rPr lang="en-US"/>
               <a:t>Fifth level</a:t>
             </a:r>
-            <a:endParaRPr lang="en-US"/>
           </a:p>
         </p:txBody>
       </p:sp>
@@ -625,7 +619,7 @@
             <a:fld id="{672E1A00-EE2E-4C0F-AC6B-9431477BA8CA}" type="datetimeFigureOut">
               <a:rPr lang="en-US" smtClean="0"/>
               <a:pPr/>
-              <a:t>11/17/2019</a:t>
+              <a:t>23-Nov-19</a:t>
             </a:fld>
             <a:endParaRPr lang="en-US"/>
           </a:p>
@@ -677,7 +671,7 @@
     </p:spTree>
     <p:extLst>
       <p:ext uri="{BB962C8B-B14F-4D97-AF65-F5344CB8AC3E}">
-        <p14:creationId xmlns:p14="http://schemas.microsoft.com/office/powerpoint/2010/main" xmlns="" val="790968573"/>
+        <p14:creationId xmlns:p14="http://schemas.microsoft.com/office/powerpoint/2010/main" val="790968573"/>
       </p:ext>
     </p:extLst>
   </p:cSld>
@@ -720,10 +714,9 @@
           <a:lstStyle/>
           <a:p>
             <a:r>
-              <a:rPr lang="en-US" smtClean="0"/>
+              <a:rPr lang="en-US"/>
               <a:t>Click to edit Master title style</a:t>
             </a:r>
-            <a:endParaRPr lang="en-US"/>
           </a:p>
         </p:txBody>
       </p:sp>
@@ -744,38 +737,37 @@
           <a:p>
             <a:pPr lvl="0"/>
             <a:r>
-              <a:rPr lang="en-US" smtClean="0"/>
+              <a:rPr lang="en-US"/>
               <a:t>Click to edit Master text styles</a:t>
             </a:r>
           </a:p>
           <a:p>
             <a:pPr lvl="1"/>
             <a:r>
-              <a:rPr lang="en-US" smtClean="0"/>
+              <a:rPr lang="en-US"/>
               <a:t>Second level</a:t>
             </a:r>
           </a:p>
           <a:p>
             <a:pPr lvl="2"/>
             <a:r>
-              <a:rPr lang="en-US" smtClean="0"/>
+              <a:rPr lang="en-US"/>
               <a:t>Third level</a:t>
             </a:r>
           </a:p>
           <a:p>
             <a:pPr lvl="3"/>
             <a:r>
-              <a:rPr lang="en-US" smtClean="0"/>
+              <a:rPr lang="en-US"/>
               <a:t>Fourth level</a:t>
             </a:r>
           </a:p>
           <a:p>
             <a:pPr lvl="4"/>
             <a:r>
-              <a:rPr lang="en-US" smtClean="0"/>
+              <a:rPr lang="en-US"/>
               <a:t>Fifth level</a:t>
             </a:r>
-            <a:endParaRPr lang="en-US"/>
           </a:p>
         </p:txBody>
       </p:sp>
@@ -797,7 +789,7 @@
             <a:fld id="{672E1A00-EE2E-4C0F-AC6B-9431477BA8CA}" type="datetimeFigureOut">
               <a:rPr lang="en-US" smtClean="0"/>
               <a:pPr/>
-              <a:t>11/17/2019</a:t>
+              <a:t>23-Nov-19</a:t>
             </a:fld>
             <a:endParaRPr lang="en-US"/>
           </a:p>
@@ -849,7 +841,7 @@
     </p:spTree>
     <p:extLst>
       <p:ext uri="{BB962C8B-B14F-4D97-AF65-F5344CB8AC3E}">
-        <p14:creationId xmlns:p14="http://schemas.microsoft.com/office/powerpoint/2010/main" xmlns="" val="832645262"/>
+        <p14:creationId xmlns:p14="http://schemas.microsoft.com/office/powerpoint/2010/main" val="832645262"/>
       </p:ext>
     </p:extLst>
   </p:cSld>
@@ -901,10 +893,9 @@
           </a:lstStyle>
           <a:p>
             <a:r>
-              <a:rPr lang="en-US" smtClean="0"/>
+              <a:rPr lang="en-US"/>
               <a:t>Click to edit Master title style</a:t>
             </a:r>
-            <a:endParaRPr lang="en-US"/>
           </a:p>
         </p:txBody>
       </p:sp>
@@ -1021,7 +1012,7 @@
           <a:p>
             <a:pPr lvl="0"/>
             <a:r>
-              <a:rPr lang="en-US" smtClean="0"/>
+              <a:rPr lang="en-US"/>
               <a:t>Click to edit Master text styles</a:t>
             </a:r>
           </a:p>
@@ -1045,7 +1036,7 @@
             <a:fld id="{672E1A00-EE2E-4C0F-AC6B-9431477BA8CA}" type="datetimeFigureOut">
               <a:rPr lang="en-US" smtClean="0"/>
               <a:pPr/>
-              <a:t>11/17/2019</a:t>
+              <a:t>23-Nov-19</a:t>
             </a:fld>
             <a:endParaRPr lang="en-US"/>
           </a:p>
@@ -1097,7 +1088,7 @@
     </p:spTree>
     <p:extLst>
       <p:ext uri="{BB962C8B-B14F-4D97-AF65-F5344CB8AC3E}">
-        <p14:creationId xmlns:p14="http://schemas.microsoft.com/office/powerpoint/2010/main" xmlns="" val="3099942805"/>
+        <p14:creationId xmlns:p14="http://schemas.microsoft.com/office/powerpoint/2010/main" val="3099942805"/>
       </p:ext>
     </p:extLst>
   </p:cSld>
@@ -1140,10 +1131,9 @@
           <a:lstStyle/>
           <a:p>
             <a:r>
-              <a:rPr lang="en-US" smtClean="0"/>
+              <a:rPr lang="en-US"/>
               <a:t>Click to edit Master title style</a:t>
             </a:r>
-            <a:endParaRPr lang="en-US"/>
           </a:p>
         </p:txBody>
       </p:sp>
@@ -1169,38 +1159,37 @@
           <a:p>
             <a:pPr lvl="0"/>
             <a:r>
-              <a:rPr lang="en-US" smtClean="0"/>
+              <a:rPr lang="en-US"/>
               <a:t>Click to edit Master text styles</a:t>
             </a:r>
           </a:p>
           <a:p>
             <a:pPr lvl="1"/>
             <a:r>
-              <a:rPr lang="en-US" smtClean="0"/>
+              <a:rPr lang="en-US"/>
               <a:t>Second level</a:t>
             </a:r>
           </a:p>
           <a:p>
             <a:pPr lvl="2"/>
             <a:r>
-              <a:rPr lang="en-US" smtClean="0"/>
+              <a:rPr lang="en-US"/>
               <a:t>Third level</a:t>
             </a:r>
           </a:p>
           <a:p>
             <a:pPr lvl="3"/>
             <a:r>
-              <a:rPr lang="en-US" smtClean="0"/>
+              <a:rPr lang="en-US"/>
               <a:t>Fourth level</a:t>
             </a:r>
           </a:p>
           <a:p>
             <a:pPr lvl="4"/>
             <a:r>
-              <a:rPr lang="en-US" smtClean="0"/>
+              <a:rPr lang="en-US"/>
               <a:t>Fifth level</a:t>
             </a:r>
-            <a:endParaRPr lang="en-US"/>
           </a:p>
         </p:txBody>
       </p:sp>
@@ -1226,38 +1215,37 @@
           <a:p>
             <a:pPr lvl="0"/>
             <a:r>
-              <a:rPr lang="en-US" smtClean="0"/>
+              <a:rPr lang="en-US"/>
               <a:t>Click to edit Master text styles</a:t>
             </a:r>
           </a:p>
           <a:p>
             <a:pPr lvl="1"/>
             <a:r>
-              <a:rPr lang="en-US" smtClean="0"/>
+              <a:rPr lang="en-US"/>
               <a:t>Second level</a:t>
             </a:r>
           </a:p>
           <a:p>
             <a:pPr lvl="2"/>
             <a:r>
-              <a:rPr lang="en-US" smtClean="0"/>
+              <a:rPr lang="en-US"/>
               <a:t>Third level</a:t>
             </a:r>
           </a:p>
           <a:p>
             <a:pPr lvl="3"/>
             <a:r>
-              <a:rPr lang="en-US" smtClean="0"/>
+              <a:rPr lang="en-US"/>
               <a:t>Fourth level</a:t>
             </a:r>
           </a:p>
           <a:p>
             <a:pPr lvl="4"/>
             <a:r>
-              <a:rPr lang="en-US" smtClean="0"/>
+              <a:rPr lang="en-US"/>
               <a:t>Fifth level</a:t>
             </a:r>
-            <a:endParaRPr lang="en-US"/>
           </a:p>
         </p:txBody>
       </p:sp>
@@ -1279,7 +1267,7 @@
             <a:fld id="{672E1A00-EE2E-4C0F-AC6B-9431477BA8CA}" type="datetimeFigureOut">
               <a:rPr lang="en-US" smtClean="0"/>
               <a:pPr/>
-              <a:t>11/17/2019</a:t>
+              <a:t>23-Nov-19</a:t>
             </a:fld>
             <a:endParaRPr lang="en-US"/>
           </a:p>
@@ -1331,7 +1319,7 @@
     </p:spTree>
     <p:extLst>
       <p:ext uri="{BB962C8B-B14F-4D97-AF65-F5344CB8AC3E}">
-        <p14:creationId xmlns:p14="http://schemas.microsoft.com/office/powerpoint/2010/main" xmlns="" val="3105561879"/>
+        <p14:creationId xmlns:p14="http://schemas.microsoft.com/office/powerpoint/2010/main" val="3105561879"/>
       </p:ext>
     </p:extLst>
   </p:cSld>
@@ -1379,10 +1367,9 @@
           <a:lstStyle/>
           <a:p>
             <a:r>
-              <a:rPr lang="en-US" smtClean="0"/>
+              <a:rPr lang="en-US"/>
               <a:t>Click to edit Master title style</a:t>
             </a:r>
-            <a:endParaRPr lang="en-US"/>
           </a:p>
         </p:txBody>
       </p:sp>
@@ -1445,7 +1432,7 @@
           <a:p>
             <a:pPr lvl="0"/>
             <a:r>
-              <a:rPr lang="en-US" smtClean="0"/>
+              <a:rPr lang="en-US"/>
               <a:t>Click to edit Master text styles</a:t>
             </a:r>
           </a:p>
@@ -1473,38 +1460,37 @@
           <a:p>
             <a:pPr lvl="0"/>
             <a:r>
-              <a:rPr lang="en-US" smtClean="0"/>
+              <a:rPr lang="en-US"/>
               <a:t>Click to edit Master text styles</a:t>
             </a:r>
           </a:p>
           <a:p>
             <a:pPr lvl="1"/>
             <a:r>
-              <a:rPr lang="en-US" smtClean="0"/>
+              <a:rPr lang="en-US"/>
               <a:t>Second level</a:t>
             </a:r>
           </a:p>
           <a:p>
             <a:pPr lvl="2"/>
             <a:r>
-              <a:rPr lang="en-US" smtClean="0"/>
+              <a:rPr lang="en-US"/>
               <a:t>Third level</a:t>
             </a:r>
           </a:p>
           <a:p>
             <a:pPr lvl="3"/>
             <a:r>
-              <a:rPr lang="en-US" smtClean="0"/>
+              <a:rPr lang="en-US"/>
               <a:t>Fourth level</a:t>
             </a:r>
           </a:p>
           <a:p>
             <a:pPr lvl="4"/>
             <a:r>
-              <a:rPr lang="en-US" smtClean="0"/>
+              <a:rPr lang="en-US"/>
               <a:t>Fifth level</a:t>
             </a:r>
-            <a:endParaRPr lang="en-US"/>
           </a:p>
         </p:txBody>
       </p:sp>
@@ -1567,7 +1553,7 @@
           <a:p>
             <a:pPr lvl="0"/>
             <a:r>
-              <a:rPr lang="en-US" smtClean="0"/>
+              <a:rPr lang="en-US"/>
               <a:t>Click to edit Master text styles</a:t>
             </a:r>
           </a:p>
@@ -1595,38 +1581,37 @@
           <a:p>
             <a:pPr lvl="0"/>
             <a:r>
-              <a:rPr lang="en-US" smtClean="0"/>
+              <a:rPr lang="en-US"/>
               <a:t>Click to edit Master text styles</a:t>
             </a:r>
           </a:p>
           <a:p>
             <a:pPr lvl="1"/>
             <a:r>
-              <a:rPr lang="en-US" smtClean="0"/>
+              <a:rPr lang="en-US"/>
               <a:t>Second level</a:t>
             </a:r>
           </a:p>
           <a:p>
             <a:pPr lvl="2"/>
             <a:r>
-              <a:rPr lang="en-US" smtClean="0"/>
+              <a:rPr lang="en-US"/>
               <a:t>Third level</a:t>
             </a:r>
           </a:p>
           <a:p>
             <a:pPr lvl="3"/>
             <a:r>
-              <a:rPr lang="en-US" smtClean="0"/>
+              <a:rPr lang="en-US"/>
               <a:t>Fourth level</a:t>
             </a:r>
           </a:p>
           <a:p>
             <a:pPr lvl="4"/>
             <a:r>
-              <a:rPr lang="en-US" smtClean="0"/>
+              <a:rPr lang="en-US"/>
               <a:t>Fifth level</a:t>
             </a:r>
-            <a:endParaRPr lang="en-US"/>
           </a:p>
         </p:txBody>
       </p:sp>
@@ -1648,7 +1633,7 @@
             <a:fld id="{672E1A00-EE2E-4C0F-AC6B-9431477BA8CA}" type="datetimeFigureOut">
               <a:rPr lang="en-US" smtClean="0"/>
               <a:pPr/>
-              <a:t>11/17/2019</a:t>
+              <a:t>23-Nov-19</a:t>
             </a:fld>
             <a:endParaRPr lang="en-US"/>
           </a:p>
@@ -1700,7 +1685,7 @@
     </p:spTree>
     <p:extLst>
       <p:ext uri="{BB962C8B-B14F-4D97-AF65-F5344CB8AC3E}">
-        <p14:creationId xmlns:p14="http://schemas.microsoft.com/office/powerpoint/2010/main" xmlns="" val="4281697121"/>
+        <p14:creationId xmlns:p14="http://schemas.microsoft.com/office/powerpoint/2010/main" val="4281697121"/>
       </p:ext>
     </p:extLst>
   </p:cSld>
@@ -1743,10 +1728,9 @@
           <a:lstStyle/>
           <a:p>
             <a:r>
-              <a:rPr lang="en-US" smtClean="0"/>
+              <a:rPr lang="en-US"/>
               <a:t>Click to edit Master title style</a:t>
             </a:r>
-            <a:endParaRPr lang="en-US"/>
           </a:p>
         </p:txBody>
       </p:sp>
@@ -1768,7 +1752,7 @@
             <a:fld id="{672E1A00-EE2E-4C0F-AC6B-9431477BA8CA}" type="datetimeFigureOut">
               <a:rPr lang="en-US" smtClean="0"/>
               <a:pPr/>
-              <a:t>11/17/2019</a:t>
+              <a:t>23-Nov-19</a:t>
             </a:fld>
             <a:endParaRPr lang="en-US"/>
           </a:p>
@@ -1820,7 +1804,7 @@
     </p:spTree>
     <p:extLst>
       <p:ext uri="{BB962C8B-B14F-4D97-AF65-F5344CB8AC3E}">
-        <p14:creationId xmlns:p14="http://schemas.microsoft.com/office/powerpoint/2010/main" xmlns="" val="2356969964"/>
+        <p14:creationId xmlns:p14="http://schemas.microsoft.com/office/powerpoint/2010/main" val="2356969964"/>
       </p:ext>
     </p:extLst>
   </p:cSld>
@@ -1865,7 +1849,7 @@
             <a:fld id="{672E1A00-EE2E-4C0F-AC6B-9431477BA8CA}" type="datetimeFigureOut">
               <a:rPr lang="en-US" smtClean="0"/>
               <a:pPr/>
-              <a:t>11/17/2019</a:t>
+              <a:t>23-Nov-19</a:t>
             </a:fld>
             <a:endParaRPr lang="en-US"/>
           </a:p>
@@ -1917,7 +1901,7 @@
     </p:spTree>
     <p:extLst>
       <p:ext uri="{BB962C8B-B14F-4D97-AF65-F5344CB8AC3E}">
-        <p14:creationId xmlns:p14="http://schemas.microsoft.com/office/powerpoint/2010/main" xmlns="" val="519621263"/>
+        <p14:creationId xmlns:p14="http://schemas.microsoft.com/office/powerpoint/2010/main" val="519621263"/>
       </p:ext>
     </p:extLst>
   </p:cSld>
@@ -1969,10 +1953,9 @@
           </a:lstStyle>
           <a:p>
             <a:r>
-              <a:rPr lang="en-US" smtClean="0"/>
+              <a:rPr lang="en-US"/>
               <a:t>Click to edit Master title style</a:t>
             </a:r>
-            <a:endParaRPr lang="en-US"/>
           </a:p>
         </p:txBody>
       </p:sp>
@@ -2026,38 +2009,37 @@
           <a:p>
             <a:pPr lvl="0"/>
             <a:r>
-              <a:rPr lang="en-US" smtClean="0"/>
+              <a:rPr lang="en-US"/>
               <a:t>Click to edit Master text styles</a:t>
             </a:r>
           </a:p>
           <a:p>
             <a:pPr lvl="1"/>
             <a:r>
-              <a:rPr lang="en-US" smtClean="0"/>
+              <a:rPr lang="en-US"/>
               <a:t>Second level</a:t>
             </a:r>
           </a:p>
           <a:p>
             <a:pPr lvl="2"/>
             <a:r>
-              <a:rPr lang="en-US" smtClean="0"/>
+              <a:rPr lang="en-US"/>
               <a:t>Third level</a:t>
             </a:r>
           </a:p>
           <a:p>
             <a:pPr lvl="3"/>
             <a:r>
-              <a:rPr lang="en-US" smtClean="0"/>
+              <a:rPr lang="en-US"/>
               <a:t>Fourth level</a:t>
             </a:r>
           </a:p>
           <a:p>
             <a:pPr lvl="4"/>
             <a:r>
-              <a:rPr lang="en-US" smtClean="0"/>
+              <a:rPr lang="en-US"/>
               <a:t>Fifth level</a:t>
             </a:r>
-            <a:endParaRPr lang="en-US"/>
           </a:p>
         </p:txBody>
       </p:sp>
@@ -2120,7 +2102,7 @@
           <a:p>
             <a:pPr lvl="0"/>
             <a:r>
-              <a:rPr lang="en-US" smtClean="0"/>
+              <a:rPr lang="en-US"/>
               <a:t>Click to edit Master text styles</a:t>
             </a:r>
           </a:p>
@@ -2144,7 +2126,7 @@
             <a:fld id="{672E1A00-EE2E-4C0F-AC6B-9431477BA8CA}" type="datetimeFigureOut">
               <a:rPr lang="en-US" smtClean="0"/>
               <a:pPr/>
-              <a:t>11/17/2019</a:t>
+              <a:t>23-Nov-19</a:t>
             </a:fld>
             <a:endParaRPr lang="en-US"/>
           </a:p>
@@ -2196,7 +2178,7 @@
     </p:spTree>
     <p:extLst>
       <p:ext uri="{BB962C8B-B14F-4D97-AF65-F5344CB8AC3E}">
-        <p14:creationId xmlns:p14="http://schemas.microsoft.com/office/powerpoint/2010/main" xmlns="" val="639836036"/>
+        <p14:creationId xmlns:p14="http://schemas.microsoft.com/office/powerpoint/2010/main" val="639836036"/>
       </p:ext>
     </p:extLst>
   </p:cSld>
@@ -2248,10 +2230,9 @@
           </a:lstStyle>
           <a:p>
             <a:r>
-              <a:rPr lang="en-US" smtClean="0"/>
+              <a:rPr lang="en-US"/>
               <a:t>Click to edit Master title style</a:t>
             </a:r>
-            <a:endParaRPr lang="en-US"/>
           </a:p>
         </p:txBody>
       </p:sp>
@@ -2375,7 +2356,7 @@
           <a:p>
             <a:pPr lvl="0"/>
             <a:r>
-              <a:rPr lang="en-US" smtClean="0"/>
+              <a:rPr lang="en-US"/>
               <a:t>Click to edit Master text styles</a:t>
             </a:r>
           </a:p>
@@ -2399,7 +2380,7 @@
             <a:fld id="{672E1A00-EE2E-4C0F-AC6B-9431477BA8CA}" type="datetimeFigureOut">
               <a:rPr lang="en-US" smtClean="0"/>
               <a:pPr/>
-              <a:t>11/17/2019</a:t>
+              <a:t>23-Nov-19</a:t>
             </a:fld>
             <a:endParaRPr lang="en-US"/>
           </a:p>
@@ -2451,7 +2432,7 @@
     </p:spTree>
     <p:extLst>
       <p:ext uri="{BB962C8B-B14F-4D97-AF65-F5344CB8AC3E}">
-        <p14:creationId xmlns:p14="http://schemas.microsoft.com/office/powerpoint/2010/main" xmlns="" val="1031210403"/>
+        <p14:creationId xmlns:p14="http://schemas.microsoft.com/office/powerpoint/2010/main" val="1031210403"/>
       </p:ext>
     </p:extLst>
   </p:cSld>
@@ -2519,10 +2500,9 @@
           <a:lstStyle/>
           <a:p>
             <a:r>
-              <a:rPr lang="en-US" smtClean="0"/>
+              <a:rPr lang="en-US"/>
               <a:t>Click to edit Master title style</a:t>
             </a:r>
-            <a:endParaRPr lang="en-US"/>
           </a:p>
         </p:txBody>
       </p:sp>
@@ -2553,38 +2533,37 @@
           <a:p>
             <a:pPr lvl="0"/>
             <a:r>
-              <a:rPr lang="en-US" smtClean="0"/>
+              <a:rPr lang="en-US"/>
               <a:t>Click to edit Master text styles</a:t>
             </a:r>
           </a:p>
           <a:p>
             <a:pPr lvl="1"/>
             <a:r>
-              <a:rPr lang="en-US" smtClean="0"/>
+              <a:rPr lang="en-US"/>
               <a:t>Second level</a:t>
             </a:r>
           </a:p>
           <a:p>
             <a:pPr lvl="2"/>
             <a:r>
-              <a:rPr lang="en-US" smtClean="0"/>
+              <a:rPr lang="en-US"/>
               <a:t>Third level</a:t>
             </a:r>
           </a:p>
           <a:p>
             <a:pPr lvl="3"/>
             <a:r>
-              <a:rPr lang="en-US" smtClean="0"/>
+              <a:rPr lang="en-US"/>
               <a:t>Fourth level</a:t>
             </a:r>
           </a:p>
           <a:p>
             <a:pPr lvl="4"/>
             <a:r>
-              <a:rPr lang="en-US" smtClean="0"/>
+              <a:rPr lang="en-US"/>
               <a:t>Fifth level</a:t>
             </a:r>
-            <a:endParaRPr lang="en-US"/>
           </a:p>
         </p:txBody>
       </p:sp>
@@ -2624,7 +2603,7 @@
             <a:fld id="{672E1A00-EE2E-4C0F-AC6B-9431477BA8CA}" type="datetimeFigureOut">
               <a:rPr lang="en-US" smtClean="0"/>
               <a:pPr/>
-              <a:t>11/17/2019</a:t>
+              <a:t>23-Nov-19</a:t>
             </a:fld>
             <a:endParaRPr lang="en-US"/>
           </a:p>
@@ -2712,7 +2691,7 @@
     </p:spTree>
     <p:extLst>
       <p:ext uri="{BB962C8B-B14F-4D97-AF65-F5344CB8AC3E}">
-        <p14:creationId xmlns:p14="http://schemas.microsoft.com/office/powerpoint/2010/main" xmlns="" val="1809828173"/>
+        <p14:creationId xmlns:p14="http://schemas.microsoft.com/office/powerpoint/2010/main" val="1809828173"/>
       </p:ext>
     </p:extLst>
   </p:cSld>
@@ -3066,18 +3045,13 @@
           <a:lstStyle/>
           <a:p>
             <a:r>
-              <a:rPr lang="en-US" b="1" dirty="0" smtClean="0">
+              <a:rPr lang="en-US" b="1" dirty="0">
                 <a:solidFill>
                   <a:schemeClr val="tx2"/>
                 </a:solidFill>
               </a:rPr>
               <a:t>AutoPlot</a:t>
             </a:r>
-            <a:endParaRPr lang="en-US" b="1" dirty="0">
-              <a:solidFill>
-                <a:schemeClr val="tx2"/>
-              </a:solidFill>
-            </a:endParaRPr>
           </a:p>
         </p:txBody>
       </p:sp>
@@ -3104,22 +3078,15 @@
           <a:lstStyle/>
           <a:p>
             <a:r>
-              <a:rPr lang="en-US" sz="2800" dirty="0" smtClean="0">
+              <a:rPr lang="en-US" sz="2800" dirty="0">
                 <a:solidFill>
                   <a:schemeClr val="bg1">
                     <a:lumMod val="50000"/>
                   </a:schemeClr>
                 </a:solidFill>
               </a:rPr>
-              <a:t>Generate Automatic Plots</a:t>
-            </a:r>
-            <a:endParaRPr lang="en-US" sz="2800" dirty="0">
-              <a:solidFill>
-                <a:schemeClr val="bg1">
-                  <a:lumMod val="50000"/>
-                </a:schemeClr>
-              </a:solidFill>
-            </a:endParaRPr>
+              <a:t>Visualize Data</a:t>
+            </a:r>
           </a:p>
         </p:txBody>
       </p:sp>
@@ -3135,7 +3102,7 @@
           <a:blip r:embed="rId2" cstate="print">
             <a:extLst>
               <a:ext uri="{28A0092B-C50C-407E-A947-70E740481C1C}">
-                <a14:useLocalDpi xmlns:a14="http://schemas.microsoft.com/office/drawing/2010/main" xmlns="" val="0"/>
+                <a14:useLocalDpi xmlns:a14="http://schemas.microsoft.com/office/drawing/2010/main" val="0"/>
               </a:ext>
             </a:extLst>
           </a:blip>
@@ -3156,20 +3123,13 @@
     </p:spTree>
     <p:extLst>
       <p:ext uri="{BB962C8B-B14F-4D97-AF65-F5344CB8AC3E}">
-        <p14:creationId xmlns:p14="http://schemas.microsoft.com/office/powerpoint/2010/main" xmlns="" val="369495984"/>
+        <p14:creationId xmlns:p14="http://schemas.microsoft.com/office/powerpoint/2010/main" val="369495984"/>
       </p:ext>
     </p:extLst>
   </p:cSld>
   <p:clrMapOvr>
     <a:masterClrMapping/>
   </p:clrMapOvr>
-  <p:timing>
-    <p:tnLst>
-      <p:par>
-        <p:cTn id="1" dur="indefinite" restart="never" nodeType="tmRoot"/>
-      </p:par>
-    </p:tnLst>
-  </p:timing>
 </p:sld>
 </file>
 
@@ -3221,7 +3181,7 @@
           <a:lstStyle/>
           <a:p>
             <a:r>
-              <a:rPr lang="en-US" b="1" smtClean="0">
+              <a:rPr lang="en-US" b="1">
                 <a:solidFill>
                   <a:schemeClr val="tx2">
                     <a:lumMod val="75000"/>
@@ -3354,21 +3314,21 @@
           <a:p>
             <a:pPr algn="r"/>
             <a:r>
-              <a:rPr lang="en-GB" dirty="0" smtClean="0"/>
+              <a:rPr lang="en-GB" dirty="0"/>
               <a:t>Cleaning,</a:t>
             </a:r>
           </a:p>
           <a:p>
             <a:pPr algn="r"/>
             <a:r>
-              <a:rPr lang="en-GB" dirty="0" smtClean="0"/>
+              <a:rPr lang="en-GB" dirty="0"/>
               <a:t>Filtering, </a:t>
             </a:r>
           </a:p>
           <a:p>
             <a:pPr algn="r"/>
             <a:r>
-              <a:rPr lang="en-GB" dirty="0" smtClean="0"/>
+              <a:rPr lang="en-GB" dirty="0"/>
               <a:t>Re-structuring</a:t>
             </a:r>
             <a:endParaRPr lang="en-US" dirty="0"/>
@@ -3548,7 +3508,7 @@
               <a:buChar char="•"/>
             </a:pPr>
             <a:r>
-              <a:rPr lang="en-GB" dirty="0" smtClean="0"/>
+              <a:rPr lang="en-GB" dirty="0"/>
               <a:t> Button </a:t>
             </a:r>
           </a:p>
@@ -3558,7 +3518,7 @@
               <a:buChar char="•"/>
             </a:pPr>
             <a:r>
-              <a:rPr lang="en-GB" dirty="0" smtClean="0"/>
+              <a:rPr lang="en-GB" dirty="0"/>
               <a:t> Shell </a:t>
             </a:r>
           </a:p>
@@ -3568,7 +3528,7 @@
               <a:buChar char="•"/>
             </a:pPr>
             <a:r>
-              <a:rPr lang="en-GB" dirty="0" smtClean="0"/>
+              <a:rPr lang="en-GB" dirty="0"/>
               <a:t> Auto</a:t>
             </a:r>
             <a:endParaRPr lang="en-US" dirty="0"/>
@@ -3598,7 +3558,7 @@
           <a:lstStyle/>
           <a:p>
             <a:r>
-              <a:rPr lang="en-GB" dirty="0" smtClean="0"/>
+              <a:rPr lang="en-GB" dirty="0"/>
               <a:t>Generate Plots</a:t>
             </a:r>
             <a:endParaRPr lang="en-US" dirty="0"/>
@@ -3608,20 +3568,13 @@
     </p:spTree>
     <p:extLst>
       <p:ext uri="{BB962C8B-B14F-4D97-AF65-F5344CB8AC3E}">
-        <p14:creationId xmlns:p14="http://schemas.microsoft.com/office/powerpoint/2010/main" xmlns="" val="777954675"/>
+        <p14:creationId xmlns:p14="http://schemas.microsoft.com/office/powerpoint/2010/main" val="777954675"/>
       </p:ext>
     </p:extLst>
   </p:cSld>
   <p:clrMapOvr>
     <a:masterClrMapping/>
   </p:clrMapOvr>
-  <p:timing>
-    <p:tnLst>
-      <p:par>
-        <p:cTn id="1" dur="indefinite" restart="never" nodeType="tmRoot"/>
-      </p:par>
-    </p:tnLst>
-  </p:timing>
 </p:sld>
 </file>
 
@@ -3658,7 +3611,7 @@
           <a:lstStyle/>
           <a:p>
             <a:r>
-              <a:rPr lang="en-GB" b="1" dirty="0" smtClean="0">
+              <a:rPr lang="en-GB" b="1" dirty="0">
                 <a:solidFill>
                   <a:schemeClr val="tx2">
                     <a:lumMod val="75000"/>
@@ -3698,7 +3651,7 @@
           <a:lstStyle/>
           <a:p>
             <a:r>
-              <a:rPr lang="en-GB" dirty="0" smtClean="0">
+              <a:rPr lang="en-GB" dirty="0">
                 <a:latin typeface="Segoe UI" panose="020B0502040204020203" pitchFamily="34" charset="0"/>
                 <a:cs typeface="Segoe UI" panose="020B0502040204020203" pitchFamily="34" charset="0"/>
               </a:rPr>
@@ -3706,7 +3659,7 @@
             </a:r>
           </a:p>
           <a:p>
-            <a:endParaRPr lang="en-US" dirty="0" smtClean="0">
+            <a:endParaRPr lang="en-US" dirty="0">
               <a:latin typeface="Segoe UI" panose="020B0502040204020203" pitchFamily="34" charset="0"/>
               <a:cs typeface="Segoe UI" panose="020B0502040204020203" pitchFamily="34" charset="0"/>
             </a:endParaRPr>
@@ -3716,20 +3669,13 @@
     </p:spTree>
     <p:extLst>
       <p:ext uri="{BB962C8B-B14F-4D97-AF65-F5344CB8AC3E}">
-        <p14:creationId xmlns:p14="http://schemas.microsoft.com/office/powerpoint/2010/main" xmlns="" val="777954675"/>
+        <p14:creationId xmlns:p14="http://schemas.microsoft.com/office/powerpoint/2010/main" val="777954675"/>
       </p:ext>
     </p:extLst>
   </p:cSld>
   <p:clrMapOvr>
     <a:masterClrMapping/>
   </p:clrMapOvr>
-  <p:timing>
-    <p:tnLst>
-      <p:par>
-        <p:cTn id="1" dur="indefinite" restart="never" nodeType="tmRoot"/>
-      </p:par>
-    </p:tnLst>
-  </p:timing>
 </p:sld>
 </file>
 
@@ -3766,7 +3712,7 @@
           <a:lstStyle/>
           <a:p>
             <a:r>
-              <a:rPr lang="en-GB" b="1" dirty="0" smtClean="0">
+              <a:rPr lang="en-GB" b="1" dirty="0">
                 <a:solidFill>
                   <a:schemeClr val="tx2">
                     <a:lumMod val="75000"/>
@@ -3776,7 +3722,7 @@
               <a:t>Modules: </a:t>
             </a:r>
             <a:r>
-              <a:rPr lang="en-GB" dirty="0" smtClean="0">
+              <a:rPr lang="en-GB" dirty="0">
                 <a:solidFill>
                   <a:schemeClr val="tx2">
                     <a:lumMod val="75000"/>
@@ -3807,7 +3753,7 @@
           <a:blip r:embed="rId2" cstate="print">
             <a:extLst>
               <a:ext uri="{28A0092B-C50C-407E-A947-70E740481C1C}">
-                <a14:useLocalDpi xmlns:a14="http://schemas.microsoft.com/office/drawing/2010/main" xmlns="" val="0"/>
+                <a14:useLocalDpi xmlns:a14="http://schemas.microsoft.com/office/drawing/2010/main" val="0"/>
               </a:ext>
             </a:extLst>
           </a:blip>
@@ -3828,20 +3774,13 @@
     </p:spTree>
     <p:extLst>
       <p:ext uri="{BB962C8B-B14F-4D97-AF65-F5344CB8AC3E}">
-        <p14:creationId xmlns:p14="http://schemas.microsoft.com/office/powerpoint/2010/main" xmlns="" val="310917687"/>
+        <p14:creationId xmlns:p14="http://schemas.microsoft.com/office/powerpoint/2010/main" val="310917687"/>
       </p:ext>
     </p:extLst>
   </p:cSld>
   <p:clrMapOvr>
     <a:masterClrMapping/>
   </p:clrMapOvr>
-  <p:timing>
-    <p:tnLst>
-      <p:par>
-        <p:cTn id="1" dur="indefinite" restart="never" nodeType="tmRoot"/>
-      </p:par>
-    </p:tnLst>
-  </p:timing>
 </p:sld>
 </file>
 
@@ -3878,7 +3817,7 @@
           <a:lstStyle/>
           <a:p>
             <a:r>
-              <a:rPr lang="en-GB" b="1" dirty="0" smtClean="0">
+              <a:rPr lang="en-GB" b="1" dirty="0">
                 <a:solidFill>
                   <a:schemeClr val="tx2">
                     <a:lumMod val="75000"/>
@@ -3888,7 +3827,7 @@
               <a:t>Modules: </a:t>
             </a:r>
             <a:r>
-              <a:rPr lang="en-GB" dirty="0" smtClean="0">
+              <a:rPr lang="en-GB" dirty="0">
                 <a:solidFill>
                   <a:schemeClr val="tx2">
                     <a:lumMod val="75000"/>
@@ -3919,7 +3858,7 @@
           <a:blip r:embed="rId2" cstate="print">
             <a:extLst>
               <a:ext uri="{28A0092B-C50C-407E-A947-70E740481C1C}">
-                <a14:useLocalDpi xmlns:a14="http://schemas.microsoft.com/office/drawing/2010/main" xmlns="" val="0"/>
+                <a14:useLocalDpi xmlns:a14="http://schemas.microsoft.com/office/drawing/2010/main" val="0"/>
               </a:ext>
             </a:extLst>
           </a:blip>
@@ -3940,20 +3879,13 @@
     </p:spTree>
     <p:extLst>
       <p:ext uri="{BB962C8B-B14F-4D97-AF65-F5344CB8AC3E}">
-        <p14:creationId xmlns:p14="http://schemas.microsoft.com/office/powerpoint/2010/main" xmlns="" val="3454357384"/>
+        <p14:creationId xmlns:p14="http://schemas.microsoft.com/office/powerpoint/2010/main" val="3454357384"/>
       </p:ext>
     </p:extLst>
   </p:cSld>
   <p:clrMapOvr>
     <a:masterClrMapping/>
   </p:clrMapOvr>
-  <p:timing>
-    <p:tnLst>
-      <p:par>
-        <p:cTn id="1" dur="indefinite" restart="never" nodeType="tmRoot"/>
-      </p:par>
-    </p:tnLst>
-  </p:timing>
 </p:sld>
 </file>
 
@@ -3990,7 +3922,7 @@
           <a:lstStyle/>
           <a:p>
             <a:r>
-              <a:rPr lang="en-GB" b="1" dirty="0" smtClean="0">
+              <a:rPr lang="en-GB" b="1" dirty="0">
                 <a:solidFill>
                   <a:schemeClr val="tx2">
                     <a:lumMod val="75000"/>
@@ -4000,7 +3932,7 @@
               <a:t>Modules: </a:t>
             </a:r>
             <a:r>
-              <a:rPr lang="en-GB" dirty="0" smtClean="0">
+              <a:rPr lang="en-GB" dirty="0">
                 <a:solidFill>
                   <a:schemeClr val="tx2">
                     <a:lumMod val="75000"/>
@@ -4031,7 +3963,7 @@
           <a:blip r:embed="rId2" cstate="print">
             <a:extLst>
               <a:ext uri="{28A0092B-C50C-407E-A947-70E740481C1C}">
-                <a14:useLocalDpi xmlns:a14="http://schemas.microsoft.com/office/drawing/2010/main" xmlns="" val="0"/>
+                <a14:useLocalDpi xmlns:a14="http://schemas.microsoft.com/office/drawing/2010/main" val="0"/>
               </a:ext>
             </a:extLst>
           </a:blip>
@@ -4052,20 +3984,13 @@
     </p:spTree>
     <p:extLst>
       <p:ext uri="{BB962C8B-B14F-4D97-AF65-F5344CB8AC3E}">
-        <p14:creationId xmlns:p14="http://schemas.microsoft.com/office/powerpoint/2010/main" xmlns="" val="3081183430"/>
+        <p14:creationId xmlns:p14="http://schemas.microsoft.com/office/powerpoint/2010/main" val="3081183430"/>
       </p:ext>
     </p:extLst>
   </p:cSld>
   <p:clrMapOvr>
     <a:masterClrMapping/>
   </p:clrMapOvr>
-  <p:timing>
-    <p:tnLst>
-      <p:par>
-        <p:cTn id="1" dur="indefinite" restart="never" nodeType="tmRoot"/>
-      </p:par>
-    </p:tnLst>
-  </p:timing>
 </p:sld>
 </file>
 
@@ -4102,7 +4027,7 @@
           <a:lstStyle/>
           <a:p>
             <a:r>
-              <a:rPr lang="en-GB" b="1" dirty="0" smtClean="0">
+              <a:rPr lang="en-GB" b="1" dirty="0">
                 <a:solidFill>
                   <a:schemeClr val="tx2">
                     <a:lumMod val="75000"/>
@@ -4112,7 +4037,7 @@
               <a:t>Modules: </a:t>
             </a:r>
             <a:r>
-              <a:rPr lang="en-GB" dirty="0" smtClean="0">
+              <a:rPr lang="en-GB" dirty="0">
                 <a:solidFill>
                   <a:schemeClr val="tx2">
                     <a:lumMod val="75000"/>
@@ -4143,7 +4068,7 @@
           <a:blip r:embed="rId2" cstate="print">
             <a:extLst>
               <a:ext uri="{28A0092B-C50C-407E-A947-70E740481C1C}">
-                <a14:useLocalDpi xmlns:a14="http://schemas.microsoft.com/office/drawing/2010/main" xmlns="" val="0"/>
+                <a14:useLocalDpi xmlns:a14="http://schemas.microsoft.com/office/drawing/2010/main" val="0"/>
               </a:ext>
             </a:extLst>
           </a:blip>
@@ -4164,20 +4089,13 @@
     </p:spTree>
     <p:extLst>
       <p:ext uri="{BB962C8B-B14F-4D97-AF65-F5344CB8AC3E}">
-        <p14:creationId xmlns:p14="http://schemas.microsoft.com/office/powerpoint/2010/main" xmlns="" val="2496049018"/>
+        <p14:creationId xmlns:p14="http://schemas.microsoft.com/office/powerpoint/2010/main" val="2496049018"/>
       </p:ext>
     </p:extLst>
   </p:cSld>
   <p:clrMapOvr>
     <a:masterClrMapping/>
   </p:clrMapOvr>
-  <p:timing>
-    <p:tnLst>
-      <p:par>
-        <p:cTn id="1" dur="indefinite" restart="never" nodeType="tmRoot"/>
-      </p:par>
-    </p:tnLst>
-  </p:timing>
 </p:sld>
 </file>
 
@@ -4214,7 +4132,7 @@
           <a:lstStyle/>
           <a:p>
             <a:r>
-              <a:rPr lang="en-GB" b="1" dirty="0" smtClean="0">
+              <a:rPr lang="en-GB" b="1" dirty="0">
                 <a:solidFill>
                   <a:schemeClr val="tx2">
                     <a:lumMod val="75000"/>
@@ -4224,7 +4142,7 @@
               <a:t>Modules: </a:t>
             </a:r>
             <a:r>
-              <a:rPr lang="en-GB" dirty="0" err="1" smtClean="0">
+              <a:rPr lang="en-GB" dirty="0" err="1">
                 <a:solidFill>
                   <a:schemeClr val="tx2">
                     <a:lumMod val="75000"/>
@@ -4234,7 +4152,7 @@
               <a:t>Unif</a:t>
             </a:r>
             <a:r>
-              <a:rPr lang="en-GB" dirty="0" smtClean="0">
+              <a:rPr lang="en-GB" dirty="0">
                 <a:solidFill>
                   <a:schemeClr val="tx2">
                     <a:lumMod val="75000"/>
@@ -4265,7 +4183,7 @@
           <a:blip r:embed="rId2" cstate="print">
             <a:extLst>
               <a:ext uri="{28A0092B-C50C-407E-A947-70E740481C1C}">
-                <a14:useLocalDpi xmlns:a14="http://schemas.microsoft.com/office/drawing/2010/main" xmlns="" val="0"/>
+                <a14:useLocalDpi xmlns:a14="http://schemas.microsoft.com/office/drawing/2010/main" val="0"/>
               </a:ext>
             </a:extLst>
           </a:blip>
@@ -4286,20 +4204,13 @@
     </p:spTree>
     <p:extLst>
       <p:ext uri="{BB962C8B-B14F-4D97-AF65-F5344CB8AC3E}">
-        <p14:creationId xmlns:p14="http://schemas.microsoft.com/office/powerpoint/2010/main" xmlns="" val="1124522552"/>
+        <p14:creationId xmlns:p14="http://schemas.microsoft.com/office/powerpoint/2010/main" val="1124522552"/>
       </p:ext>
     </p:extLst>
   </p:cSld>
   <p:clrMapOvr>
     <a:masterClrMapping/>
   </p:clrMapOvr>
-  <p:timing>
-    <p:tnLst>
-      <p:par>
-        <p:cTn id="1" dur="indefinite" restart="never" nodeType="tmRoot"/>
-      </p:par>
-    </p:tnLst>
-  </p:timing>
 </p:sld>
 </file>
 
@@ -4336,7 +4247,7 @@
           <a:lstStyle/>
           <a:p>
             <a:r>
-              <a:rPr lang="en-US" b="1" dirty="0" smtClean="0">
+              <a:rPr lang="en-US" b="1" dirty="0">
                 <a:solidFill>
                   <a:schemeClr val="tx2">
                     <a:lumMod val="75000"/>
@@ -4376,21 +4287,21 @@
           <a:lstStyle/>
           <a:p>
             <a:r>
-              <a:rPr lang="en-GB" b="1" dirty="0" smtClean="0">
+              <a:rPr lang="en-GB" b="1" dirty="0">
                 <a:latin typeface="Segoe UI" panose="020B0502040204020203" pitchFamily="34" charset="0"/>
                 <a:cs typeface="Segoe UI" panose="020B0502040204020203" pitchFamily="34" charset="0"/>
               </a:rPr>
               <a:t>Stage-2:</a:t>
             </a:r>
             <a:r>
-              <a:rPr lang="en-GB" dirty="0" smtClean="0">
+              <a:rPr lang="en-GB" dirty="0">
                 <a:latin typeface="Segoe UI" panose="020B0502040204020203" pitchFamily="34" charset="0"/>
                 <a:cs typeface="Segoe UI" panose="020B0502040204020203" pitchFamily="34" charset="0"/>
               </a:rPr>
               <a:t> Applying Nelson rules </a:t>
             </a:r>
             <a:r>
-              <a:rPr lang="en-GB" dirty="0" smtClean="0">
+              <a:rPr lang="en-GB" dirty="0">
                 <a:solidFill>
                   <a:srgbClr val="C00000"/>
                 </a:solidFill>
@@ -4402,7 +4313,7 @@
           </a:p>
           <a:p>
             <a:r>
-              <a:rPr lang="en-GB" dirty="0" smtClean="0">
+              <a:rPr lang="en-GB" dirty="0">
                 <a:latin typeface="Segoe UI" panose="020B0502040204020203" pitchFamily="34" charset="0"/>
                 <a:cs typeface="Segoe UI" panose="020B0502040204020203" pitchFamily="34" charset="0"/>
               </a:rPr>
@@ -4411,41 +4322,41 @@
           </a:p>
           <a:p>
             <a:r>
-              <a:rPr lang="en-GB" dirty="0" smtClean="0">
+              <a:rPr lang="en-GB" dirty="0">
                 <a:latin typeface="Segoe UI" panose="020B0502040204020203" pitchFamily="34" charset="0"/>
                 <a:cs typeface="Segoe UI" panose="020B0502040204020203" pitchFamily="34" charset="0"/>
               </a:rPr>
               <a:t>Various types of plots can be created – Line, Scatter, Box, </a:t>
             </a:r>
             <a:r>
-              <a:rPr lang="en-GB" dirty="0" err="1" smtClean="0">
+              <a:rPr lang="en-GB" dirty="0" err="1">
                 <a:latin typeface="Segoe UI" panose="020B0502040204020203" pitchFamily="34" charset="0"/>
                 <a:cs typeface="Segoe UI" panose="020B0502040204020203" pitchFamily="34" charset="0"/>
               </a:rPr>
               <a:t>Qiver</a:t>
             </a:r>
             <a:r>
-              <a:rPr lang="en-GB" dirty="0" smtClean="0">
+              <a:rPr lang="en-GB" dirty="0">
                 <a:latin typeface="Segoe UI" panose="020B0502040204020203" pitchFamily="34" charset="0"/>
                 <a:cs typeface="Segoe UI" panose="020B0502040204020203" pitchFamily="34" charset="0"/>
               </a:rPr>
               <a:t>, Contour (2-D, 3-D), </a:t>
             </a:r>
             <a:r>
-              <a:rPr lang="en-GB" dirty="0" err="1" smtClean="0">
+              <a:rPr lang="en-GB" dirty="0" err="1">
                 <a:latin typeface="Segoe UI" panose="020B0502040204020203" pitchFamily="34" charset="0"/>
                 <a:cs typeface="Segoe UI" panose="020B0502040204020203" pitchFamily="34" charset="0"/>
               </a:rPr>
               <a:t>Heatmap</a:t>
             </a:r>
             <a:r>
-              <a:rPr lang="en-GB" dirty="0" smtClean="0">
+              <a:rPr lang="en-GB" dirty="0">
                 <a:latin typeface="Segoe UI" panose="020B0502040204020203" pitchFamily="34" charset="0"/>
                 <a:cs typeface="Segoe UI" panose="020B0502040204020203" pitchFamily="34" charset="0"/>
               </a:rPr>
               <a:t>, </a:t>
             </a:r>
-            <a:endParaRPr lang="en-US" dirty="0" smtClean="0">
+            <a:endParaRPr lang="en-US" dirty="0">
               <a:latin typeface="Segoe UI" panose="020B0502040204020203" pitchFamily="34" charset="0"/>
               <a:cs typeface="Segoe UI" panose="020B0502040204020203" pitchFamily="34" charset="0"/>
             </a:endParaRPr>
@@ -4510,20 +4421,13 @@
     </p:spTree>
     <p:extLst>
       <p:ext uri="{BB962C8B-B14F-4D97-AF65-F5344CB8AC3E}">
-        <p14:creationId xmlns:p14="http://schemas.microsoft.com/office/powerpoint/2010/main" xmlns="" val="777954675"/>
+        <p14:creationId xmlns:p14="http://schemas.microsoft.com/office/powerpoint/2010/main" val="777954675"/>
       </p:ext>
     </p:extLst>
   </p:cSld>
   <p:clrMapOvr>
     <a:masterClrMapping/>
   </p:clrMapOvr>
-  <p:timing>
-    <p:tnLst>
-      <p:par>
-        <p:cTn id="1" dur="indefinite" restart="never" nodeType="tmRoot"/>
-      </p:par>
-    </p:tnLst>
-  </p:timing>
 </p:sld>
 </file>
 
@@ -4575,7 +4479,7 @@
           <a:lstStyle/>
           <a:p>
             <a:r>
-              <a:rPr lang="en-US" b="1" dirty="0" smtClean="0">
+              <a:rPr lang="en-US" b="1" dirty="0">
                 <a:solidFill>
                   <a:schemeClr val="tx2">
                     <a:lumMod val="75000"/>
@@ -4584,13 +4488,6 @@
               </a:rPr>
               <a:t>Content</a:t>
             </a:r>
-            <a:endParaRPr lang="en-US" b="1" dirty="0">
-              <a:solidFill>
-                <a:schemeClr val="tx2">
-                  <a:lumMod val="75000"/>
-                </a:schemeClr>
-              </a:solidFill>
-            </a:endParaRPr>
           </a:p>
         </p:txBody>
       </p:sp>
@@ -4610,7 +4507,7 @@
           <a:lstStyle/>
           <a:p>
             <a:r>
-              <a:rPr lang="en-US" u="sng" dirty="0" smtClean="0">
+              <a:rPr lang="en-US" u="sng" dirty="0">
                 <a:latin typeface="Segoe UI" panose="020B0502040204020203" pitchFamily="34" charset="0"/>
                 <a:cs typeface="Segoe UI" panose="020B0502040204020203" pitchFamily="34" charset="0"/>
               </a:rPr>
@@ -4619,7 +4516,7 @@
           </a:p>
           <a:p>
             <a:r>
-              <a:rPr lang="en-US" u="sng" dirty="0" smtClean="0">
+              <a:rPr lang="en-US" u="sng" dirty="0">
                 <a:latin typeface="Segoe UI" panose="020B0502040204020203" pitchFamily="34" charset="0"/>
                 <a:cs typeface="Segoe UI" panose="020B0502040204020203" pitchFamily="34" charset="0"/>
               </a:rPr>
@@ -4628,7 +4525,7 @@
           </a:p>
           <a:p>
             <a:r>
-              <a:rPr lang="en-US" u="sng" dirty="0" smtClean="0">
+              <a:rPr lang="en-US" u="sng" dirty="0">
                 <a:latin typeface="Segoe UI" panose="020B0502040204020203" pitchFamily="34" charset="0"/>
                 <a:cs typeface="Segoe UI" panose="020B0502040204020203" pitchFamily="34" charset="0"/>
               </a:rPr>
@@ -4637,61 +4534,61 @@
           </a:p>
           <a:p>
             <a:r>
-              <a:rPr lang="en-US" u="sng" dirty="0" smtClean="0">
+              <a:rPr lang="en-US" u="sng" dirty="0">
                 <a:latin typeface="Segoe UI" panose="020B0502040204020203" pitchFamily="34" charset="0"/>
                 <a:cs typeface="Segoe UI" panose="020B0502040204020203" pitchFamily="34" charset="0"/>
               </a:rPr>
               <a:t>Demo:</a:t>
             </a:r>
             <a:r>
-              <a:rPr lang="en-US" dirty="0" smtClean="0">
+              <a:rPr lang="en-US" dirty="0">
                 <a:latin typeface="Segoe UI" panose="020B0502040204020203" pitchFamily="34" charset="0"/>
                 <a:cs typeface="Segoe UI" panose="020B0502040204020203" pitchFamily="34" charset="0"/>
               </a:rPr>
               <a:t> DE, </a:t>
             </a:r>
             <a:r>
-              <a:rPr lang="en-US" dirty="0" err="1" smtClean="0">
+              <a:rPr lang="en-US" dirty="0" err="1">
                 <a:latin typeface="Segoe UI" panose="020B0502040204020203" pitchFamily="34" charset="0"/>
                 <a:cs typeface="Segoe UI" panose="020B0502040204020203" pitchFamily="34" charset="0"/>
               </a:rPr>
               <a:t>Diffu</a:t>
             </a:r>
             <a:r>
-              <a:rPr lang="en-US" dirty="0" smtClean="0">
+              <a:rPr lang="en-US" dirty="0">
                 <a:latin typeface="Segoe UI" panose="020B0502040204020203" pitchFamily="34" charset="0"/>
                 <a:cs typeface="Segoe UI" panose="020B0502040204020203" pitchFamily="34" charset="0"/>
               </a:rPr>
               <a:t>., WE</a:t>
             </a:r>
-            <a:endParaRPr lang="en-US" dirty="0" smtClean="0"/>
-          </a:p>
-          <a:p>
-            <a:r>
-              <a:rPr lang="en-US" u="sng" dirty="0" smtClean="0"/>
+            <a:endParaRPr lang="en-US" dirty="0"/>
+          </a:p>
+          <a:p>
+            <a:r>
+              <a:rPr lang="en-US" u="sng" dirty="0"/>
               <a:t>Scripting/Coding</a:t>
             </a:r>
           </a:p>
           <a:p>
             <a:r>
-              <a:rPr lang="en-US" u="sng" dirty="0" smtClean="0"/>
+              <a:rPr lang="en-US" u="sng" dirty="0"/>
               <a:t>Coding Essentials</a:t>
             </a:r>
           </a:p>
           <a:p>
             <a:r>
-              <a:rPr lang="en-US" u="sng" dirty="0" smtClean="0"/>
+              <a:rPr lang="en-US" u="sng" dirty="0"/>
               <a:t>Modules:</a:t>
             </a:r>
             <a:r>
-              <a:rPr lang="en-US" dirty="0" smtClean="0"/>
+              <a:rPr lang="en-US" dirty="0"/>
               <a:t> CP, ER, Uniformity</a:t>
             </a:r>
-            <a:endParaRPr lang="en-US" u="sng" dirty="0" smtClean="0"/>
-          </a:p>
-          <a:p>
-            <a:r>
-              <a:rPr lang="en-GB" u="sng" dirty="0" smtClean="0"/>
+            <a:endParaRPr lang="en-US" u="sng" dirty="0"/>
+          </a:p>
+          <a:p>
+            <a:r>
+              <a:rPr lang="en-GB" u="sng" dirty="0"/>
               <a:t>Utilities</a:t>
             </a:r>
             <a:endParaRPr lang="en-US" u="sng" dirty="0"/>
@@ -4701,20 +4598,13 @@
     </p:spTree>
     <p:extLst>
       <p:ext uri="{BB962C8B-B14F-4D97-AF65-F5344CB8AC3E}">
-        <p14:creationId xmlns:p14="http://schemas.microsoft.com/office/powerpoint/2010/main" xmlns="" val="703350114"/>
+        <p14:creationId xmlns:p14="http://schemas.microsoft.com/office/powerpoint/2010/main" val="703350114"/>
       </p:ext>
     </p:extLst>
   </p:cSld>
   <p:clrMapOvr>
     <a:masterClrMapping/>
   </p:clrMapOvr>
-  <p:timing>
-    <p:tnLst>
-      <p:par>
-        <p:cTn id="1" dur="indefinite" restart="never" nodeType="tmRoot"/>
-      </p:par>
-    </p:tnLst>
-  </p:timing>
 </p:sld>
 </file>
 
@@ -4751,7 +4641,7 @@
           <a:lstStyle/>
           <a:p>
             <a:r>
-              <a:rPr lang="en-US" b="1" dirty="0" smtClean="0">
+              <a:rPr lang="en-US" b="1" dirty="0">
                 <a:solidFill>
                   <a:schemeClr val="tx2">
                     <a:lumMod val="75000"/>
@@ -4760,13 +4650,6 @@
               </a:rPr>
               <a:t>Background</a:t>
             </a:r>
-            <a:endParaRPr lang="en-US" b="1" dirty="0">
-              <a:solidFill>
-                <a:schemeClr val="tx2">
-                  <a:lumMod val="75000"/>
-                </a:schemeClr>
-              </a:solidFill>
-            </a:endParaRPr>
           </a:p>
         </p:txBody>
       </p:sp>
@@ -4794,17 +4677,17 @@
               <a:t>AutoPlot</a:t>
             </a:r>
             <a:r>
-              <a:rPr lang="en-GB" dirty="0" smtClean="0"/>
+              <a:rPr lang="en-GB" dirty="0"/>
               <a:t> is an Indigenous Software created for generating plots automatically from the data (especially QC) maintained in all the sections of VFD.</a:t>
             </a:r>
             <a:br>
-              <a:rPr lang="en-GB" dirty="0" smtClean="0"/>
+              <a:rPr lang="en-GB" dirty="0"/>
             </a:br>
-            <a:endParaRPr lang="en-GB" dirty="0" smtClean="0"/>
-          </a:p>
-          <a:p>
-            <a:r>
-              <a:rPr lang="en-GB" dirty="0" smtClean="0">
+            <a:endParaRPr lang="en-GB" dirty="0"/>
+          </a:p>
+          <a:p>
+            <a:r>
+              <a:rPr lang="en-GB" dirty="0">
                 <a:latin typeface="Segoe UI" panose="020B0502040204020203" pitchFamily="34" charset="0"/>
                 <a:cs typeface="Segoe UI" panose="020B0502040204020203" pitchFamily="34" charset="0"/>
               </a:rPr>
@@ -4814,7 +4697,7 @@
           <a:p>
             <a:pPr lvl="1"/>
             <a:r>
-              <a:rPr lang="en-GB" dirty="0" smtClean="0">
+              <a:rPr lang="en-GB" dirty="0">
                 <a:latin typeface="Segoe UI" panose="020B0502040204020203" pitchFamily="34" charset="0"/>
                 <a:cs typeface="Segoe UI" panose="020B0502040204020203" pitchFamily="34" charset="0"/>
               </a:rPr>
@@ -4824,7 +4707,7 @@
           <a:p>
             <a:pPr lvl="1"/>
             <a:r>
-              <a:rPr lang="en-GB" dirty="0" smtClean="0">
+              <a:rPr lang="en-GB" dirty="0">
                 <a:latin typeface="Segoe UI" panose="020B0502040204020203" pitchFamily="34" charset="0"/>
                 <a:cs typeface="Segoe UI" panose="020B0502040204020203" pitchFamily="34" charset="0"/>
               </a:rPr>
@@ -4834,13 +4717,13 @@
           <a:p>
             <a:pPr lvl="1"/>
             <a:r>
-              <a:rPr lang="en-GB" dirty="0" smtClean="0">
+              <a:rPr lang="en-GB" dirty="0">
                 <a:latin typeface="Segoe UI" panose="020B0502040204020203" pitchFamily="34" charset="0"/>
                 <a:cs typeface="Segoe UI" panose="020B0502040204020203" pitchFamily="34" charset="0"/>
               </a:rPr>
               <a:t>Excel (with single/multiple sheets)</a:t>
             </a:r>
-            <a:endParaRPr lang="en-US" dirty="0" smtClean="0">
+            <a:endParaRPr lang="en-US" dirty="0">
               <a:latin typeface="Segoe UI" panose="020B0502040204020203" pitchFamily="34" charset="0"/>
               <a:cs typeface="Segoe UI" panose="020B0502040204020203" pitchFamily="34" charset="0"/>
             </a:endParaRPr>
@@ -4850,20 +4733,13 @@
     </p:spTree>
     <p:extLst>
       <p:ext uri="{BB962C8B-B14F-4D97-AF65-F5344CB8AC3E}">
-        <p14:creationId xmlns:p14="http://schemas.microsoft.com/office/powerpoint/2010/main" xmlns="" val="2153926227"/>
+        <p14:creationId xmlns:p14="http://schemas.microsoft.com/office/powerpoint/2010/main" val="2153926227"/>
       </p:ext>
     </p:extLst>
   </p:cSld>
   <p:clrMapOvr>
     <a:masterClrMapping/>
   </p:clrMapOvr>
-  <p:timing>
-    <p:tnLst>
-      <p:par>
-        <p:cTn id="1" dur="indefinite" restart="never" nodeType="tmRoot"/>
-      </p:par>
-    </p:tnLst>
-  </p:timing>
 </p:sld>
 </file>
 
@@ -4900,7 +4776,7 @@
           <a:lstStyle/>
           <a:p>
             <a:r>
-              <a:rPr lang="en-US" b="1" dirty="0" smtClean="0">
+              <a:rPr lang="en-US" b="1" dirty="0">
                 <a:solidFill>
                   <a:schemeClr val="tx2">
                     <a:lumMod val="75000"/>
@@ -4909,13 +4785,6 @@
               </a:rPr>
               <a:t>Problems</a:t>
             </a:r>
-            <a:endParaRPr lang="en-US" b="1" dirty="0">
-              <a:solidFill>
-                <a:schemeClr val="tx2">
-                  <a:lumMod val="75000"/>
-                </a:schemeClr>
-              </a:solidFill>
-            </a:endParaRPr>
           </a:p>
         </p:txBody>
       </p:sp>
@@ -4935,21 +4804,21 @@
           <a:lstStyle/>
           <a:p>
             <a:r>
-              <a:rPr lang="en-GB" dirty="0" smtClean="0"/>
+              <a:rPr lang="en-GB" dirty="0"/>
               <a:t>In order to generate Plots for QC data (maintained in Excel), currently we drag each parameter (like Date, Control limits, Spec limits, Etch Rate/Thickness/CP, etc.) manually to create/update the charts. And this consumes a good amount of valuable time in Engineer's data analysis job.</a:t>
             </a:r>
           </a:p>
           <a:p>
             <a:r>
-              <a:rPr lang="en-GB" dirty="0" smtClean="0"/>
+              <a:rPr lang="en-GB" dirty="0"/>
               <a:t>In some sections, they are dependent on plots created in DMIS, which is not that satisfactory as it doesn't contain </a:t>
             </a:r>
             <a:r>
-              <a:rPr lang="en-GB" b="1" dirty="0" smtClean="0"/>
+              <a:rPr lang="en-GB" b="1" dirty="0"/>
               <a:t>'Remarks'</a:t>
             </a:r>
             <a:r>
-              <a:rPr lang="en-GB" dirty="0" smtClean="0"/>
+              <a:rPr lang="en-GB" dirty="0"/>
               <a:t> column feature and more.</a:t>
             </a:r>
           </a:p>
@@ -4957,14 +4826,10 @@
             <a:pPr>
               <a:buNone/>
             </a:pPr>
-            <a:r>
-              <a:rPr lang="en-GB" dirty="0" smtClean="0"/>
-              <a:t/>
-            </a:r>
             <a:br>
-              <a:rPr lang="en-GB" dirty="0" smtClean="0"/>
+              <a:rPr lang="en-GB" dirty="0"/>
             </a:br>
-            <a:endParaRPr lang="en-US" dirty="0" smtClean="0">
+            <a:endParaRPr lang="en-US" dirty="0">
               <a:latin typeface="Segoe UI" panose="020B0502040204020203" pitchFamily="34" charset="0"/>
               <a:cs typeface="Segoe UI" panose="020B0502040204020203" pitchFamily="34" charset="0"/>
             </a:endParaRPr>
@@ -4974,20 +4839,13 @@
     </p:spTree>
     <p:extLst>
       <p:ext uri="{BB962C8B-B14F-4D97-AF65-F5344CB8AC3E}">
-        <p14:creationId xmlns:p14="http://schemas.microsoft.com/office/powerpoint/2010/main" xmlns="" val="1835708266"/>
+        <p14:creationId xmlns:p14="http://schemas.microsoft.com/office/powerpoint/2010/main" val="1835708266"/>
       </p:ext>
     </p:extLst>
   </p:cSld>
   <p:clrMapOvr>
     <a:masterClrMapping/>
   </p:clrMapOvr>
-  <p:timing>
-    <p:tnLst>
-      <p:par>
-        <p:cTn id="1" dur="indefinite" restart="never" nodeType="tmRoot"/>
-      </p:par>
-    </p:tnLst>
-  </p:timing>
 </p:sld>
 </file>
 
@@ -5024,7 +4882,7 @@
           <a:lstStyle/>
           <a:p>
             <a:r>
-              <a:rPr lang="en-US" b="1" dirty="0" smtClean="0">
+              <a:rPr lang="en-US" b="1" dirty="0">
                 <a:solidFill>
                   <a:schemeClr val="tx2">
                     <a:lumMod val="75000"/>
@@ -5033,13 +4891,6 @@
               </a:rPr>
               <a:t>Features</a:t>
             </a:r>
-            <a:endParaRPr lang="en-US" b="1" dirty="0">
-              <a:solidFill>
-                <a:schemeClr val="tx2">
-                  <a:lumMod val="75000"/>
-                </a:schemeClr>
-              </a:solidFill>
-            </a:endParaRPr>
           </a:p>
         </p:txBody>
       </p:sp>
@@ -5071,11 +4922,11 @@
               </a:lnSpc>
             </a:pPr>
             <a:r>
-              <a:rPr lang="en-GB" sz="2000" dirty="0" smtClean="0"/>
+              <a:rPr lang="en-GB" sz="2000" dirty="0"/>
               <a:t>It has 3 operation modes =&gt;  </a:t>
             </a:r>
             <a:r>
-              <a:rPr lang="en-GB" sz="2000" dirty="0" smtClean="0">
+              <a:rPr lang="en-GB" sz="2000" dirty="0">
                 <a:solidFill>
                   <a:srgbClr val="C00000"/>
                 </a:solidFill>
@@ -5083,11 +4934,11 @@
               <a:t>Button</a:t>
             </a:r>
             <a:r>
-              <a:rPr lang="en-GB" sz="2000" dirty="0" smtClean="0"/>
+              <a:rPr lang="en-GB" sz="2000" dirty="0"/>
               <a:t>, </a:t>
             </a:r>
             <a:r>
-              <a:rPr lang="en-GB" sz="2000" dirty="0" smtClean="0">
+              <a:rPr lang="en-GB" sz="2000" dirty="0">
                 <a:solidFill>
                   <a:srgbClr val="C00000"/>
                 </a:solidFill>
@@ -5095,11 +4946,11 @@
               <a:t>Shell</a:t>
             </a:r>
             <a:r>
-              <a:rPr lang="en-GB" sz="2000" dirty="0" smtClean="0"/>
+              <a:rPr lang="en-GB" sz="2000" dirty="0"/>
               <a:t> &amp; </a:t>
             </a:r>
             <a:r>
-              <a:rPr lang="en-GB" sz="2000" dirty="0" smtClean="0">
+              <a:rPr lang="en-GB" sz="2000" dirty="0">
                 <a:solidFill>
                   <a:srgbClr val="C00000"/>
                 </a:solidFill>
@@ -5107,7 +4958,7 @@
               <a:t>Auto</a:t>
             </a:r>
             <a:r>
-              <a:rPr lang="en-GB" sz="2000" dirty="0" smtClean="0"/>
+              <a:rPr lang="en-GB" sz="2000" dirty="0"/>
               <a:t>.</a:t>
             </a:r>
           </a:p>
@@ -5118,15 +4969,15 @@
               </a:lnSpc>
             </a:pPr>
             <a:r>
-              <a:rPr lang="en-GB" sz="2000" dirty="0" smtClean="0"/>
+              <a:rPr lang="en-GB" sz="2000" dirty="0"/>
               <a:t>It shows the </a:t>
             </a:r>
             <a:r>
-              <a:rPr lang="en-GB" sz="2000" b="1" dirty="0" smtClean="0"/>
+              <a:rPr lang="en-GB" sz="2000" b="1" dirty="0"/>
               <a:t>'Remarks'</a:t>
             </a:r>
             <a:r>
-              <a:rPr lang="en-GB" sz="2000" dirty="0" smtClean="0"/>
+              <a:rPr lang="en-GB" sz="2000" dirty="0"/>
               <a:t> column while hovering on the data points in the Plot.</a:t>
             </a:r>
           </a:p>
@@ -5137,23 +4988,23 @@
               </a:lnSpc>
             </a:pPr>
             <a:r>
-              <a:rPr lang="en-GB" sz="2000" dirty="0" smtClean="0"/>
+              <a:rPr lang="en-GB" sz="2000" dirty="0"/>
               <a:t>It is very </a:t>
             </a:r>
             <a:r>
-              <a:rPr lang="en-GB" sz="2000" i="1" dirty="0" smtClean="0"/>
+              <a:rPr lang="en-GB" sz="2000" i="1" dirty="0"/>
               <a:t>Interactive</a:t>
             </a:r>
             <a:r>
-              <a:rPr lang="en-GB" sz="2000" dirty="0" smtClean="0"/>
+              <a:rPr lang="en-GB" sz="2000" dirty="0"/>
               <a:t> (zoom-in/out) and is quite </a:t>
             </a:r>
             <a:r>
-              <a:rPr lang="en-GB" sz="2000" i="1" dirty="0" smtClean="0"/>
+              <a:rPr lang="en-GB" sz="2000" i="1" dirty="0"/>
               <a:t>Modern</a:t>
             </a:r>
             <a:r>
-              <a:rPr lang="en-GB" sz="2000" dirty="0" smtClean="0"/>
+              <a:rPr lang="en-GB" sz="2000" dirty="0"/>
               <a:t>.</a:t>
             </a:r>
           </a:p>
@@ -5164,7 +5015,7 @@
               </a:lnSpc>
             </a:pPr>
             <a:r>
-              <a:rPr lang="en-GB" sz="2000" dirty="0" smtClean="0"/>
+              <a:rPr lang="en-GB" sz="2000" dirty="0"/>
               <a:t>A button is built-in within, for saving the plot's snapshot and can be attached in PPTs, Mail, etc.</a:t>
             </a:r>
           </a:p>
@@ -5175,7 +5026,7 @@
               </a:lnSpc>
             </a:pPr>
             <a:r>
-              <a:rPr lang="en-GB" sz="2000" dirty="0" smtClean="0"/>
+              <a:rPr lang="en-GB" sz="2000" dirty="0"/>
               <a:t>FYI, the entire codebase is written in Python, Bash (for automation) programming languages.</a:t>
             </a:r>
           </a:p>
@@ -5186,7 +5037,7 @@
               </a:lnSpc>
             </a:pPr>
             <a:r>
-              <a:rPr lang="en-GB" sz="2000" dirty="0" smtClean="0"/>
+              <a:rPr lang="en-GB" sz="2000" dirty="0"/>
               <a:t>There is no need of learning a programming language. All the modules/functions will be provided in form of packages and hence can be applied (with little parameter tweaks) for any form of data (in CSV, Excel).</a:t>
             </a:r>
           </a:p>
@@ -5197,7 +5048,7 @@
               </a:lnSpc>
             </a:pPr>
             <a:r>
-              <a:rPr lang="en-GB" sz="2000" b="1" dirty="0" err="1" smtClean="0">
+              <a:rPr lang="en-GB" sz="2000" b="1" dirty="0" err="1">
                 <a:solidFill>
                   <a:srgbClr val="7030A0"/>
                 </a:solidFill>
@@ -5205,11 +5056,11 @@
               <a:t>ViEW</a:t>
             </a:r>
             <a:r>
-              <a:rPr lang="en-GB" sz="2000" dirty="0" smtClean="0"/>
+              <a:rPr lang="en-GB" sz="2000" dirty="0"/>
               <a:t> (another Indigenous Software) is also integrable with </a:t>
             </a:r>
             <a:r>
-              <a:rPr lang="en-GB" sz="2400" b="1" dirty="0" smtClean="0">
+              <a:rPr lang="en-GB" sz="2400" b="1" dirty="0">
                 <a:solidFill>
                   <a:srgbClr val="0CAC32"/>
                 </a:solidFill>
@@ -5217,26 +5068,26 @@
               <a:t>AutoPlot</a:t>
             </a:r>
             <a:r>
-              <a:rPr lang="en-GB" sz="2000" dirty="0" smtClean="0"/>
+              <a:rPr lang="en-GB" sz="2000" dirty="0"/>
               <a:t> for adding </a:t>
             </a:r>
             <a:r>
-              <a:rPr lang="en-GB" sz="2000" b="1" dirty="0" smtClean="0"/>
+              <a:rPr lang="en-GB" sz="2000" b="1" dirty="0"/>
               <a:t>"Version Control" </a:t>
             </a:r>
             <a:r>
-              <a:rPr lang="en-GB" sz="2000" dirty="0" smtClean="0"/>
+              <a:rPr lang="en-GB" sz="2000" dirty="0"/>
               <a:t>feature to the Codebase, Excel, Word, Image (or any other format) files. </a:t>
             </a:r>
             <a:br>
-              <a:rPr lang="en-GB" sz="2000" dirty="0" smtClean="0"/>
+              <a:rPr lang="en-GB" sz="2000" dirty="0"/>
             </a:br>
             <a:r>
-              <a:rPr lang="en-GB" sz="2000" dirty="0" smtClean="0"/>
+              <a:rPr lang="en-GB" sz="2000" dirty="0"/>
               <a:t>Here, </a:t>
             </a:r>
             <a:r>
-              <a:rPr lang="en-GB" sz="2000" b="1" dirty="0" smtClean="0">
+              <a:rPr lang="en-GB" sz="2000" b="1" dirty="0">
                 <a:solidFill>
                   <a:srgbClr val="7030A0"/>
                 </a:solidFill>
@@ -5244,7 +5095,7 @@
               <a:t> </a:t>
             </a:r>
             <a:r>
-              <a:rPr lang="en-GB" sz="2000" b="1" dirty="0" err="1" smtClean="0">
+              <a:rPr lang="en-GB" sz="2000" b="1" dirty="0" err="1">
                 <a:solidFill>
                   <a:srgbClr val="7030A0"/>
                 </a:solidFill>
@@ -5252,11 +5103,11 @@
               <a:t>ViEW</a:t>
             </a:r>
             <a:r>
-              <a:rPr lang="en-GB" sz="2000" dirty="0" smtClean="0"/>
+              <a:rPr lang="en-GB" sz="2000" dirty="0"/>
               <a:t> acts as the foundation layer for </a:t>
             </a:r>
             <a:r>
-              <a:rPr lang="en-GB" sz="2400" b="1" dirty="0" smtClean="0">
+              <a:rPr lang="en-GB" sz="2400" b="1" dirty="0">
                 <a:solidFill>
                   <a:srgbClr val="0CAC32"/>
                 </a:solidFill>
@@ -5264,7 +5115,7 @@
               <a:t>AutoPlot</a:t>
             </a:r>
             <a:r>
-              <a:rPr lang="en-GB" sz="2000" dirty="0" smtClean="0"/>
+              <a:rPr lang="en-GB" sz="2000" dirty="0"/>
               <a:t>.</a:t>
             </a:r>
           </a:p>
@@ -5275,15 +5126,15 @@
               </a:lnSpc>
             </a:pPr>
             <a:r>
-              <a:rPr lang="en-GB" sz="2000" dirty="0" smtClean="0"/>
+              <a:rPr lang="en-GB" sz="2000" dirty="0"/>
               <a:t>It can also be used in applications where JMP software is normally preferred, here in SCL. In this, there are separate modules/functions which can replace the scripts written in </a:t>
             </a:r>
             <a:r>
-              <a:rPr lang="en-GB" sz="2000" b="1" dirty="0" smtClean="0"/>
+              <a:rPr lang="en-GB" sz="2000" b="1" dirty="0"/>
               <a:t>JMP Scripting Language (JSL)</a:t>
             </a:r>
             <a:r>
-              <a:rPr lang="en-GB" sz="2000" dirty="0" smtClean="0"/>
+              <a:rPr lang="en-GB" sz="2000" dirty="0"/>
               <a:t>.</a:t>
             </a:r>
           </a:p>
@@ -5293,7 +5144,7 @@
                 <a:spcPct val="100000"/>
               </a:lnSpc>
             </a:pPr>
-            <a:endParaRPr lang="en-US" sz="1600" dirty="0" smtClean="0">
+            <a:endParaRPr lang="en-US" sz="1600" dirty="0">
               <a:latin typeface="Segoe UI" panose="020B0502040204020203" pitchFamily="34" charset="0"/>
               <a:cs typeface="Segoe UI" panose="020B0502040204020203" pitchFamily="34" charset="0"/>
             </a:endParaRPr>
@@ -5303,20 +5154,13 @@
     </p:spTree>
     <p:extLst>
       <p:ext uri="{BB962C8B-B14F-4D97-AF65-F5344CB8AC3E}">
-        <p14:creationId xmlns:p14="http://schemas.microsoft.com/office/powerpoint/2010/main" xmlns="" val="1835708266"/>
+        <p14:creationId xmlns:p14="http://schemas.microsoft.com/office/powerpoint/2010/main" val="1835708266"/>
       </p:ext>
     </p:extLst>
   </p:cSld>
   <p:clrMapOvr>
     <a:masterClrMapping/>
   </p:clrMapOvr>
-  <p:timing>
-    <p:tnLst>
-      <p:par>
-        <p:cTn id="1" dur="indefinite" restart="never" nodeType="tmRoot"/>
-      </p:par>
-    </p:tnLst>
-  </p:timing>
 </p:sld>
 </file>
 
@@ -5353,7 +5197,7 @@
           <a:lstStyle/>
           <a:p>
             <a:r>
-              <a:rPr lang="en-US" b="1" dirty="0" smtClean="0">
+              <a:rPr lang="en-US" b="1" dirty="0">
                 <a:solidFill>
                   <a:schemeClr val="tx2">
                     <a:lumMod val="75000"/>
@@ -5362,13 +5206,6 @@
               </a:rPr>
               <a:t>Testing</a:t>
             </a:r>
-            <a:endParaRPr lang="en-US" b="1" dirty="0">
-              <a:solidFill>
-                <a:schemeClr val="tx2">
-                  <a:lumMod val="75000"/>
-                </a:schemeClr>
-              </a:solidFill>
-            </a:endParaRPr>
           </a:p>
         </p:txBody>
       </p:sp>
@@ -5390,52 +5227,52 @@
           <a:lstStyle/>
           <a:p>
             <a:r>
-              <a:rPr lang="en-GB" dirty="0" smtClean="0"/>
+              <a:rPr lang="en-GB" dirty="0"/>
               <a:t>Fully implemented in </a:t>
             </a:r>
             <a:r>
-              <a:rPr lang="en-GB" b="1" dirty="0" smtClean="0"/>
+              <a:rPr lang="en-GB" b="1" dirty="0"/>
               <a:t>DRY ETCH </a:t>
             </a:r>
             <a:r>
-              <a:rPr lang="en-GB" dirty="0" smtClean="0"/>
+              <a:rPr lang="en-GB" dirty="0"/>
               <a:t>and successfully tested for more than 2 months now.</a:t>
             </a:r>
           </a:p>
           <a:p>
             <a:r>
-              <a:rPr lang="en-GB" dirty="0" smtClean="0"/>
+              <a:rPr lang="en-GB" dirty="0"/>
               <a:t>A sample QC data of PRS01 Equipment, </a:t>
             </a:r>
             <a:r>
-              <a:rPr lang="en-GB" b="1" dirty="0" smtClean="0"/>
+              <a:rPr lang="en-GB" b="1" dirty="0"/>
               <a:t>WET ETCH </a:t>
             </a:r>
             <a:r>
-              <a:rPr lang="en-GB" dirty="0" smtClean="0"/>
+              <a:rPr lang="en-GB" dirty="0"/>
               <a:t>has also been successfully tested as well.</a:t>
             </a:r>
           </a:p>
           <a:p>
             <a:r>
-              <a:rPr lang="en-GB" dirty="0" smtClean="0"/>
+              <a:rPr lang="en-GB" dirty="0"/>
               <a:t>A sample QC data of FRST1 Equipment, </a:t>
             </a:r>
             <a:r>
-              <a:rPr lang="en-GB" b="1" dirty="0" smtClean="0"/>
+              <a:rPr lang="en-GB" b="1" dirty="0"/>
               <a:t>DIFFUSION</a:t>
             </a:r>
             <a:r>
-              <a:rPr lang="en-GB" dirty="0" smtClean="0"/>
+              <a:rPr lang="en-GB" dirty="0"/>
               <a:t> has also been successfully tested as well.</a:t>
             </a:r>
             <a:br>
-              <a:rPr lang="en-GB" dirty="0" smtClean="0"/>
+              <a:rPr lang="en-GB" dirty="0"/>
             </a:br>
-            <a:endParaRPr lang="en-GB" dirty="0" smtClean="0"/>
-          </a:p>
-          <a:p>
-            <a:endParaRPr lang="en-US" dirty="0" smtClean="0">
+            <a:endParaRPr lang="en-GB" dirty="0"/>
+          </a:p>
+          <a:p>
+            <a:endParaRPr lang="en-US" dirty="0">
               <a:latin typeface="Segoe UI" panose="020B0502040204020203" pitchFamily="34" charset="0"/>
               <a:cs typeface="Segoe UI" panose="020B0502040204020203" pitchFamily="34" charset="0"/>
             </a:endParaRPr>
@@ -5445,20 +5282,13 @@
     </p:spTree>
     <p:extLst>
       <p:ext uri="{BB962C8B-B14F-4D97-AF65-F5344CB8AC3E}">
-        <p14:creationId xmlns:p14="http://schemas.microsoft.com/office/powerpoint/2010/main" xmlns="" val="1835708266"/>
+        <p14:creationId xmlns:p14="http://schemas.microsoft.com/office/powerpoint/2010/main" val="1835708266"/>
       </p:ext>
     </p:extLst>
   </p:cSld>
   <p:clrMapOvr>
     <a:masterClrMapping/>
   </p:clrMapOvr>
-  <p:timing>
-    <p:tnLst>
-      <p:par>
-        <p:cTn id="1" dur="indefinite" restart="never" nodeType="tmRoot"/>
-      </p:par>
-    </p:tnLst>
-  </p:timing>
 </p:sld>
 </file>
 
@@ -5495,7 +5325,7 @@
           <a:lstStyle/>
           <a:p>
             <a:r>
-              <a:rPr lang="en-US" b="1" dirty="0" smtClean="0">
+              <a:rPr lang="en-US" b="1" dirty="0">
                 <a:solidFill>
                   <a:schemeClr val="tx2">
                     <a:lumMod val="75000"/>
@@ -5505,7 +5335,7 @@
               <a:t>Demo: </a:t>
             </a:r>
             <a:r>
-              <a:rPr lang="en-US" dirty="0" smtClean="0">
+              <a:rPr lang="en-US" dirty="0">
                 <a:solidFill>
                   <a:schemeClr val="tx2">
                     <a:lumMod val="75000"/>
@@ -5514,32 +5344,25 @@
               </a:rPr>
               <a:t>Dry Etch</a:t>
             </a:r>
+          </a:p>
+        </p:txBody>
+      </p:sp>
+      <p:sp>
+        <p:nvSpPr>
+          <p:cNvPr id="3" name="Content Placeholder 2"/>
+          <p:cNvSpPr>
+            <a:spLocks noGrp="1"/>
+          </p:cNvSpPr>
+          <p:nvPr>
+            <p:ph idx="1"/>
+          </p:nvPr>
+        </p:nvSpPr>
+        <p:spPr/>
+        <p:txBody>
+          <a:bodyPr/>
+          <a:lstStyle/>
+          <a:p>
             <a:endParaRPr lang="en-US" dirty="0">
-              <a:solidFill>
-                <a:schemeClr val="tx2">
-                  <a:lumMod val="75000"/>
-                </a:schemeClr>
-              </a:solidFill>
-            </a:endParaRPr>
-          </a:p>
-        </p:txBody>
-      </p:sp>
-      <p:sp>
-        <p:nvSpPr>
-          <p:cNvPr id="3" name="Content Placeholder 2"/>
-          <p:cNvSpPr>
-            <a:spLocks noGrp="1"/>
-          </p:cNvSpPr>
-          <p:nvPr>
-            <p:ph idx="1"/>
-          </p:nvPr>
-        </p:nvSpPr>
-        <p:spPr/>
-        <p:txBody>
-          <a:bodyPr/>
-          <a:lstStyle/>
-          <a:p>
-            <a:endParaRPr lang="en-US" dirty="0" smtClean="0">
               <a:latin typeface="Segoe UI" panose="020B0502040204020203" pitchFamily="34" charset="0"/>
               <a:cs typeface="Segoe UI" panose="020B0502040204020203" pitchFamily="34" charset="0"/>
             </a:endParaRPr>
@@ -5549,20 +5372,13 @@
     </p:spTree>
     <p:extLst>
       <p:ext uri="{BB962C8B-B14F-4D97-AF65-F5344CB8AC3E}">
-        <p14:creationId xmlns:p14="http://schemas.microsoft.com/office/powerpoint/2010/main" xmlns="" val="3924351243"/>
+        <p14:creationId xmlns:p14="http://schemas.microsoft.com/office/powerpoint/2010/main" val="3924351243"/>
       </p:ext>
     </p:extLst>
   </p:cSld>
   <p:clrMapOvr>
     <a:masterClrMapping/>
   </p:clrMapOvr>
-  <p:timing>
-    <p:tnLst>
-      <p:par>
-        <p:cTn id="1" dur="indefinite" restart="never" nodeType="tmRoot"/>
-      </p:par>
-    </p:tnLst>
-  </p:timing>
 </p:sld>
 </file>
 
@@ -5599,7 +5415,7 @@
           <a:lstStyle/>
           <a:p>
             <a:r>
-              <a:rPr lang="en-US" b="1" dirty="0" smtClean="0">
+              <a:rPr lang="en-US" b="1" dirty="0">
                 <a:solidFill>
                   <a:schemeClr val="tx2">
                     <a:lumMod val="75000"/>
@@ -5609,7 +5425,7 @@
               <a:t>Demo: </a:t>
             </a:r>
             <a:r>
-              <a:rPr lang="en-US" dirty="0" smtClean="0">
+              <a:rPr lang="en-US" dirty="0">
                 <a:solidFill>
                   <a:schemeClr val="tx2">
                     <a:lumMod val="75000"/>
@@ -5618,32 +5434,25 @@
               </a:rPr>
               <a:t>Diffusion</a:t>
             </a:r>
+          </a:p>
+        </p:txBody>
+      </p:sp>
+      <p:sp>
+        <p:nvSpPr>
+          <p:cNvPr id="3" name="Content Placeholder 2"/>
+          <p:cNvSpPr>
+            <a:spLocks noGrp="1"/>
+          </p:cNvSpPr>
+          <p:nvPr>
+            <p:ph idx="1"/>
+          </p:nvPr>
+        </p:nvSpPr>
+        <p:spPr/>
+        <p:txBody>
+          <a:bodyPr/>
+          <a:lstStyle/>
+          <a:p>
             <a:endParaRPr lang="en-US" dirty="0">
-              <a:solidFill>
-                <a:schemeClr val="tx2">
-                  <a:lumMod val="75000"/>
-                </a:schemeClr>
-              </a:solidFill>
-            </a:endParaRPr>
-          </a:p>
-        </p:txBody>
-      </p:sp>
-      <p:sp>
-        <p:nvSpPr>
-          <p:cNvPr id="3" name="Content Placeholder 2"/>
-          <p:cNvSpPr>
-            <a:spLocks noGrp="1"/>
-          </p:cNvSpPr>
-          <p:nvPr>
-            <p:ph idx="1"/>
-          </p:nvPr>
-        </p:nvSpPr>
-        <p:spPr/>
-        <p:txBody>
-          <a:bodyPr/>
-          <a:lstStyle/>
-          <a:p>
-            <a:endParaRPr lang="en-US" dirty="0" smtClean="0">
               <a:latin typeface="Segoe UI" panose="020B0502040204020203" pitchFamily="34" charset="0"/>
               <a:cs typeface="Segoe UI" panose="020B0502040204020203" pitchFamily="34" charset="0"/>
             </a:endParaRPr>
@@ -5653,20 +5462,13 @@
     </p:spTree>
     <p:extLst>
       <p:ext uri="{BB962C8B-B14F-4D97-AF65-F5344CB8AC3E}">
-        <p14:creationId xmlns:p14="http://schemas.microsoft.com/office/powerpoint/2010/main" xmlns="" val="3390085284"/>
+        <p14:creationId xmlns:p14="http://schemas.microsoft.com/office/powerpoint/2010/main" val="3390085284"/>
       </p:ext>
     </p:extLst>
   </p:cSld>
   <p:clrMapOvr>
     <a:masterClrMapping/>
   </p:clrMapOvr>
-  <p:timing>
-    <p:tnLst>
-      <p:par>
-        <p:cTn id="1" dur="indefinite" restart="never" nodeType="tmRoot"/>
-      </p:par>
-    </p:tnLst>
-  </p:timing>
 </p:sld>
 </file>
 
@@ -5703,7 +5505,7 @@
           <a:lstStyle/>
           <a:p>
             <a:r>
-              <a:rPr lang="en-US" b="1" dirty="0" smtClean="0">
+              <a:rPr lang="en-US" b="1" dirty="0">
                 <a:solidFill>
                   <a:schemeClr val="tx2">
                     <a:lumMod val="75000"/>
@@ -5713,7 +5515,7 @@
               <a:t>Demo: </a:t>
             </a:r>
             <a:r>
-              <a:rPr lang="en-US" dirty="0" smtClean="0">
+              <a:rPr lang="en-US" dirty="0">
                 <a:solidFill>
                   <a:schemeClr val="tx2">
                     <a:lumMod val="75000"/>
@@ -5722,32 +5524,25 @@
               </a:rPr>
               <a:t>Wet Etch</a:t>
             </a:r>
+          </a:p>
+        </p:txBody>
+      </p:sp>
+      <p:sp>
+        <p:nvSpPr>
+          <p:cNvPr id="3" name="Content Placeholder 2"/>
+          <p:cNvSpPr>
+            <a:spLocks noGrp="1"/>
+          </p:cNvSpPr>
+          <p:nvPr>
+            <p:ph idx="1"/>
+          </p:nvPr>
+        </p:nvSpPr>
+        <p:spPr/>
+        <p:txBody>
+          <a:bodyPr/>
+          <a:lstStyle/>
+          <a:p>
             <a:endParaRPr lang="en-US" dirty="0">
-              <a:solidFill>
-                <a:schemeClr val="tx2">
-                  <a:lumMod val="75000"/>
-                </a:schemeClr>
-              </a:solidFill>
-            </a:endParaRPr>
-          </a:p>
-        </p:txBody>
-      </p:sp>
-      <p:sp>
-        <p:nvSpPr>
-          <p:cNvPr id="3" name="Content Placeholder 2"/>
-          <p:cNvSpPr>
-            <a:spLocks noGrp="1"/>
-          </p:cNvSpPr>
-          <p:nvPr>
-            <p:ph idx="1"/>
-          </p:nvPr>
-        </p:nvSpPr>
-        <p:spPr/>
-        <p:txBody>
-          <a:bodyPr/>
-          <a:lstStyle/>
-          <a:p>
-            <a:endParaRPr lang="en-US" dirty="0" smtClean="0">
               <a:latin typeface="Segoe UI" panose="020B0502040204020203" pitchFamily="34" charset="0"/>
               <a:cs typeface="Segoe UI" panose="020B0502040204020203" pitchFamily="34" charset="0"/>
             </a:endParaRPr>
@@ -5757,20 +5552,13 @@
     </p:spTree>
     <p:extLst>
       <p:ext uri="{BB962C8B-B14F-4D97-AF65-F5344CB8AC3E}">
-        <p14:creationId xmlns:p14="http://schemas.microsoft.com/office/powerpoint/2010/main" xmlns="" val="584440453"/>
+        <p14:creationId xmlns:p14="http://schemas.microsoft.com/office/powerpoint/2010/main" val="584440453"/>
       </p:ext>
     </p:extLst>
   </p:cSld>
   <p:clrMapOvr>
     <a:masterClrMapping/>
   </p:clrMapOvr>
-  <p:timing>
-    <p:tnLst>
-      <p:par>
-        <p:cTn id="1" dur="indefinite" restart="never" nodeType="tmRoot"/>
-      </p:par>
-    </p:tnLst>
-  </p:timing>
 </p:sld>
 </file>
 
@@ -6029,7 +5817,7 @@
   <a:extraClrSchemeLst/>
   <a:extLst>
     <a:ext uri="{05A4C25C-085E-4340-85A3-A5531E510DB2}">
-      <thm15:themeFamily xmlns:thm15="http://schemas.microsoft.com/office/thememl/2012/main" xmlns="" name="Office Theme" id="{62F939B6-93AF-4DB8-9C6B-D6C7DFDC589F}" vid="{4A3C46E8-61CC-4603-A589-7422A47A8E4A}"/>
+      <thm15:themeFamily xmlns:thm15="http://schemas.microsoft.com/office/thememl/2012/main" name="Office Theme" id="{62F939B6-93AF-4DB8-9C6B-D6C7DFDC589F}" vid="{4A3C46E8-61CC-4603-A589-7422A47A8E4A}"/>
     </a:ext>
   </a:extLst>
 </a:theme>

</xml_diff>